<commit_message>
Update the readme file and added lib modules.
</commit_message>
<xml_diff>
--- a/doc/designDoc.pptx
+++ b/doc/designDoc.pptx
@@ -106,6 +106,11 @@
       </a:defRPr>
     </a:lvl9pPr>
   </p:defaultTextStyle>
+  <p:extLst>
+    <p:ext uri="{EFAFB233-063F-42B5-8137-9DF3F51BA10A}">
+      <p15:sldGuideLst xmlns:p15="http://schemas.microsoft.com/office/powerpoint/2012/main"/>
+    </p:ext>
+  </p:extLst>
 </p:presentation>
 </file>
 
@@ -258,7 +263,7 @@
           <a:p>
             <a:fld id="{9FCA313A-65B0-404C-ABF6-BBAAB537D5DB}" type="datetimeFigureOut">
               <a:rPr lang="en-SG" smtClean="0"/>
-              <a:t>8/5/2024</a:t>
+              <a:t>17/5/2024</a:t>
             </a:fld>
             <a:endParaRPr lang="en-SG"/>
           </a:p>
@@ -458,7 +463,7 @@
           <a:p>
             <a:fld id="{9FCA313A-65B0-404C-ABF6-BBAAB537D5DB}" type="datetimeFigureOut">
               <a:rPr lang="en-SG" smtClean="0"/>
-              <a:t>8/5/2024</a:t>
+              <a:t>17/5/2024</a:t>
             </a:fld>
             <a:endParaRPr lang="en-SG"/>
           </a:p>
@@ -668,7 +673,7 @@
           <a:p>
             <a:fld id="{9FCA313A-65B0-404C-ABF6-BBAAB537D5DB}" type="datetimeFigureOut">
               <a:rPr lang="en-SG" smtClean="0"/>
-              <a:t>8/5/2024</a:t>
+              <a:t>17/5/2024</a:t>
             </a:fld>
             <a:endParaRPr lang="en-SG"/>
           </a:p>
@@ -868,7 +873,7 @@
           <a:p>
             <a:fld id="{9FCA313A-65B0-404C-ABF6-BBAAB537D5DB}" type="datetimeFigureOut">
               <a:rPr lang="en-SG" smtClean="0"/>
-              <a:t>8/5/2024</a:t>
+              <a:t>17/5/2024</a:t>
             </a:fld>
             <a:endParaRPr lang="en-SG"/>
           </a:p>
@@ -1144,7 +1149,7 @@
           <a:p>
             <a:fld id="{9FCA313A-65B0-404C-ABF6-BBAAB537D5DB}" type="datetimeFigureOut">
               <a:rPr lang="en-SG" smtClean="0"/>
-              <a:t>8/5/2024</a:t>
+              <a:t>17/5/2024</a:t>
             </a:fld>
             <a:endParaRPr lang="en-SG"/>
           </a:p>
@@ -1412,7 +1417,7 @@
           <a:p>
             <a:fld id="{9FCA313A-65B0-404C-ABF6-BBAAB537D5DB}" type="datetimeFigureOut">
               <a:rPr lang="en-SG" smtClean="0"/>
-              <a:t>8/5/2024</a:t>
+              <a:t>17/5/2024</a:t>
             </a:fld>
             <a:endParaRPr lang="en-SG"/>
           </a:p>
@@ -1827,7 +1832,7 @@
           <a:p>
             <a:fld id="{9FCA313A-65B0-404C-ABF6-BBAAB537D5DB}" type="datetimeFigureOut">
               <a:rPr lang="en-SG" smtClean="0"/>
-              <a:t>8/5/2024</a:t>
+              <a:t>17/5/2024</a:t>
             </a:fld>
             <a:endParaRPr lang="en-SG"/>
           </a:p>
@@ -1969,7 +1974,7 @@
           <a:p>
             <a:fld id="{9FCA313A-65B0-404C-ABF6-BBAAB537D5DB}" type="datetimeFigureOut">
               <a:rPr lang="en-SG" smtClean="0"/>
-              <a:t>8/5/2024</a:t>
+              <a:t>17/5/2024</a:t>
             </a:fld>
             <a:endParaRPr lang="en-SG"/>
           </a:p>
@@ -2082,7 +2087,7 @@
           <a:p>
             <a:fld id="{9FCA313A-65B0-404C-ABF6-BBAAB537D5DB}" type="datetimeFigureOut">
               <a:rPr lang="en-SG" smtClean="0"/>
-              <a:t>8/5/2024</a:t>
+              <a:t>17/5/2024</a:t>
             </a:fld>
             <a:endParaRPr lang="en-SG"/>
           </a:p>
@@ -2395,7 +2400,7 @@
           <a:p>
             <a:fld id="{9FCA313A-65B0-404C-ABF6-BBAAB537D5DB}" type="datetimeFigureOut">
               <a:rPr lang="en-SG" smtClean="0"/>
-              <a:t>8/5/2024</a:t>
+              <a:t>17/5/2024</a:t>
             </a:fld>
             <a:endParaRPr lang="en-SG"/>
           </a:p>
@@ -2684,7 +2689,7 @@
           <a:p>
             <a:fld id="{9FCA313A-65B0-404C-ABF6-BBAAB537D5DB}" type="datetimeFigureOut">
               <a:rPr lang="en-SG" smtClean="0"/>
-              <a:t>8/5/2024</a:t>
+              <a:t>17/5/2024</a:t>
             </a:fld>
             <a:endParaRPr lang="en-SG"/>
           </a:p>
@@ -2927,7 +2932,7 @@
           <a:p>
             <a:fld id="{9FCA313A-65B0-404C-ABF6-BBAAB537D5DB}" type="datetimeFigureOut">
               <a:rPr lang="en-SG" smtClean="0"/>
-              <a:t>8/5/2024</a:t>
+              <a:t>17/5/2024</a:t>
             </a:fld>
             <a:endParaRPr lang="en-SG"/>
           </a:p>
@@ -3408,7 +3413,7 @@
         </p:blipFill>
         <p:spPr>
           <a:xfrm>
-            <a:off x="5422900" y="1500256"/>
+            <a:off x="5230876" y="503560"/>
             <a:ext cx="5598903" cy="4367143"/>
           </a:xfrm>
           <a:prstGeom prst="rect">
@@ -3430,7 +3435,7 @@
         </p:nvSpPr>
         <p:spPr>
           <a:xfrm>
-            <a:off x="5965372" y="4735306"/>
+            <a:off x="5773348" y="3738610"/>
             <a:ext cx="5258637" cy="1015663"/>
           </a:xfrm>
           <a:prstGeom prst="rect">
@@ -3513,7 +3518,7 @@
         </p:blipFill>
         <p:spPr>
           <a:xfrm>
-            <a:off x="3124571" y="1081381"/>
+            <a:off x="838571" y="386437"/>
             <a:ext cx="5942857" cy="4695238"/>
           </a:xfrm>
           <a:prstGeom prst="roundRect">
@@ -3575,6 +3580,1430 @@
           <a:chExt cx="0" cy="0"/>
         </a:xfrm>
       </p:grpSpPr>
+      <p:sp>
+        <p:nvSpPr>
+          <p:cNvPr id="2" name="Rectangle 1">
+            <a:extLst>
+              <a:ext uri="{FF2B5EF4-FFF2-40B4-BE49-F238E27FC236}">
+                <a16:creationId xmlns:a16="http://schemas.microsoft.com/office/drawing/2014/main" id="{916A6A6D-20BA-DC15-473A-DB416FF5CE4F}"/>
+              </a:ext>
+            </a:extLst>
+          </p:cNvPr>
+          <p:cNvSpPr/>
+          <p:nvPr/>
+        </p:nvSpPr>
+        <p:spPr>
+          <a:xfrm>
+            <a:off x="5429557" y="1697664"/>
+            <a:ext cx="96824" cy="94593"/>
+          </a:xfrm>
+          <a:prstGeom prst="rect">
+            <a:avLst/>
+          </a:prstGeom>
+        </p:spPr>
+        <p:style>
+          <a:lnRef idx="2">
+            <a:schemeClr val="accent1">
+              <a:shade val="15000"/>
+            </a:schemeClr>
+          </a:lnRef>
+          <a:fillRef idx="1">
+            <a:schemeClr val="accent1"/>
+          </a:fillRef>
+          <a:effectRef idx="0">
+            <a:schemeClr val="accent1"/>
+          </a:effectRef>
+          <a:fontRef idx="minor">
+            <a:schemeClr val="lt1"/>
+          </a:fontRef>
+        </p:style>
+        <p:txBody>
+          <a:bodyPr rtlCol="0" anchor="ctr"/>
+          <a:lstStyle/>
+          <a:p>
+            <a:pPr algn="ctr"/>
+            <a:endParaRPr lang="en-SG"/>
+          </a:p>
+        </p:txBody>
+      </p:sp>
+      <p:sp>
+        <p:nvSpPr>
+          <p:cNvPr id="3" name="Rectangle 2">
+            <a:extLst>
+              <a:ext uri="{FF2B5EF4-FFF2-40B4-BE49-F238E27FC236}">
+                <a16:creationId xmlns:a16="http://schemas.microsoft.com/office/drawing/2014/main" id="{9CCF8289-0524-56C3-A2BD-6285C37C99DB}"/>
+              </a:ext>
+            </a:extLst>
+          </p:cNvPr>
+          <p:cNvSpPr/>
+          <p:nvPr/>
+        </p:nvSpPr>
+        <p:spPr>
+          <a:xfrm>
+            <a:off x="4145633" y="1696906"/>
+            <a:ext cx="96824" cy="94593"/>
+          </a:xfrm>
+          <a:prstGeom prst="rect">
+            <a:avLst/>
+          </a:prstGeom>
+        </p:spPr>
+        <p:style>
+          <a:lnRef idx="2">
+            <a:schemeClr val="accent1">
+              <a:shade val="15000"/>
+            </a:schemeClr>
+          </a:lnRef>
+          <a:fillRef idx="1">
+            <a:schemeClr val="accent1"/>
+          </a:fillRef>
+          <a:effectRef idx="0">
+            <a:schemeClr val="accent1"/>
+          </a:effectRef>
+          <a:fontRef idx="minor">
+            <a:schemeClr val="lt1"/>
+          </a:fontRef>
+        </p:style>
+        <p:txBody>
+          <a:bodyPr rtlCol="0" anchor="ctr"/>
+          <a:lstStyle/>
+          <a:p>
+            <a:pPr algn="ctr"/>
+            <a:endParaRPr lang="en-SG"/>
+          </a:p>
+        </p:txBody>
+      </p:sp>
+      <p:sp>
+        <p:nvSpPr>
+          <p:cNvPr id="4" name="Rectangle 3">
+            <a:extLst>
+              <a:ext uri="{FF2B5EF4-FFF2-40B4-BE49-F238E27FC236}">
+                <a16:creationId xmlns:a16="http://schemas.microsoft.com/office/drawing/2014/main" id="{3C8C99B4-6D53-4A28-04B6-9EBFB545E301}"/>
+              </a:ext>
+            </a:extLst>
+          </p:cNvPr>
+          <p:cNvSpPr/>
+          <p:nvPr/>
+        </p:nvSpPr>
+        <p:spPr>
+          <a:xfrm>
+            <a:off x="2931342" y="792720"/>
+            <a:ext cx="4048489" cy="1012571"/>
+          </a:xfrm>
+          <a:prstGeom prst="rect">
+            <a:avLst/>
+          </a:prstGeom>
+          <a:solidFill>
+            <a:schemeClr val="accent1">
+              <a:lumMod val="75000"/>
+            </a:schemeClr>
+          </a:solidFill>
+        </p:spPr>
+        <p:style>
+          <a:lnRef idx="2">
+            <a:schemeClr val="accent1">
+              <a:shade val="15000"/>
+            </a:schemeClr>
+          </a:lnRef>
+          <a:fillRef idx="1">
+            <a:schemeClr val="accent1"/>
+          </a:fillRef>
+          <a:effectRef idx="0">
+            <a:schemeClr val="accent1"/>
+          </a:effectRef>
+          <a:fontRef idx="minor">
+            <a:schemeClr val="lt1"/>
+          </a:fontRef>
+        </p:style>
+        <p:txBody>
+          <a:bodyPr rtlCol="0" anchor="ctr"/>
+          <a:lstStyle/>
+          <a:p>
+            <a:pPr algn="ctr"/>
+            <a:endParaRPr lang="en-SG" sz="1600" b="1" dirty="0">
+              <a:solidFill>
+                <a:schemeClr val="bg1"/>
+              </a:solidFill>
+            </a:endParaRPr>
+          </a:p>
+        </p:txBody>
+      </p:sp>
+      <p:sp>
+        <p:nvSpPr>
+          <p:cNvPr id="5" name="Rectangle 4">
+            <a:extLst>
+              <a:ext uri="{FF2B5EF4-FFF2-40B4-BE49-F238E27FC236}">
+                <a16:creationId xmlns:a16="http://schemas.microsoft.com/office/drawing/2014/main" id="{3068CEE8-59E9-546C-D415-359AAB9FF2A8}"/>
+              </a:ext>
+            </a:extLst>
+          </p:cNvPr>
+          <p:cNvSpPr/>
+          <p:nvPr/>
+        </p:nvSpPr>
+        <p:spPr>
+          <a:xfrm>
+            <a:off x="290824" y="2609969"/>
+            <a:ext cx="2651342" cy="2673556"/>
+          </a:xfrm>
+          <a:prstGeom prst="rect">
+            <a:avLst/>
+          </a:prstGeom>
+          <a:solidFill>
+            <a:schemeClr val="accent2">
+              <a:lumMod val="20000"/>
+              <a:lumOff val="80000"/>
+            </a:schemeClr>
+          </a:solidFill>
+        </p:spPr>
+        <p:style>
+          <a:lnRef idx="2">
+            <a:schemeClr val="accent1">
+              <a:shade val="15000"/>
+            </a:schemeClr>
+          </a:lnRef>
+          <a:fillRef idx="1">
+            <a:schemeClr val="accent1"/>
+          </a:fillRef>
+          <a:effectRef idx="0">
+            <a:schemeClr val="accent1"/>
+          </a:effectRef>
+          <a:fontRef idx="minor">
+            <a:schemeClr val="lt1"/>
+          </a:fontRef>
+        </p:style>
+        <p:txBody>
+          <a:bodyPr rtlCol="0" anchor="ctr"/>
+          <a:lstStyle/>
+          <a:p>
+            <a:pPr algn="ctr"/>
+            <a:endParaRPr lang="en-SG" dirty="0"/>
+          </a:p>
+        </p:txBody>
+      </p:sp>
+      <p:sp>
+        <p:nvSpPr>
+          <p:cNvPr id="6" name="TextBox 5">
+            <a:extLst>
+              <a:ext uri="{FF2B5EF4-FFF2-40B4-BE49-F238E27FC236}">
+                <a16:creationId xmlns:a16="http://schemas.microsoft.com/office/drawing/2014/main" id="{E57A74F4-6ECA-3467-5151-543CE324D441}"/>
+              </a:ext>
+            </a:extLst>
+          </p:cNvPr>
+          <p:cNvSpPr txBox="1"/>
+          <p:nvPr/>
+        </p:nvSpPr>
+        <p:spPr>
+          <a:xfrm>
+            <a:off x="305204" y="2641646"/>
+            <a:ext cx="2544369" cy="584775"/>
+          </a:xfrm>
+          <a:prstGeom prst="rect">
+            <a:avLst/>
+          </a:prstGeom>
+          <a:noFill/>
+        </p:spPr>
+        <p:txBody>
+          <a:bodyPr wrap="square" rtlCol="0">
+            <a:spAutoFit/>
+          </a:bodyPr>
+          <a:lstStyle/>
+          <a:p>
+            <a:r>
+              <a:rPr lang="en-SG" sz="1600" b="1" dirty="0"/>
+              <a:t>Malicious Activities module Repository </a:t>
+            </a:r>
+          </a:p>
+        </p:txBody>
+      </p:sp>
+      <p:sp>
+        <p:nvSpPr>
+          <p:cNvPr id="8" name="Rectangle 7">
+            <a:extLst>
+              <a:ext uri="{FF2B5EF4-FFF2-40B4-BE49-F238E27FC236}">
+                <a16:creationId xmlns:a16="http://schemas.microsoft.com/office/drawing/2014/main" id="{1991B3D6-CF92-8E93-6B3A-42B73C66DBC6}"/>
+              </a:ext>
+            </a:extLst>
+          </p:cNvPr>
+          <p:cNvSpPr/>
+          <p:nvPr/>
+        </p:nvSpPr>
+        <p:spPr>
+          <a:xfrm>
+            <a:off x="412809" y="3275857"/>
+            <a:ext cx="2253399" cy="414661"/>
+          </a:xfrm>
+          <a:prstGeom prst="rect">
+            <a:avLst/>
+          </a:prstGeom>
+          <a:solidFill>
+            <a:schemeClr val="accent2">
+              <a:lumMod val="40000"/>
+              <a:lumOff val="60000"/>
+            </a:schemeClr>
+          </a:solidFill>
+          <a:ln>
+            <a:solidFill>
+              <a:srgbClr val="C00000"/>
+            </a:solidFill>
+            <a:prstDash val="sysDash"/>
+          </a:ln>
+        </p:spPr>
+        <p:style>
+          <a:lnRef idx="2">
+            <a:schemeClr val="accent1">
+              <a:shade val="15000"/>
+            </a:schemeClr>
+          </a:lnRef>
+          <a:fillRef idx="1">
+            <a:schemeClr val="accent1"/>
+          </a:fillRef>
+          <a:effectRef idx="0">
+            <a:schemeClr val="accent1"/>
+          </a:effectRef>
+          <a:fontRef idx="minor">
+            <a:schemeClr val="lt1"/>
+          </a:fontRef>
+        </p:style>
+        <p:txBody>
+          <a:bodyPr rtlCol="0" anchor="ctr"/>
+          <a:lstStyle/>
+          <a:p>
+            <a:r>
+              <a:rPr lang="en-SG" sz="1200" b="1" dirty="0">
+                <a:solidFill>
+                  <a:srgbClr val="C00000"/>
+                </a:solidFill>
+              </a:rPr>
+              <a:t>Credentials Compromise Attack Module  </a:t>
+            </a:r>
+          </a:p>
+        </p:txBody>
+      </p:sp>
+      <p:sp>
+        <p:nvSpPr>
+          <p:cNvPr id="9" name="Rectangle 8">
+            <a:extLst>
+              <a:ext uri="{FF2B5EF4-FFF2-40B4-BE49-F238E27FC236}">
+                <a16:creationId xmlns:a16="http://schemas.microsoft.com/office/drawing/2014/main" id="{209CE54E-6780-B303-F582-A7D4EF5BA5F6}"/>
+              </a:ext>
+            </a:extLst>
+          </p:cNvPr>
+          <p:cNvSpPr/>
+          <p:nvPr/>
+        </p:nvSpPr>
+        <p:spPr>
+          <a:xfrm>
+            <a:off x="3381153" y="2585704"/>
+            <a:ext cx="3115200" cy="2697821"/>
+          </a:xfrm>
+          <a:prstGeom prst="rect">
+            <a:avLst/>
+          </a:prstGeom>
+          <a:solidFill>
+            <a:schemeClr val="bg2"/>
+          </a:solidFill>
+        </p:spPr>
+        <p:style>
+          <a:lnRef idx="2">
+            <a:schemeClr val="accent1">
+              <a:shade val="15000"/>
+            </a:schemeClr>
+          </a:lnRef>
+          <a:fillRef idx="1">
+            <a:schemeClr val="accent1"/>
+          </a:fillRef>
+          <a:effectRef idx="0">
+            <a:schemeClr val="accent1"/>
+          </a:effectRef>
+          <a:fontRef idx="minor">
+            <a:schemeClr val="lt1"/>
+          </a:fontRef>
+        </p:style>
+        <p:txBody>
+          <a:bodyPr rtlCol="0" anchor="ctr"/>
+          <a:lstStyle/>
+          <a:p>
+            <a:pPr algn="ctr"/>
+            <a:endParaRPr lang="en-SG" dirty="0"/>
+          </a:p>
+        </p:txBody>
+      </p:sp>
+      <p:sp>
+        <p:nvSpPr>
+          <p:cNvPr id="10" name="TextBox 9">
+            <a:extLst>
+              <a:ext uri="{FF2B5EF4-FFF2-40B4-BE49-F238E27FC236}">
+                <a16:creationId xmlns:a16="http://schemas.microsoft.com/office/drawing/2014/main" id="{E4CA0A39-7065-4EE0-8460-36E758B5FD74}"/>
+              </a:ext>
+            </a:extLst>
+          </p:cNvPr>
+          <p:cNvSpPr txBox="1"/>
+          <p:nvPr/>
+        </p:nvSpPr>
+        <p:spPr>
+          <a:xfrm>
+            <a:off x="3417114" y="2626582"/>
+            <a:ext cx="3079239" cy="338554"/>
+          </a:xfrm>
+          <a:prstGeom prst="rect">
+            <a:avLst/>
+          </a:prstGeom>
+          <a:noFill/>
+        </p:spPr>
+        <p:txBody>
+          <a:bodyPr wrap="square" rtlCol="0">
+            <a:spAutoFit/>
+          </a:bodyPr>
+          <a:lstStyle/>
+          <a:p>
+            <a:r>
+              <a:rPr lang="en-SG" sz="1600" b="1" dirty="0"/>
+              <a:t>Ninja Malware Agent interface </a:t>
+            </a:r>
+          </a:p>
+        </p:txBody>
+      </p:sp>
+      <p:sp>
+        <p:nvSpPr>
+          <p:cNvPr id="11" name="Rectangle 10">
+            <a:extLst>
+              <a:ext uri="{FF2B5EF4-FFF2-40B4-BE49-F238E27FC236}">
+                <a16:creationId xmlns:a16="http://schemas.microsoft.com/office/drawing/2014/main" id="{26723BDB-239A-8AF3-E7D7-1F65B4A1C530}"/>
+              </a:ext>
+            </a:extLst>
+          </p:cNvPr>
+          <p:cNvSpPr/>
+          <p:nvPr/>
+        </p:nvSpPr>
+        <p:spPr>
+          <a:xfrm>
+            <a:off x="3524613" y="3071540"/>
+            <a:ext cx="2737963" cy="428160"/>
+          </a:xfrm>
+          <a:prstGeom prst="rect">
+            <a:avLst/>
+          </a:prstGeom>
+          <a:solidFill>
+            <a:schemeClr val="accent4">
+              <a:lumMod val="20000"/>
+              <a:lumOff val="80000"/>
+            </a:schemeClr>
+          </a:solidFill>
+          <a:ln>
+            <a:prstDash val="sysDash"/>
+          </a:ln>
+        </p:spPr>
+        <p:style>
+          <a:lnRef idx="2">
+            <a:schemeClr val="accent1">
+              <a:shade val="15000"/>
+            </a:schemeClr>
+          </a:lnRef>
+          <a:fillRef idx="1">
+            <a:schemeClr val="accent1"/>
+          </a:fillRef>
+          <a:effectRef idx="0">
+            <a:schemeClr val="accent1"/>
+          </a:effectRef>
+          <a:fontRef idx="minor">
+            <a:schemeClr val="lt1"/>
+          </a:fontRef>
+        </p:style>
+        <p:txBody>
+          <a:bodyPr rtlCol="0" anchor="ctr"/>
+          <a:lstStyle/>
+          <a:p>
+            <a:r>
+              <a:rPr lang="en-SG" sz="1200" b="1" dirty="0">
+                <a:solidFill>
+                  <a:schemeClr val="tx1"/>
+                </a:solidFill>
+              </a:rPr>
+              <a:t>Attack task synchronization (C2) and schedule module </a:t>
+            </a:r>
+          </a:p>
+        </p:txBody>
+      </p:sp>
+      <p:sp>
+        <p:nvSpPr>
+          <p:cNvPr id="12" name="Rectangle 11">
+            <a:extLst>
+              <a:ext uri="{FF2B5EF4-FFF2-40B4-BE49-F238E27FC236}">
+                <a16:creationId xmlns:a16="http://schemas.microsoft.com/office/drawing/2014/main" id="{1333E417-4638-8FDF-7A00-2C7B9DDC95E0}"/>
+              </a:ext>
+            </a:extLst>
+          </p:cNvPr>
+          <p:cNvSpPr/>
+          <p:nvPr/>
+        </p:nvSpPr>
+        <p:spPr>
+          <a:xfrm>
+            <a:off x="3545811" y="3642033"/>
+            <a:ext cx="2716765" cy="428161"/>
+          </a:xfrm>
+          <a:prstGeom prst="rect">
+            <a:avLst/>
+          </a:prstGeom>
+          <a:solidFill>
+            <a:schemeClr val="accent4">
+              <a:lumMod val="20000"/>
+              <a:lumOff val="80000"/>
+            </a:schemeClr>
+          </a:solidFill>
+          <a:ln>
+            <a:prstDash val="sysDash"/>
+          </a:ln>
+        </p:spPr>
+        <p:style>
+          <a:lnRef idx="2">
+            <a:schemeClr val="accent1">
+              <a:shade val="15000"/>
+            </a:schemeClr>
+          </a:lnRef>
+          <a:fillRef idx="1">
+            <a:schemeClr val="accent1"/>
+          </a:fillRef>
+          <a:effectRef idx="0">
+            <a:schemeClr val="accent1"/>
+          </a:effectRef>
+          <a:fontRef idx="minor">
+            <a:schemeClr val="lt1"/>
+          </a:fontRef>
+        </p:style>
+        <p:txBody>
+          <a:bodyPr rtlCol="0" anchor="ctr"/>
+          <a:lstStyle/>
+          <a:p>
+            <a:r>
+              <a:rPr lang="en-SG" sz="1200" b="1" dirty="0">
+                <a:solidFill>
+                  <a:schemeClr val="tx1"/>
+                </a:solidFill>
+              </a:rPr>
+              <a:t>Malicious Action Camouflage and communication encryption </a:t>
+            </a:r>
+          </a:p>
+        </p:txBody>
+      </p:sp>
+      <p:sp>
+        <p:nvSpPr>
+          <p:cNvPr id="13" name="Rectangle 12">
+            <a:extLst>
+              <a:ext uri="{FF2B5EF4-FFF2-40B4-BE49-F238E27FC236}">
+                <a16:creationId xmlns:a16="http://schemas.microsoft.com/office/drawing/2014/main" id="{FBF10D33-2BEA-49D1-ED79-FE5B14E8CFCE}"/>
+              </a:ext>
+            </a:extLst>
+          </p:cNvPr>
+          <p:cNvSpPr/>
+          <p:nvPr/>
+        </p:nvSpPr>
+        <p:spPr>
+          <a:xfrm>
+            <a:off x="3545811" y="4790458"/>
+            <a:ext cx="2716765" cy="370148"/>
+          </a:xfrm>
+          <a:prstGeom prst="rect">
+            <a:avLst/>
+          </a:prstGeom>
+          <a:solidFill>
+            <a:schemeClr val="accent4">
+              <a:lumMod val="20000"/>
+              <a:lumOff val="80000"/>
+            </a:schemeClr>
+          </a:solidFill>
+          <a:ln>
+            <a:prstDash val="sysDash"/>
+          </a:ln>
+        </p:spPr>
+        <p:style>
+          <a:lnRef idx="2">
+            <a:schemeClr val="accent1">
+              <a:shade val="15000"/>
+            </a:schemeClr>
+          </a:lnRef>
+          <a:fillRef idx="1">
+            <a:schemeClr val="accent1"/>
+          </a:fillRef>
+          <a:effectRef idx="0">
+            <a:schemeClr val="accent1"/>
+          </a:effectRef>
+          <a:fontRef idx="minor">
+            <a:schemeClr val="lt1"/>
+          </a:fontRef>
+        </p:style>
+        <p:txBody>
+          <a:bodyPr rtlCol="0" anchor="ctr"/>
+          <a:lstStyle/>
+          <a:p>
+            <a:r>
+              <a:rPr lang="en-SG" sz="1200" b="1" dirty="0">
+                <a:solidFill>
+                  <a:schemeClr val="tx1"/>
+                </a:solidFill>
+              </a:rPr>
+              <a:t>Self-protection watchdog module </a:t>
+            </a:r>
+          </a:p>
+        </p:txBody>
+      </p:sp>
+      <p:sp>
+        <p:nvSpPr>
+          <p:cNvPr id="14" name="Rectangle 13">
+            <a:extLst>
+              <a:ext uri="{FF2B5EF4-FFF2-40B4-BE49-F238E27FC236}">
+                <a16:creationId xmlns:a16="http://schemas.microsoft.com/office/drawing/2014/main" id="{75458D44-E310-FA7F-C0DD-279BD436222C}"/>
+              </a:ext>
+            </a:extLst>
+          </p:cNvPr>
+          <p:cNvSpPr/>
+          <p:nvPr/>
+        </p:nvSpPr>
+        <p:spPr>
+          <a:xfrm>
+            <a:off x="6870050" y="2574217"/>
+            <a:ext cx="3375293" cy="2697821"/>
+          </a:xfrm>
+          <a:prstGeom prst="rect">
+            <a:avLst/>
+          </a:prstGeom>
+          <a:solidFill>
+            <a:schemeClr val="accent6">
+              <a:lumMod val="20000"/>
+              <a:lumOff val="80000"/>
+            </a:schemeClr>
+          </a:solidFill>
+        </p:spPr>
+        <p:style>
+          <a:lnRef idx="2">
+            <a:schemeClr val="accent1">
+              <a:shade val="15000"/>
+            </a:schemeClr>
+          </a:lnRef>
+          <a:fillRef idx="1">
+            <a:schemeClr val="accent1"/>
+          </a:fillRef>
+          <a:effectRef idx="0">
+            <a:schemeClr val="accent1"/>
+          </a:effectRef>
+          <a:fontRef idx="minor">
+            <a:schemeClr val="lt1"/>
+          </a:fontRef>
+        </p:style>
+        <p:txBody>
+          <a:bodyPr rtlCol="0" anchor="ctr"/>
+          <a:lstStyle/>
+          <a:p>
+            <a:pPr algn="ctr"/>
+            <a:endParaRPr lang="en-SG" dirty="0"/>
+          </a:p>
+        </p:txBody>
+      </p:sp>
+      <p:sp>
+        <p:nvSpPr>
+          <p:cNvPr id="15" name="TextBox 14">
+            <a:extLst>
+              <a:ext uri="{FF2B5EF4-FFF2-40B4-BE49-F238E27FC236}">
+                <a16:creationId xmlns:a16="http://schemas.microsoft.com/office/drawing/2014/main" id="{0A7BDC0E-29A5-56DB-82A7-F84D2DBAA484}"/>
+              </a:ext>
+            </a:extLst>
+          </p:cNvPr>
+          <p:cNvSpPr txBox="1"/>
+          <p:nvPr/>
+        </p:nvSpPr>
+        <p:spPr>
+          <a:xfrm>
+            <a:off x="6987547" y="2585704"/>
+            <a:ext cx="3079728" cy="584775"/>
+          </a:xfrm>
+          <a:prstGeom prst="rect">
+            <a:avLst/>
+          </a:prstGeom>
+          <a:noFill/>
+        </p:spPr>
+        <p:txBody>
+          <a:bodyPr wrap="square" rtlCol="0">
+            <a:spAutoFit/>
+          </a:bodyPr>
+          <a:lstStyle/>
+          <a:p>
+            <a:r>
+              <a:rPr lang="en-SG" sz="1600" b="1" dirty="0">
+                <a:solidFill>
+                  <a:schemeClr val="tx1"/>
+                </a:solidFill>
+              </a:rPr>
+              <a:t>Command and Control (C2)</a:t>
+            </a:r>
+            <a:r>
+              <a:rPr lang="en-US" sz="1600" b="1" dirty="0">
+                <a:solidFill>
+                  <a:schemeClr val="tx1"/>
+                </a:solidFill>
+              </a:rPr>
+              <a:t> Orchestrator </a:t>
+            </a:r>
+            <a:r>
+              <a:rPr lang="en-SG" sz="1600" b="1" dirty="0"/>
+              <a:t> </a:t>
+            </a:r>
+          </a:p>
+        </p:txBody>
+      </p:sp>
+      <p:cxnSp>
+        <p:nvCxnSpPr>
+          <p:cNvPr id="20" name="Connector: Elbow 19">
+            <a:extLst>
+              <a:ext uri="{FF2B5EF4-FFF2-40B4-BE49-F238E27FC236}">
+                <a16:creationId xmlns:a16="http://schemas.microsoft.com/office/drawing/2014/main" id="{36D09372-D35E-250D-F599-A7F3CDF6B256}"/>
+              </a:ext>
+            </a:extLst>
+          </p:cNvPr>
+          <p:cNvCxnSpPr>
+            <a:cxnSpLocks/>
+            <a:stCxn id="3" idx="2"/>
+            <a:endCxn id="5" idx="0"/>
+          </p:cNvCxnSpPr>
+          <p:nvPr/>
+        </p:nvCxnSpPr>
+        <p:spPr>
+          <a:xfrm rot="5400000">
+            <a:off x="2496035" y="911959"/>
+            <a:ext cx="818470" cy="2577550"/>
+          </a:xfrm>
+          <a:prstGeom prst="bentConnector3">
+            <a:avLst>
+              <a:gd name="adj1" fmla="val 50000"/>
+            </a:avLst>
+          </a:prstGeom>
+          <a:ln>
+            <a:tailEnd type="triangle"/>
+          </a:ln>
+        </p:spPr>
+        <p:style>
+          <a:lnRef idx="2">
+            <a:schemeClr val="dk1"/>
+          </a:lnRef>
+          <a:fillRef idx="0">
+            <a:schemeClr val="dk1"/>
+          </a:fillRef>
+          <a:effectRef idx="1">
+            <a:schemeClr val="dk1"/>
+          </a:effectRef>
+          <a:fontRef idx="minor">
+            <a:schemeClr val="tx1"/>
+          </a:fontRef>
+        </p:style>
+      </p:cxnSp>
+      <p:cxnSp>
+        <p:nvCxnSpPr>
+          <p:cNvPr id="21" name="Straight Arrow Connector 20">
+            <a:extLst>
+              <a:ext uri="{FF2B5EF4-FFF2-40B4-BE49-F238E27FC236}">
+                <a16:creationId xmlns:a16="http://schemas.microsoft.com/office/drawing/2014/main" id="{09D72EA5-CA97-0584-7A9C-2C3953715A24}"/>
+              </a:ext>
+            </a:extLst>
+          </p:cNvPr>
+          <p:cNvCxnSpPr>
+            <a:cxnSpLocks/>
+          </p:cNvCxnSpPr>
+          <p:nvPr/>
+        </p:nvCxnSpPr>
+        <p:spPr>
+          <a:xfrm flipH="1">
+            <a:off x="4744851" y="1772161"/>
+            <a:ext cx="6960" cy="822966"/>
+          </a:xfrm>
+          <a:prstGeom prst="straightConnector1">
+            <a:avLst/>
+          </a:prstGeom>
+          <a:ln>
+            <a:solidFill>
+              <a:schemeClr val="tx1"/>
+            </a:solidFill>
+            <a:tailEnd type="triangle"/>
+          </a:ln>
+        </p:spPr>
+        <p:style>
+          <a:lnRef idx="2">
+            <a:schemeClr val="accent1"/>
+          </a:lnRef>
+          <a:fillRef idx="0">
+            <a:schemeClr val="accent1"/>
+          </a:fillRef>
+          <a:effectRef idx="1">
+            <a:schemeClr val="accent1"/>
+          </a:effectRef>
+          <a:fontRef idx="minor">
+            <a:schemeClr val="tx1"/>
+          </a:fontRef>
+        </p:style>
+      </p:cxnSp>
+      <p:cxnSp>
+        <p:nvCxnSpPr>
+          <p:cNvPr id="22" name="Connector: Elbow 21">
+            <a:extLst>
+              <a:ext uri="{FF2B5EF4-FFF2-40B4-BE49-F238E27FC236}">
+                <a16:creationId xmlns:a16="http://schemas.microsoft.com/office/drawing/2014/main" id="{E969037D-25AF-0565-D62A-D611A235E79D}"/>
+              </a:ext>
+            </a:extLst>
+          </p:cNvPr>
+          <p:cNvCxnSpPr>
+            <a:cxnSpLocks/>
+            <a:stCxn id="2" idx="2"/>
+            <a:endCxn id="14" idx="0"/>
+          </p:cNvCxnSpPr>
+          <p:nvPr/>
+        </p:nvCxnSpPr>
+        <p:spPr>
+          <a:xfrm rot="16200000" flipH="1">
+            <a:off x="6626853" y="643373"/>
+            <a:ext cx="781960" cy="3079728"/>
+          </a:xfrm>
+          <a:prstGeom prst="bentConnector3">
+            <a:avLst>
+              <a:gd name="adj1" fmla="val 50000"/>
+            </a:avLst>
+          </a:prstGeom>
+          <a:ln>
+            <a:tailEnd type="triangle"/>
+          </a:ln>
+        </p:spPr>
+        <p:style>
+          <a:lnRef idx="2">
+            <a:schemeClr val="dk1"/>
+          </a:lnRef>
+          <a:fillRef idx="0">
+            <a:schemeClr val="dk1"/>
+          </a:fillRef>
+          <a:effectRef idx="1">
+            <a:schemeClr val="dk1"/>
+          </a:effectRef>
+          <a:fontRef idx="minor">
+            <a:schemeClr val="tx1"/>
+          </a:fontRef>
+        </p:style>
+      </p:cxnSp>
+      <p:sp>
+        <p:nvSpPr>
+          <p:cNvPr id="23" name="TextBox 22">
+            <a:extLst>
+              <a:ext uri="{FF2B5EF4-FFF2-40B4-BE49-F238E27FC236}">
+                <a16:creationId xmlns:a16="http://schemas.microsoft.com/office/drawing/2014/main" id="{D1B60E67-C693-8AC9-0543-9A41EA7A2C8C}"/>
+              </a:ext>
+            </a:extLst>
+          </p:cNvPr>
+          <p:cNvSpPr txBox="1"/>
+          <p:nvPr/>
+        </p:nvSpPr>
+        <p:spPr>
+          <a:xfrm>
+            <a:off x="256168" y="898717"/>
+            <a:ext cx="1683505" cy="307777"/>
+          </a:xfrm>
+          <a:prstGeom prst="rect">
+            <a:avLst/>
+          </a:prstGeom>
+          <a:noFill/>
+        </p:spPr>
+        <p:txBody>
+          <a:bodyPr wrap="square" rtlCol="0">
+            <a:spAutoFit/>
+          </a:bodyPr>
+          <a:lstStyle/>
+          <a:p>
+            <a:r>
+              <a:rPr lang="en-SG" sz="1400" b="1" dirty="0">
+                <a:solidFill>
+                  <a:schemeClr val="tx1">
+                    <a:lumMod val="50000"/>
+                    <a:lumOff val="50000"/>
+                  </a:schemeClr>
+                </a:solidFill>
+              </a:rPr>
+              <a:t>System Structure </a:t>
+            </a:r>
+          </a:p>
+        </p:txBody>
+      </p:sp>
+      <p:sp>
+        <p:nvSpPr>
+          <p:cNvPr id="25" name="TextBox 24">
+            <a:extLst>
+              <a:ext uri="{FF2B5EF4-FFF2-40B4-BE49-F238E27FC236}">
+                <a16:creationId xmlns:a16="http://schemas.microsoft.com/office/drawing/2014/main" id="{52ED8240-E76E-7481-AE52-C196923D223A}"/>
+              </a:ext>
+            </a:extLst>
+          </p:cNvPr>
+          <p:cNvSpPr txBox="1"/>
+          <p:nvPr/>
+        </p:nvSpPr>
+        <p:spPr>
+          <a:xfrm>
+            <a:off x="2869624" y="976554"/>
+            <a:ext cx="3070973" cy="923330"/>
+          </a:xfrm>
+          <a:prstGeom prst="rect">
+            <a:avLst/>
+          </a:prstGeom>
+          <a:noFill/>
+        </p:spPr>
+        <p:txBody>
+          <a:bodyPr wrap="square" rtlCol="0">
+            <a:spAutoFit/>
+          </a:bodyPr>
+          <a:lstStyle/>
+          <a:p>
+            <a:pPr algn="ctr"/>
+            <a:r>
+              <a:rPr lang="en-SG" sz="1800" b="1" dirty="0">
+                <a:solidFill>
+                  <a:schemeClr val="bg1"/>
+                </a:solidFill>
+              </a:rPr>
+              <a:t>Ninja C2-Malware Cyber Attack Simulation System </a:t>
+            </a:r>
+          </a:p>
+          <a:p>
+            <a:pPr algn="ctr"/>
+            <a:endParaRPr lang="en-SG" dirty="0"/>
+          </a:p>
+        </p:txBody>
+      </p:sp>
+      <p:pic>
+        <p:nvPicPr>
+          <p:cNvPr id="28" name="Picture 27">
+            <a:extLst>
+              <a:ext uri="{FF2B5EF4-FFF2-40B4-BE49-F238E27FC236}">
+                <a16:creationId xmlns:a16="http://schemas.microsoft.com/office/drawing/2014/main" id="{41EFD07B-BF8C-A2B2-1C4C-EFAD5F1B6D8E}"/>
+              </a:ext>
+            </a:extLst>
+          </p:cNvPr>
+          <p:cNvPicPr>
+            <a:picLocks noChangeAspect="1"/>
+          </p:cNvPicPr>
+          <p:nvPr/>
+        </p:nvPicPr>
+        <p:blipFill>
+          <a:blip r:embed="rId2"/>
+          <a:stretch>
+            <a:fillRect/>
+          </a:stretch>
+        </p:blipFill>
+        <p:spPr>
+          <a:xfrm>
+            <a:off x="5878879" y="939064"/>
+            <a:ext cx="984211" cy="757842"/>
+          </a:xfrm>
+          <a:prstGeom prst="rect">
+            <a:avLst/>
+          </a:prstGeom>
+        </p:spPr>
+      </p:pic>
+      <p:sp>
+        <p:nvSpPr>
+          <p:cNvPr id="31" name="Rectangle 30">
+            <a:extLst>
+              <a:ext uri="{FF2B5EF4-FFF2-40B4-BE49-F238E27FC236}">
+                <a16:creationId xmlns:a16="http://schemas.microsoft.com/office/drawing/2014/main" id="{9FF40AD3-2E45-95A6-589D-149923FF0D5D}"/>
+              </a:ext>
+            </a:extLst>
+          </p:cNvPr>
+          <p:cNvSpPr/>
+          <p:nvPr/>
+        </p:nvSpPr>
+        <p:spPr>
+          <a:xfrm>
+            <a:off x="412809" y="3796339"/>
+            <a:ext cx="2253399" cy="307912"/>
+          </a:xfrm>
+          <a:prstGeom prst="rect">
+            <a:avLst/>
+          </a:prstGeom>
+          <a:solidFill>
+            <a:schemeClr val="accent2">
+              <a:lumMod val="40000"/>
+              <a:lumOff val="60000"/>
+            </a:schemeClr>
+          </a:solidFill>
+          <a:ln>
+            <a:solidFill>
+              <a:srgbClr val="C00000"/>
+            </a:solidFill>
+            <a:prstDash val="sysDash"/>
+          </a:ln>
+        </p:spPr>
+        <p:style>
+          <a:lnRef idx="2">
+            <a:schemeClr val="accent1">
+              <a:shade val="15000"/>
+            </a:schemeClr>
+          </a:lnRef>
+          <a:fillRef idx="1">
+            <a:schemeClr val="accent1"/>
+          </a:fillRef>
+          <a:effectRef idx="0">
+            <a:schemeClr val="accent1"/>
+          </a:effectRef>
+          <a:fontRef idx="minor">
+            <a:schemeClr val="lt1"/>
+          </a:fontRef>
+        </p:style>
+        <p:txBody>
+          <a:bodyPr rtlCol="0" anchor="ctr"/>
+          <a:lstStyle/>
+          <a:p>
+            <a:r>
+              <a:rPr lang="en-SG" sz="1200" b="1" dirty="0">
+                <a:solidFill>
+                  <a:srgbClr val="C00000"/>
+                </a:solidFill>
+              </a:rPr>
+              <a:t>Scan and eavesdrop Module</a:t>
+            </a:r>
+          </a:p>
+        </p:txBody>
+      </p:sp>
+      <p:sp>
+        <p:nvSpPr>
+          <p:cNvPr id="32" name="Rectangle 31">
+            <a:extLst>
+              <a:ext uri="{FF2B5EF4-FFF2-40B4-BE49-F238E27FC236}">
+                <a16:creationId xmlns:a16="http://schemas.microsoft.com/office/drawing/2014/main" id="{3787030E-A280-EA36-EAAB-DD730AB7714E}"/>
+              </a:ext>
+            </a:extLst>
+          </p:cNvPr>
+          <p:cNvSpPr/>
+          <p:nvPr/>
+        </p:nvSpPr>
+        <p:spPr>
+          <a:xfrm>
+            <a:off x="412809" y="4232020"/>
+            <a:ext cx="2253399" cy="307912"/>
+          </a:xfrm>
+          <a:prstGeom prst="rect">
+            <a:avLst/>
+          </a:prstGeom>
+          <a:solidFill>
+            <a:schemeClr val="accent2">
+              <a:lumMod val="40000"/>
+              <a:lumOff val="60000"/>
+            </a:schemeClr>
+          </a:solidFill>
+          <a:ln>
+            <a:solidFill>
+              <a:srgbClr val="C00000"/>
+            </a:solidFill>
+            <a:prstDash val="sysDash"/>
+          </a:ln>
+        </p:spPr>
+        <p:style>
+          <a:lnRef idx="2">
+            <a:schemeClr val="accent1">
+              <a:shade val="15000"/>
+            </a:schemeClr>
+          </a:lnRef>
+          <a:fillRef idx="1">
+            <a:schemeClr val="accent1"/>
+          </a:fillRef>
+          <a:effectRef idx="0">
+            <a:schemeClr val="accent1"/>
+          </a:effectRef>
+          <a:fontRef idx="minor">
+            <a:schemeClr val="lt1"/>
+          </a:fontRef>
+        </p:style>
+        <p:txBody>
+          <a:bodyPr rtlCol="0" anchor="ctr"/>
+          <a:lstStyle/>
+          <a:p>
+            <a:r>
+              <a:rPr lang="en-SG" sz="1200" b="1" dirty="0">
+                <a:solidFill>
+                  <a:srgbClr val="C00000"/>
+                </a:solidFill>
+              </a:rPr>
+              <a:t>Denial of Service Module</a:t>
+            </a:r>
+          </a:p>
+        </p:txBody>
+      </p:sp>
+      <p:sp>
+        <p:nvSpPr>
+          <p:cNvPr id="33" name="Rectangle 32">
+            <a:extLst>
+              <a:ext uri="{FF2B5EF4-FFF2-40B4-BE49-F238E27FC236}">
+                <a16:creationId xmlns:a16="http://schemas.microsoft.com/office/drawing/2014/main" id="{5691DFF1-58BC-1A9A-0A49-DFFB3FBD5681}"/>
+              </a:ext>
+            </a:extLst>
+          </p:cNvPr>
+          <p:cNvSpPr/>
+          <p:nvPr/>
+        </p:nvSpPr>
+        <p:spPr>
+          <a:xfrm>
+            <a:off x="412809" y="4670003"/>
+            <a:ext cx="2253399" cy="414213"/>
+          </a:xfrm>
+          <a:prstGeom prst="rect">
+            <a:avLst/>
+          </a:prstGeom>
+          <a:solidFill>
+            <a:schemeClr val="accent2">
+              <a:lumMod val="40000"/>
+              <a:lumOff val="60000"/>
+            </a:schemeClr>
+          </a:solidFill>
+          <a:ln>
+            <a:solidFill>
+              <a:srgbClr val="C00000"/>
+            </a:solidFill>
+            <a:prstDash val="sysDash"/>
+          </a:ln>
+        </p:spPr>
+        <p:style>
+          <a:lnRef idx="2">
+            <a:schemeClr val="accent1">
+              <a:shade val="15000"/>
+            </a:schemeClr>
+          </a:lnRef>
+          <a:fillRef idx="1">
+            <a:schemeClr val="accent1"/>
+          </a:fillRef>
+          <a:effectRef idx="0">
+            <a:schemeClr val="accent1"/>
+          </a:effectRef>
+          <a:fontRef idx="minor">
+            <a:schemeClr val="lt1"/>
+          </a:fontRef>
+        </p:style>
+        <p:txBody>
+          <a:bodyPr rtlCol="0" anchor="ctr"/>
+          <a:lstStyle/>
+          <a:p>
+            <a:r>
+              <a:rPr lang="en-SG" sz="1200" b="1" dirty="0">
+                <a:solidFill>
+                  <a:srgbClr val="C00000"/>
+                </a:solidFill>
+              </a:rPr>
+              <a:t>Destruction and phishing Attack Module</a:t>
+            </a:r>
+          </a:p>
+        </p:txBody>
+      </p:sp>
+      <p:sp>
+        <p:nvSpPr>
+          <p:cNvPr id="35" name="Rectangle 34">
+            <a:extLst>
+              <a:ext uri="{FF2B5EF4-FFF2-40B4-BE49-F238E27FC236}">
+                <a16:creationId xmlns:a16="http://schemas.microsoft.com/office/drawing/2014/main" id="{01FB8868-8E10-0716-B912-039EAB059009}"/>
+              </a:ext>
+            </a:extLst>
+          </p:cNvPr>
+          <p:cNvSpPr/>
+          <p:nvPr/>
+        </p:nvSpPr>
+        <p:spPr>
+          <a:xfrm>
+            <a:off x="3545811" y="4239378"/>
+            <a:ext cx="2716765" cy="428161"/>
+          </a:xfrm>
+          <a:prstGeom prst="rect">
+            <a:avLst/>
+          </a:prstGeom>
+          <a:solidFill>
+            <a:schemeClr val="accent4">
+              <a:lumMod val="20000"/>
+              <a:lumOff val="80000"/>
+            </a:schemeClr>
+          </a:solidFill>
+          <a:ln>
+            <a:prstDash val="sysDash"/>
+          </a:ln>
+        </p:spPr>
+        <p:style>
+          <a:lnRef idx="2">
+            <a:schemeClr val="accent1">
+              <a:shade val="15000"/>
+            </a:schemeClr>
+          </a:lnRef>
+          <a:fillRef idx="1">
+            <a:schemeClr val="accent1"/>
+          </a:fillRef>
+          <a:effectRef idx="0">
+            <a:schemeClr val="accent1"/>
+          </a:effectRef>
+          <a:fontRef idx="minor">
+            <a:schemeClr val="lt1"/>
+          </a:fontRef>
+        </p:style>
+        <p:txBody>
+          <a:bodyPr rtlCol="0" anchor="ctr"/>
+          <a:lstStyle/>
+          <a:p>
+            <a:r>
+              <a:rPr lang="en-SG" sz="1200" b="1" dirty="0">
+                <a:solidFill>
+                  <a:schemeClr val="tx1"/>
+                </a:solidFill>
+              </a:rPr>
+              <a:t>Malicious Action module assemble function </a:t>
+            </a:r>
+          </a:p>
+        </p:txBody>
+      </p:sp>
+      <p:pic>
+        <p:nvPicPr>
+          <p:cNvPr id="40" name="Picture 39">
+            <a:extLst>
+              <a:ext uri="{FF2B5EF4-FFF2-40B4-BE49-F238E27FC236}">
+                <a16:creationId xmlns:a16="http://schemas.microsoft.com/office/drawing/2014/main" id="{677C29A9-81B5-5C1E-CD32-E6FB7A117031}"/>
+              </a:ext>
+            </a:extLst>
+          </p:cNvPr>
+          <p:cNvPicPr>
+            <a:picLocks noChangeAspect="1"/>
+          </p:cNvPicPr>
+          <p:nvPr/>
+        </p:nvPicPr>
+        <p:blipFill>
+          <a:blip r:embed="rId3"/>
+          <a:stretch>
+            <a:fillRect/>
+          </a:stretch>
+        </p:blipFill>
+        <p:spPr>
+          <a:xfrm>
+            <a:off x="8587836" y="3186811"/>
+            <a:ext cx="1527011" cy="1084178"/>
+          </a:xfrm>
+          <a:prstGeom prst="rect">
+            <a:avLst/>
+          </a:prstGeom>
+          <a:ln w="9525">
+            <a:solidFill>
+              <a:schemeClr val="tx1"/>
+            </a:solidFill>
+          </a:ln>
+        </p:spPr>
+      </p:pic>
+      <p:sp>
+        <p:nvSpPr>
+          <p:cNvPr id="41" name="Rectangle 40">
+            <a:extLst>
+              <a:ext uri="{FF2B5EF4-FFF2-40B4-BE49-F238E27FC236}">
+                <a16:creationId xmlns:a16="http://schemas.microsoft.com/office/drawing/2014/main" id="{AC18D5AC-16AD-97AD-FBFE-3BF12EBEDA43}"/>
+              </a:ext>
+            </a:extLst>
+          </p:cNvPr>
+          <p:cNvSpPr/>
+          <p:nvPr/>
+        </p:nvSpPr>
+        <p:spPr>
+          <a:xfrm>
+            <a:off x="8587836" y="4307213"/>
+            <a:ext cx="1627045" cy="446330"/>
+          </a:xfrm>
+          <a:prstGeom prst="rect">
+            <a:avLst/>
+          </a:prstGeom>
+          <a:noFill/>
+          <a:ln>
+            <a:noFill/>
+            <a:prstDash val="sysDash"/>
+          </a:ln>
+        </p:spPr>
+        <p:style>
+          <a:lnRef idx="2">
+            <a:schemeClr val="accent1">
+              <a:shade val="15000"/>
+            </a:schemeClr>
+          </a:lnRef>
+          <a:fillRef idx="1">
+            <a:schemeClr val="accent1"/>
+          </a:fillRef>
+          <a:effectRef idx="0">
+            <a:schemeClr val="accent1"/>
+          </a:effectRef>
+          <a:fontRef idx="minor">
+            <a:schemeClr val="lt1"/>
+          </a:fontRef>
+        </p:style>
+        <p:txBody>
+          <a:bodyPr rtlCol="0" anchor="ctr"/>
+          <a:lstStyle/>
+          <a:p>
+            <a:r>
+              <a:rPr lang="en-SG" sz="1200" b="1" dirty="0">
+                <a:solidFill>
+                  <a:schemeClr val="tx1"/>
+                </a:solidFill>
+              </a:rPr>
+              <a:t>Attack tasks assign  bulletin board</a:t>
+            </a:r>
+          </a:p>
+        </p:txBody>
+      </p:sp>
+      <p:pic>
+        <p:nvPicPr>
+          <p:cNvPr id="44" name="Picture 43">
+            <a:extLst>
+              <a:ext uri="{FF2B5EF4-FFF2-40B4-BE49-F238E27FC236}">
+                <a16:creationId xmlns:a16="http://schemas.microsoft.com/office/drawing/2014/main" id="{17BA3D5D-A44D-78B4-E1CC-BCD2CB38B67B}"/>
+              </a:ext>
+            </a:extLst>
+          </p:cNvPr>
+          <p:cNvPicPr>
+            <a:picLocks noChangeAspect="1"/>
+          </p:cNvPicPr>
+          <p:nvPr/>
+        </p:nvPicPr>
+        <p:blipFill>
+          <a:blip r:embed="rId4"/>
+          <a:stretch>
+            <a:fillRect/>
+          </a:stretch>
+        </p:blipFill>
+        <p:spPr>
+          <a:xfrm>
+            <a:off x="6978374" y="3193830"/>
+            <a:ext cx="1440709" cy="1082957"/>
+          </a:xfrm>
+          <a:prstGeom prst="rect">
+            <a:avLst/>
+          </a:prstGeom>
+          <a:ln w="6350">
+            <a:solidFill>
+              <a:schemeClr val="tx1"/>
+            </a:solidFill>
+          </a:ln>
+        </p:spPr>
+      </p:pic>
+      <p:sp>
+        <p:nvSpPr>
+          <p:cNvPr id="45" name="Rectangle 44">
+            <a:extLst>
+              <a:ext uri="{FF2B5EF4-FFF2-40B4-BE49-F238E27FC236}">
+                <a16:creationId xmlns:a16="http://schemas.microsoft.com/office/drawing/2014/main" id="{9C47021B-B2F1-60F1-7F9F-1ED969D47A5F}"/>
+              </a:ext>
+            </a:extLst>
+          </p:cNvPr>
+          <p:cNvSpPr/>
+          <p:nvPr/>
+        </p:nvSpPr>
+        <p:spPr>
+          <a:xfrm>
+            <a:off x="6917412" y="4300138"/>
+            <a:ext cx="1627045" cy="446330"/>
+          </a:xfrm>
+          <a:prstGeom prst="rect">
+            <a:avLst/>
+          </a:prstGeom>
+          <a:noFill/>
+          <a:ln>
+            <a:noFill/>
+            <a:prstDash val="sysDash"/>
+          </a:ln>
+        </p:spPr>
+        <p:style>
+          <a:lnRef idx="2">
+            <a:schemeClr val="accent1">
+              <a:shade val="15000"/>
+            </a:schemeClr>
+          </a:lnRef>
+          <a:fillRef idx="1">
+            <a:schemeClr val="accent1"/>
+          </a:fillRef>
+          <a:effectRef idx="0">
+            <a:schemeClr val="accent1"/>
+          </a:effectRef>
+          <a:fontRef idx="minor">
+            <a:schemeClr val="lt1"/>
+          </a:fontRef>
+        </p:style>
+        <p:txBody>
+          <a:bodyPr rtlCol="0" anchor="ctr"/>
+          <a:lstStyle/>
+          <a:p>
+            <a:r>
+              <a:rPr lang="en-SG" sz="1200" b="1" dirty="0">
+                <a:solidFill>
+                  <a:schemeClr val="tx1"/>
+                </a:solidFill>
+              </a:rPr>
+              <a:t>Malwares management board</a:t>
+            </a:r>
+          </a:p>
+        </p:txBody>
+      </p:sp>
+      <p:sp>
+        <p:nvSpPr>
+          <p:cNvPr id="46" name="Rectangle 45">
+            <a:extLst>
+              <a:ext uri="{FF2B5EF4-FFF2-40B4-BE49-F238E27FC236}">
+                <a16:creationId xmlns:a16="http://schemas.microsoft.com/office/drawing/2014/main" id="{75E005C0-1E01-FCFC-9495-86306FE30701}"/>
+              </a:ext>
+            </a:extLst>
+          </p:cNvPr>
+          <p:cNvSpPr/>
+          <p:nvPr/>
+        </p:nvSpPr>
+        <p:spPr>
+          <a:xfrm>
+            <a:off x="6999135" y="4789908"/>
+            <a:ext cx="3068140" cy="370148"/>
+          </a:xfrm>
+          <a:prstGeom prst="rect">
+            <a:avLst/>
+          </a:prstGeom>
+          <a:solidFill>
+            <a:schemeClr val="accent4">
+              <a:lumMod val="20000"/>
+              <a:lumOff val="80000"/>
+            </a:schemeClr>
+          </a:solidFill>
+          <a:ln>
+            <a:prstDash val="sysDash"/>
+          </a:ln>
+        </p:spPr>
+        <p:style>
+          <a:lnRef idx="2">
+            <a:schemeClr val="accent1">
+              <a:shade val="15000"/>
+            </a:schemeClr>
+          </a:lnRef>
+          <a:fillRef idx="1">
+            <a:schemeClr val="accent1"/>
+          </a:fillRef>
+          <a:effectRef idx="0">
+            <a:schemeClr val="accent1"/>
+          </a:effectRef>
+          <a:fontRef idx="minor">
+            <a:schemeClr val="lt1"/>
+          </a:fontRef>
+        </p:style>
+        <p:txBody>
+          <a:bodyPr rtlCol="0" anchor="ctr"/>
+          <a:lstStyle/>
+          <a:p>
+            <a:r>
+              <a:rPr lang="en-SG" sz="1200" b="1">
+                <a:solidFill>
+                  <a:schemeClr val="tx1"/>
+                </a:solidFill>
+              </a:rPr>
+              <a:t>Malware tasks </a:t>
+            </a:r>
+            <a:r>
+              <a:rPr lang="en-SG" sz="1200" b="1" dirty="0">
+                <a:solidFill>
+                  <a:schemeClr val="tx1"/>
+                </a:solidFill>
+              </a:rPr>
+              <a:t>management module and result archive data base.</a:t>
+            </a:r>
+          </a:p>
+        </p:txBody>
+      </p:sp>
     </p:spTree>
     <p:extLst>
       <p:ext uri="{BB962C8B-B14F-4D97-AF65-F5344CB8AC3E}">

</xml_diff>

<commit_message>
Used the constants module.
</commit_message>
<xml_diff>
--- a/doc/designDoc.pptx
+++ b/doc/designDoc.pptx
@@ -3594,7 +3594,7 @@
         </p:nvSpPr>
         <p:spPr>
           <a:xfrm>
-            <a:off x="5429557" y="1697664"/>
+            <a:off x="6120673" y="1676399"/>
             <a:ext cx="96824" cy="94593"/>
           </a:xfrm>
           <a:prstGeom prst="rect">
@@ -3640,7 +3640,7 @@
         </p:nvSpPr>
         <p:spPr>
           <a:xfrm>
-            <a:off x="4145633" y="1696906"/>
+            <a:off x="4836749" y="1675641"/>
             <a:ext cx="96824" cy="94593"/>
           </a:xfrm>
           <a:prstGeom prst="rect">
@@ -3686,7 +3686,7 @@
         </p:nvSpPr>
         <p:spPr>
           <a:xfrm>
-            <a:off x="2931342" y="792720"/>
+            <a:off x="3622458" y="771455"/>
             <a:ext cx="4048489" cy="1012571"/>
           </a:xfrm>
           <a:prstGeom prst="rect">
@@ -3741,7 +3741,7 @@
         </p:nvSpPr>
         <p:spPr>
           <a:xfrm>
-            <a:off x="290824" y="2609969"/>
+            <a:off x="981940" y="2588704"/>
             <a:ext cx="2651342" cy="2673556"/>
           </a:xfrm>
           <a:prstGeom prst="rect">
@@ -3793,7 +3793,7 @@
         </p:nvSpPr>
         <p:spPr>
           <a:xfrm>
-            <a:off x="305204" y="2641646"/>
+            <a:off x="996320" y="2620381"/>
             <a:ext cx="2544369" cy="584775"/>
           </a:xfrm>
           <a:prstGeom prst="rect">
@@ -3809,7 +3809,7 @@
           <a:p>
             <a:r>
               <a:rPr lang="en-SG" sz="1600" b="1" dirty="0"/>
-              <a:t>Malicious Activities module Repository </a:t>
+              <a:t>Malicious Activities Plugin Repository </a:t>
             </a:r>
           </a:p>
         </p:txBody>
@@ -3828,7 +3828,7 @@
         </p:nvSpPr>
         <p:spPr>
           <a:xfrm>
-            <a:off x="412809" y="3275857"/>
+            <a:off x="1103925" y="3254592"/>
             <a:ext cx="2253399" cy="414661"/>
           </a:xfrm>
           <a:prstGeom prst="rect">
@@ -3873,7 +3873,7 @@
                   <a:srgbClr val="C00000"/>
                 </a:solidFill>
               </a:rPr>
-              <a:t>Credentials Compromise Attack Module  </a:t>
+              <a:t>Credentials compromise attack modules  </a:t>
             </a:r>
           </a:p>
         </p:txBody>
@@ -3892,7 +3892,7 @@
         </p:nvSpPr>
         <p:spPr>
           <a:xfrm>
-            <a:off x="3381153" y="2585704"/>
+            <a:off x="4072269" y="2564439"/>
             <a:ext cx="3115200" cy="2697821"/>
           </a:xfrm>
           <a:prstGeom prst="rect">
@@ -3941,7 +3941,7 @@
         </p:nvSpPr>
         <p:spPr>
           <a:xfrm>
-            <a:off x="3417114" y="2626582"/>
+            <a:off x="4108230" y="2605317"/>
             <a:ext cx="3079239" cy="338554"/>
           </a:xfrm>
           <a:prstGeom prst="rect">
@@ -3957,7 +3957,7 @@
           <a:p>
             <a:r>
               <a:rPr lang="en-SG" sz="1600" b="1" dirty="0"/>
-              <a:t>Ninja Malware Agent interface </a:t>
+              <a:t>Ninja Malware Agent Interface </a:t>
             </a:r>
           </a:p>
         </p:txBody>
@@ -3976,7 +3976,7 @@
         </p:nvSpPr>
         <p:spPr>
           <a:xfrm>
-            <a:off x="3524613" y="3071540"/>
+            <a:off x="4215729" y="3050275"/>
             <a:ext cx="2737963" cy="428160"/>
           </a:xfrm>
           <a:prstGeom prst="rect">
@@ -4037,7 +4037,7 @@
         </p:nvSpPr>
         <p:spPr>
           <a:xfrm>
-            <a:off x="3545811" y="3642033"/>
+            <a:off x="4236927" y="3620768"/>
             <a:ext cx="2716765" cy="428161"/>
           </a:xfrm>
           <a:prstGeom prst="rect">
@@ -4079,7 +4079,7 @@
                   <a:schemeClr val="tx1"/>
                 </a:solidFill>
               </a:rPr>
-              <a:t>Malicious Action Camouflage and communication encryption </a:t>
+              <a:t>Malicious action camouflage and communication encryption </a:t>
             </a:r>
           </a:p>
         </p:txBody>
@@ -4098,7 +4098,7 @@
         </p:nvSpPr>
         <p:spPr>
           <a:xfrm>
-            <a:off x="3545811" y="4790458"/>
+            <a:off x="4236927" y="4769193"/>
             <a:ext cx="2716765" cy="370148"/>
           </a:xfrm>
           <a:prstGeom prst="rect">
@@ -4159,7 +4159,7 @@
         </p:nvSpPr>
         <p:spPr>
           <a:xfrm>
-            <a:off x="6870050" y="2574217"/>
+            <a:off x="7561166" y="2552952"/>
             <a:ext cx="3375293" cy="2697821"/>
           </a:xfrm>
           <a:prstGeom prst="rect">
@@ -4211,7 +4211,7 @@
         </p:nvSpPr>
         <p:spPr>
           <a:xfrm>
-            <a:off x="6987547" y="2585704"/>
+            <a:off x="7678663" y="2564439"/>
             <a:ext cx="3079728" cy="584775"/>
           </a:xfrm>
           <a:prstGeom prst="rect">
@@ -4266,7 +4266,7 @@
         </p:nvCxnSpPr>
         <p:spPr>
           <a:xfrm rot="5400000">
-            <a:off x="2496035" y="911959"/>
+            <a:off x="3187151" y="890694"/>
             <a:ext cx="818470" cy="2577550"/>
           </a:xfrm>
           <a:prstGeom prst="bentConnector3">
@@ -4309,7 +4309,7 @@
         </p:nvCxnSpPr>
         <p:spPr>
           <a:xfrm flipH="1">
-            <a:off x="4744851" y="1772161"/>
+            <a:off x="5435967" y="1750896"/>
             <a:ext cx="6960" cy="822966"/>
           </a:xfrm>
           <a:prstGeom prst="straightConnector1">
@@ -4355,7 +4355,7 @@
         </p:nvCxnSpPr>
         <p:spPr>
           <a:xfrm rot="16200000" flipH="1">
-            <a:off x="6626853" y="643373"/>
+            <a:off x="7317969" y="622108"/>
             <a:ext cx="781960" cy="3079728"/>
           </a:xfrm>
           <a:prstGeom prst="bentConnector3">
@@ -4396,8 +4396,8 @@
         </p:nvSpPr>
         <p:spPr>
           <a:xfrm>
-            <a:off x="256168" y="898717"/>
-            <a:ext cx="1683505" cy="307777"/>
+            <a:off x="1059024" y="763910"/>
+            <a:ext cx="1939357" cy="338554"/>
           </a:xfrm>
           <a:prstGeom prst="rect">
             <a:avLst/>
@@ -4411,7 +4411,7 @@
           <a:lstStyle/>
           <a:p>
             <a:r>
-              <a:rPr lang="en-SG" sz="1400" b="1" dirty="0">
+              <a:rPr lang="en-SG" sz="1600" b="1" dirty="0">
                 <a:solidFill>
                   <a:schemeClr val="tx1">
                     <a:lumMod val="50000"/>
@@ -4438,7 +4438,7 @@
         </p:nvSpPr>
         <p:spPr>
           <a:xfrm>
-            <a:off x="2869624" y="976554"/>
+            <a:off x="3560740" y="955289"/>
             <a:ext cx="3070973" cy="923330"/>
           </a:xfrm>
           <a:prstGeom prst="rect">
@@ -4490,7 +4490,7 @@
         </p:blipFill>
         <p:spPr>
           <a:xfrm>
-            <a:off x="5878879" y="939064"/>
+            <a:off x="6569995" y="917799"/>
             <a:ext cx="984211" cy="757842"/>
           </a:xfrm>
           <a:prstGeom prst="rect">
@@ -4512,7 +4512,7 @@
         </p:nvSpPr>
         <p:spPr>
           <a:xfrm>
-            <a:off x="412809" y="3796339"/>
+            <a:off x="1103925" y="3775074"/>
             <a:ext cx="2253399" cy="307912"/>
           </a:xfrm>
           <a:prstGeom prst="rect">
@@ -4557,7 +4557,7 @@
                   <a:srgbClr val="C00000"/>
                 </a:solidFill>
               </a:rPr>
-              <a:t>Scan and eavesdrop Module</a:t>
+              <a:t>Scan and eavesdrop modules</a:t>
             </a:r>
           </a:p>
         </p:txBody>
@@ -4576,7 +4576,7 @@
         </p:nvSpPr>
         <p:spPr>
           <a:xfrm>
-            <a:off x="412809" y="4232020"/>
+            <a:off x="1103925" y="4210755"/>
             <a:ext cx="2253399" cy="307912"/>
           </a:xfrm>
           <a:prstGeom prst="rect">
@@ -4621,7 +4621,7 @@
                   <a:srgbClr val="C00000"/>
                 </a:solidFill>
               </a:rPr>
-              <a:t>Denial of Service Module</a:t>
+              <a:t>Denial of service modules</a:t>
             </a:r>
           </a:p>
         </p:txBody>
@@ -4640,7 +4640,7 @@
         </p:nvSpPr>
         <p:spPr>
           <a:xfrm>
-            <a:off x="412809" y="4670003"/>
+            <a:off x="1103925" y="4648738"/>
             <a:ext cx="2253399" cy="414213"/>
           </a:xfrm>
           <a:prstGeom prst="rect">
@@ -4685,7 +4685,7 @@
                   <a:srgbClr val="C00000"/>
                 </a:solidFill>
               </a:rPr>
-              <a:t>Destruction and phishing Attack Module</a:t>
+              <a:t>Destruction and phishing attack modules</a:t>
             </a:r>
           </a:p>
         </p:txBody>
@@ -4704,7 +4704,7 @@
         </p:nvSpPr>
         <p:spPr>
           <a:xfrm>
-            <a:off x="3545811" y="4239378"/>
+            <a:off x="4236927" y="4218113"/>
             <a:ext cx="2716765" cy="428161"/>
           </a:xfrm>
           <a:prstGeom prst="rect">
@@ -4746,7 +4746,7 @@
                   <a:schemeClr val="tx1"/>
                 </a:solidFill>
               </a:rPr>
-              <a:t>Malicious Action module assemble function </a:t>
+              <a:t>Malicious action module/plug-in assemble function </a:t>
             </a:r>
           </a:p>
         </p:txBody>
@@ -4773,7 +4773,7 @@
         </p:blipFill>
         <p:spPr>
           <a:xfrm>
-            <a:off x="8587836" y="3186811"/>
+            <a:off x="9278952" y="3165546"/>
             <a:ext cx="1527011" cy="1084178"/>
           </a:xfrm>
           <a:prstGeom prst="rect">
@@ -4800,7 +4800,7 @@
         </p:nvSpPr>
         <p:spPr>
           <a:xfrm>
-            <a:off x="8587836" y="4307213"/>
+            <a:off x="9291821" y="3817969"/>
             <a:ext cx="1627045" cy="446330"/>
           </a:xfrm>
           <a:prstGeom prst="rect">
@@ -4835,7 +4835,7 @@
             <a:r>
               <a:rPr lang="en-SG" sz="1200" b="1" dirty="0">
                 <a:solidFill>
-                  <a:schemeClr val="tx1"/>
+                  <a:schemeClr val="bg1"/>
                 </a:solidFill>
               </a:rPr>
               <a:t>Attack tasks assign  bulletin board</a:t>
@@ -4865,7 +4865,7 @@
         </p:blipFill>
         <p:spPr>
           <a:xfrm>
-            <a:off x="6978374" y="3193830"/>
+            <a:off x="7669490" y="3172565"/>
             <a:ext cx="1440709" cy="1082957"/>
           </a:xfrm>
           <a:prstGeom prst="rect">
@@ -4892,7 +4892,7 @@
         </p:nvSpPr>
         <p:spPr>
           <a:xfrm>
-            <a:off x="6917412" y="4300138"/>
+            <a:off x="7651420" y="3832543"/>
             <a:ext cx="1627045" cy="446330"/>
           </a:xfrm>
           <a:prstGeom prst="rect">
@@ -4927,7 +4927,7 @@
             <a:r>
               <a:rPr lang="en-SG" sz="1200" b="1" dirty="0">
                 <a:solidFill>
-                  <a:schemeClr val="tx1"/>
+                  <a:schemeClr val="bg1"/>
                 </a:solidFill>
               </a:rPr>
               <a:t>Malwares management board</a:t>
@@ -4949,16 +4949,16 @@
         </p:nvSpPr>
         <p:spPr>
           <a:xfrm>
-            <a:off x="6999135" y="4789908"/>
-            <a:ext cx="3068140" cy="370148"/>
+            <a:off x="7690251" y="4396610"/>
+            <a:ext cx="3068140" cy="281563"/>
           </a:xfrm>
           <a:prstGeom prst="rect">
             <a:avLst/>
           </a:prstGeom>
           <a:solidFill>
-            <a:schemeClr val="accent4">
-              <a:lumMod val="20000"/>
-              <a:lumOff val="80000"/>
+            <a:schemeClr val="accent6">
+              <a:lumMod val="60000"/>
+              <a:lumOff val="40000"/>
             </a:schemeClr>
           </a:solidFill>
           <a:ln>
@@ -4986,20 +4986,73 @@
           <a:lstStyle/>
           <a:p>
             <a:r>
-              <a:rPr lang="en-SG" sz="1200" b="1">
-                <a:solidFill>
-                  <a:schemeClr val="tx1"/>
-                </a:solidFill>
-              </a:rPr>
-              <a:t>Malware tasks </a:t>
-            </a:r>
-            <a:r>
               <a:rPr lang="en-SG" sz="1200" b="1" dirty="0">
                 <a:solidFill>
                   <a:schemeClr val="tx1"/>
                 </a:solidFill>
               </a:rPr>
-              <a:t>management module and result archive data base.</a:t>
+              <a:t>Malware tasks management module</a:t>
+            </a:r>
+          </a:p>
+        </p:txBody>
+      </p:sp>
+      <p:sp>
+        <p:nvSpPr>
+          <p:cNvPr id="48" name="Rectangle 47">
+            <a:extLst>
+              <a:ext uri="{FF2B5EF4-FFF2-40B4-BE49-F238E27FC236}">
+                <a16:creationId xmlns:a16="http://schemas.microsoft.com/office/drawing/2014/main" id="{2CA32237-4525-393A-899C-8BA784EF706E}"/>
+              </a:ext>
+            </a:extLst>
+          </p:cNvPr>
+          <p:cNvSpPr/>
+          <p:nvPr/>
+        </p:nvSpPr>
+        <p:spPr>
+          <a:xfrm>
+            <a:off x="7690251" y="4809027"/>
+            <a:ext cx="3068140" cy="281563"/>
+          </a:xfrm>
+          <a:prstGeom prst="rect">
+            <a:avLst/>
+          </a:prstGeom>
+          <a:solidFill>
+            <a:schemeClr val="accent6">
+              <a:lumMod val="60000"/>
+              <a:lumOff val="40000"/>
+            </a:schemeClr>
+          </a:solidFill>
+          <a:ln>
+            <a:prstDash val="sysDash"/>
+          </a:ln>
+        </p:spPr>
+        <p:style>
+          <a:lnRef idx="2">
+            <a:schemeClr val="accent1">
+              <a:shade val="15000"/>
+            </a:schemeClr>
+          </a:lnRef>
+          <a:fillRef idx="1">
+            <a:schemeClr val="accent1"/>
+          </a:fillRef>
+          <a:effectRef idx="0">
+            <a:schemeClr val="accent1"/>
+          </a:effectRef>
+          <a:fontRef idx="minor">
+            <a:schemeClr val="lt1"/>
+          </a:fontRef>
+        </p:style>
+        <p:txBody>
+          <a:bodyPr rtlCol="0" anchor="ctr"/>
+          <a:lstStyle/>
+          <a:p>
+            <a:r>
+              <a:rPr lang="en-SG" sz="1200" b="1" dirty="0">
+                <a:solidFill>
+                  <a:schemeClr val="tx1"/>
+                </a:solidFill>
+              </a:rPr>
+              <a:t>Attack result archive database</a:t>
             </a:r>
           </a:p>
         </p:txBody>

</xml_diff>

<commit_message>
update the user manual and design document.
</commit_message>
<xml_diff>
--- a/doc/designDoc.pptx
+++ b/doc/designDoc.pptx
@@ -9,6 +9,7 @@
     <p:sldId id="257" r:id="rId3"/>
     <p:sldId id="258" r:id="rId4"/>
     <p:sldId id="259" r:id="rId5"/>
+    <p:sldId id="260" r:id="rId6"/>
   </p:sldIdLst>
   <p:sldSz cx="12192000" cy="6858000"/>
   <p:notesSz cx="6858000" cy="9144000"/>
@@ -264,7 +265,7 @@
           <a:p>
             <a:fld id="{9FCA313A-65B0-404C-ABF6-BBAAB537D5DB}" type="datetimeFigureOut">
               <a:rPr lang="en-SG" smtClean="0"/>
-              <a:t>18/5/2024</a:t>
+              <a:t>19/5/2024</a:t>
             </a:fld>
             <a:endParaRPr lang="en-SG"/>
           </a:p>
@@ -464,7 +465,7 @@
           <a:p>
             <a:fld id="{9FCA313A-65B0-404C-ABF6-BBAAB537D5DB}" type="datetimeFigureOut">
               <a:rPr lang="en-SG" smtClean="0"/>
-              <a:t>18/5/2024</a:t>
+              <a:t>19/5/2024</a:t>
             </a:fld>
             <a:endParaRPr lang="en-SG"/>
           </a:p>
@@ -674,7 +675,7 @@
           <a:p>
             <a:fld id="{9FCA313A-65B0-404C-ABF6-BBAAB537D5DB}" type="datetimeFigureOut">
               <a:rPr lang="en-SG" smtClean="0"/>
-              <a:t>18/5/2024</a:t>
+              <a:t>19/5/2024</a:t>
             </a:fld>
             <a:endParaRPr lang="en-SG"/>
           </a:p>
@@ -874,7 +875,7 @@
           <a:p>
             <a:fld id="{9FCA313A-65B0-404C-ABF6-BBAAB537D5DB}" type="datetimeFigureOut">
               <a:rPr lang="en-SG" smtClean="0"/>
-              <a:t>18/5/2024</a:t>
+              <a:t>19/5/2024</a:t>
             </a:fld>
             <a:endParaRPr lang="en-SG"/>
           </a:p>
@@ -1150,7 +1151,7 @@
           <a:p>
             <a:fld id="{9FCA313A-65B0-404C-ABF6-BBAAB537D5DB}" type="datetimeFigureOut">
               <a:rPr lang="en-SG" smtClean="0"/>
-              <a:t>18/5/2024</a:t>
+              <a:t>19/5/2024</a:t>
             </a:fld>
             <a:endParaRPr lang="en-SG"/>
           </a:p>
@@ -1418,7 +1419,7 @@
           <a:p>
             <a:fld id="{9FCA313A-65B0-404C-ABF6-BBAAB537D5DB}" type="datetimeFigureOut">
               <a:rPr lang="en-SG" smtClean="0"/>
-              <a:t>18/5/2024</a:t>
+              <a:t>19/5/2024</a:t>
             </a:fld>
             <a:endParaRPr lang="en-SG"/>
           </a:p>
@@ -1833,7 +1834,7 @@
           <a:p>
             <a:fld id="{9FCA313A-65B0-404C-ABF6-BBAAB537D5DB}" type="datetimeFigureOut">
               <a:rPr lang="en-SG" smtClean="0"/>
-              <a:t>18/5/2024</a:t>
+              <a:t>19/5/2024</a:t>
             </a:fld>
             <a:endParaRPr lang="en-SG"/>
           </a:p>
@@ -1975,7 +1976,7 @@
           <a:p>
             <a:fld id="{9FCA313A-65B0-404C-ABF6-BBAAB537D5DB}" type="datetimeFigureOut">
               <a:rPr lang="en-SG" smtClean="0"/>
-              <a:t>18/5/2024</a:t>
+              <a:t>19/5/2024</a:t>
             </a:fld>
             <a:endParaRPr lang="en-SG"/>
           </a:p>
@@ -2088,7 +2089,7 @@
           <a:p>
             <a:fld id="{9FCA313A-65B0-404C-ABF6-BBAAB537D5DB}" type="datetimeFigureOut">
               <a:rPr lang="en-SG" smtClean="0"/>
-              <a:t>18/5/2024</a:t>
+              <a:t>19/5/2024</a:t>
             </a:fld>
             <a:endParaRPr lang="en-SG"/>
           </a:p>
@@ -2401,7 +2402,7 @@
           <a:p>
             <a:fld id="{9FCA313A-65B0-404C-ABF6-BBAAB537D5DB}" type="datetimeFigureOut">
               <a:rPr lang="en-SG" smtClean="0"/>
-              <a:t>18/5/2024</a:t>
+              <a:t>19/5/2024</a:t>
             </a:fld>
             <a:endParaRPr lang="en-SG"/>
           </a:p>
@@ -2690,7 +2691,7 @@
           <a:p>
             <a:fld id="{9FCA313A-65B0-404C-ABF6-BBAAB537D5DB}" type="datetimeFigureOut">
               <a:rPr lang="en-SG" smtClean="0"/>
-              <a:t>18/5/2024</a:t>
+              <a:t>19/5/2024</a:t>
             </a:fld>
             <a:endParaRPr lang="en-SG"/>
           </a:p>
@@ -2933,7 +2934,7 @@
           <a:p>
             <a:fld id="{9FCA313A-65B0-404C-ABF6-BBAAB537D5DB}" type="datetimeFigureOut">
               <a:rPr lang="en-SG" smtClean="0"/>
-              <a:t>18/5/2024</a:t>
+              <a:t>19/5/2024</a:t>
             </a:fld>
             <a:endParaRPr lang="en-SG"/>
           </a:p>
@@ -10275,6 +10276,231 @@
 </p:sld>
 </file>
 
+<file path=ppt/slides/slide5.xml><?xml version="1.0" encoding="utf-8"?>
+<p:sld xmlns:a="http://schemas.openxmlformats.org/drawingml/2006/main" xmlns:r="http://schemas.openxmlformats.org/officeDocument/2006/relationships" xmlns:p="http://schemas.openxmlformats.org/presentationml/2006/main">
+  <p:cSld>
+    <p:spTree>
+      <p:nvGrpSpPr>
+        <p:cNvPr id="1" name=""/>
+        <p:cNvGrpSpPr/>
+        <p:nvPr/>
+      </p:nvGrpSpPr>
+      <p:grpSpPr>
+        <a:xfrm>
+          <a:off x="0" y="0"/>
+          <a:ext cx="0" cy="0"/>
+          <a:chOff x="0" y="0"/>
+          <a:chExt cx="0" cy="0"/>
+        </a:xfrm>
+      </p:grpSpPr>
+      <p:pic>
+        <p:nvPicPr>
+          <p:cNvPr id="7" name="Picture 6" descr="A screenshot of a computer&#10;&#10;Description automatically generated">
+            <a:extLst>
+              <a:ext uri="{FF2B5EF4-FFF2-40B4-BE49-F238E27FC236}">
+                <a16:creationId xmlns:a16="http://schemas.microsoft.com/office/drawing/2014/main" id="{E678B7FE-4EBB-F8EC-8015-58779BD89274}"/>
+              </a:ext>
+            </a:extLst>
+          </p:cNvPr>
+          <p:cNvPicPr>
+            <a:picLocks noChangeAspect="1"/>
+          </p:cNvPicPr>
+          <p:nvPr/>
+        </p:nvPicPr>
+        <p:blipFill rotWithShape="1">
+          <a:blip r:embed="rId2">
+            <a:extLst>
+              <a:ext uri="{28A0092B-C50C-407E-A947-70E740481C1C}">
+                <a14:useLocalDpi xmlns:a14="http://schemas.microsoft.com/office/drawing/2010/main" val="0"/>
+              </a:ext>
+            </a:extLst>
+          </a:blip>
+          <a:srcRect b="3834"/>
+          <a:stretch/>
+        </p:blipFill>
+        <p:spPr>
+          <a:xfrm>
+            <a:off x="113328" y="2115879"/>
+            <a:ext cx="5608280" cy="3200400"/>
+          </a:xfrm>
+          <a:prstGeom prst="rect">
+            <a:avLst/>
+          </a:prstGeom>
+          <a:ln w="12700">
+            <a:solidFill>
+              <a:schemeClr val="tx1"/>
+            </a:solidFill>
+          </a:ln>
+        </p:spPr>
+      </p:pic>
+      <p:sp>
+        <p:nvSpPr>
+          <p:cNvPr id="10" name="Rectangle 9">
+            <a:extLst>
+              <a:ext uri="{FF2B5EF4-FFF2-40B4-BE49-F238E27FC236}">
+                <a16:creationId xmlns:a16="http://schemas.microsoft.com/office/drawing/2014/main" id="{4BCE5A96-6717-EBC2-058B-97625355B7D7}"/>
+              </a:ext>
+            </a:extLst>
+          </p:cNvPr>
+          <p:cNvSpPr/>
+          <p:nvPr/>
+        </p:nvSpPr>
+        <p:spPr>
+          <a:xfrm>
+            <a:off x="281356" y="4792663"/>
+            <a:ext cx="3431108" cy="446330"/>
+          </a:xfrm>
+          <a:prstGeom prst="rect">
+            <a:avLst/>
+          </a:prstGeom>
+          <a:noFill/>
+          <a:ln>
+            <a:noFill/>
+            <a:prstDash val="sysDash"/>
+          </a:ln>
+        </p:spPr>
+        <p:style>
+          <a:lnRef idx="2">
+            <a:schemeClr val="accent1">
+              <a:shade val="15000"/>
+            </a:schemeClr>
+          </a:lnRef>
+          <a:fillRef idx="1">
+            <a:schemeClr val="accent1"/>
+          </a:fillRef>
+          <a:effectRef idx="0">
+            <a:schemeClr val="accent1"/>
+          </a:effectRef>
+          <a:fontRef idx="minor">
+            <a:schemeClr val="lt1"/>
+          </a:fontRef>
+        </p:style>
+        <p:txBody>
+          <a:bodyPr rtlCol="0" anchor="ctr"/>
+          <a:lstStyle/>
+          <a:p>
+            <a:r>
+              <a:rPr lang="en-SG" b="1" dirty="0">
+                <a:solidFill>
+                  <a:schemeClr val="bg1"/>
+                </a:solidFill>
+              </a:rPr>
+              <a:t>Malwares management board</a:t>
+            </a:r>
+          </a:p>
+        </p:txBody>
+      </p:sp>
+      <p:pic>
+        <p:nvPicPr>
+          <p:cNvPr id="12" name="Picture 11" descr="A screenshot of a computer&#10;&#10;Description automatically generated">
+            <a:extLst>
+              <a:ext uri="{FF2B5EF4-FFF2-40B4-BE49-F238E27FC236}">
+                <a16:creationId xmlns:a16="http://schemas.microsoft.com/office/drawing/2014/main" id="{0C3C5D28-621F-E076-5252-7FEF52A34C98}"/>
+              </a:ext>
+            </a:extLst>
+          </p:cNvPr>
+          <p:cNvPicPr>
+            <a:picLocks noChangeAspect="1"/>
+          </p:cNvPicPr>
+          <p:nvPr/>
+        </p:nvPicPr>
+        <p:blipFill>
+          <a:blip r:embed="rId3">
+            <a:extLst>
+              <a:ext uri="{28A0092B-C50C-407E-A947-70E740481C1C}">
+                <a14:useLocalDpi xmlns:a14="http://schemas.microsoft.com/office/drawing/2010/main" val="0"/>
+              </a:ext>
+            </a:extLst>
+          </a:blip>
+          <a:stretch>
+            <a:fillRect/>
+          </a:stretch>
+        </p:blipFill>
+        <p:spPr>
+          <a:xfrm>
+            <a:off x="5819454" y="2115879"/>
+            <a:ext cx="6259218" cy="3200400"/>
+          </a:xfrm>
+          <a:prstGeom prst="rect">
+            <a:avLst/>
+          </a:prstGeom>
+          <a:ln w="12700">
+            <a:solidFill>
+              <a:schemeClr val="tx1"/>
+            </a:solidFill>
+          </a:ln>
+        </p:spPr>
+      </p:pic>
+      <p:sp>
+        <p:nvSpPr>
+          <p:cNvPr id="13" name="Rectangle 12">
+            <a:extLst>
+              <a:ext uri="{FF2B5EF4-FFF2-40B4-BE49-F238E27FC236}">
+                <a16:creationId xmlns:a16="http://schemas.microsoft.com/office/drawing/2014/main" id="{7A61BC8D-38B0-6B7A-CD20-804B793D235F}"/>
+              </a:ext>
+            </a:extLst>
+          </p:cNvPr>
+          <p:cNvSpPr/>
+          <p:nvPr/>
+        </p:nvSpPr>
+        <p:spPr>
+          <a:xfrm>
+            <a:off x="6580518" y="4846063"/>
+            <a:ext cx="3945715" cy="446330"/>
+          </a:xfrm>
+          <a:prstGeom prst="rect">
+            <a:avLst/>
+          </a:prstGeom>
+          <a:noFill/>
+          <a:ln>
+            <a:noFill/>
+            <a:prstDash val="sysDash"/>
+          </a:ln>
+        </p:spPr>
+        <p:style>
+          <a:lnRef idx="2">
+            <a:schemeClr val="accent1">
+              <a:shade val="15000"/>
+            </a:schemeClr>
+          </a:lnRef>
+          <a:fillRef idx="1">
+            <a:schemeClr val="accent1"/>
+          </a:fillRef>
+          <a:effectRef idx="0">
+            <a:schemeClr val="accent1"/>
+          </a:effectRef>
+          <a:fontRef idx="minor">
+            <a:schemeClr val="lt1"/>
+          </a:fontRef>
+        </p:style>
+        <p:txBody>
+          <a:bodyPr rtlCol="0" anchor="ctr"/>
+          <a:lstStyle/>
+          <a:p>
+            <a:r>
+              <a:rPr lang="en-SG" b="1" dirty="0">
+                <a:solidFill>
+                  <a:schemeClr val="bg1"/>
+                </a:solidFill>
+              </a:rPr>
+              <a:t>Attack tasks assign  bulletin board</a:t>
+            </a:r>
+          </a:p>
+        </p:txBody>
+      </p:sp>
+    </p:spTree>
+    <p:extLst>
+      <p:ext uri="{BB962C8B-B14F-4D97-AF65-F5344CB8AC3E}">
+        <p14:creationId xmlns:p14="http://schemas.microsoft.com/office/powerpoint/2010/main" val="1342970475"/>
+      </p:ext>
+    </p:extLst>
+  </p:cSld>
+  <p:clrMapOvr>
+    <a:masterClrMapping/>
+  </p:clrMapOvr>
+</p:sld>
+</file>
+
 <file path=ppt/theme/theme1.xml><?xml version="1.0" encoding="utf-8"?>
 <a:theme xmlns:a="http://schemas.openxmlformats.org/drawingml/2006/main" name="Office Theme">
   <a:themeElements>

</xml_diff>

<commit_message>
Added the image and update the design document.
</commit_message>
<xml_diff>
--- a/doc/designDoc.pptx
+++ b/doc/designDoc.pptx
@@ -267,7 +267,7 @@
           <a:p>
             <a:fld id="{9FCA313A-65B0-404C-ABF6-BBAAB537D5DB}" type="datetimeFigureOut">
               <a:rPr lang="en-SG" smtClean="0"/>
-              <a:t>20/5/2024</a:t>
+              <a:t>24/5/2024</a:t>
             </a:fld>
             <a:endParaRPr lang="en-SG"/>
           </a:p>
@@ -467,7 +467,7 @@
           <a:p>
             <a:fld id="{9FCA313A-65B0-404C-ABF6-BBAAB537D5DB}" type="datetimeFigureOut">
               <a:rPr lang="en-SG" smtClean="0"/>
-              <a:t>20/5/2024</a:t>
+              <a:t>24/5/2024</a:t>
             </a:fld>
             <a:endParaRPr lang="en-SG"/>
           </a:p>
@@ -677,7 +677,7 @@
           <a:p>
             <a:fld id="{9FCA313A-65B0-404C-ABF6-BBAAB537D5DB}" type="datetimeFigureOut">
               <a:rPr lang="en-SG" smtClean="0"/>
-              <a:t>20/5/2024</a:t>
+              <a:t>24/5/2024</a:t>
             </a:fld>
             <a:endParaRPr lang="en-SG"/>
           </a:p>
@@ -877,7 +877,7 @@
           <a:p>
             <a:fld id="{9FCA313A-65B0-404C-ABF6-BBAAB537D5DB}" type="datetimeFigureOut">
               <a:rPr lang="en-SG" smtClean="0"/>
-              <a:t>20/5/2024</a:t>
+              <a:t>24/5/2024</a:t>
             </a:fld>
             <a:endParaRPr lang="en-SG"/>
           </a:p>
@@ -1153,7 +1153,7 @@
           <a:p>
             <a:fld id="{9FCA313A-65B0-404C-ABF6-BBAAB537D5DB}" type="datetimeFigureOut">
               <a:rPr lang="en-SG" smtClean="0"/>
-              <a:t>20/5/2024</a:t>
+              <a:t>24/5/2024</a:t>
             </a:fld>
             <a:endParaRPr lang="en-SG"/>
           </a:p>
@@ -1421,7 +1421,7 @@
           <a:p>
             <a:fld id="{9FCA313A-65B0-404C-ABF6-BBAAB537D5DB}" type="datetimeFigureOut">
               <a:rPr lang="en-SG" smtClean="0"/>
-              <a:t>20/5/2024</a:t>
+              <a:t>24/5/2024</a:t>
             </a:fld>
             <a:endParaRPr lang="en-SG"/>
           </a:p>
@@ -1836,7 +1836,7 @@
           <a:p>
             <a:fld id="{9FCA313A-65B0-404C-ABF6-BBAAB537D5DB}" type="datetimeFigureOut">
               <a:rPr lang="en-SG" smtClean="0"/>
-              <a:t>20/5/2024</a:t>
+              <a:t>24/5/2024</a:t>
             </a:fld>
             <a:endParaRPr lang="en-SG"/>
           </a:p>
@@ -1978,7 +1978,7 @@
           <a:p>
             <a:fld id="{9FCA313A-65B0-404C-ABF6-BBAAB537D5DB}" type="datetimeFigureOut">
               <a:rPr lang="en-SG" smtClean="0"/>
-              <a:t>20/5/2024</a:t>
+              <a:t>24/5/2024</a:t>
             </a:fld>
             <a:endParaRPr lang="en-SG"/>
           </a:p>
@@ -2091,7 +2091,7 @@
           <a:p>
             <a:fld id="{9FCA313A-65B0-404C-ABF6-BBAAB537D5DB}" type="datetimeFigureOut">
               <a:rPr lang="en-SG" smtClean="0"/>
-              <a:t>20/5/2024</a:t>
+              <a:t>24/5/2024</a:t>
             </a:fld>
             <a:endParaRPr lang="en-SG"/>
           </a:p>
@@ -2404,7 +2404,7 @@
           <a:p>
             <a:fld id="{9FCA313A-65B0-404C-ABF6-BBAAB537D5DB}" type="datetimeFigureOut">
               <a:rPr lang="en-SG" smtClean="0"/>
-              <a:t>20/5/2024</a:t>
+              <a:t>24/5/2024</a:t>
             </a:fld>
             <a:endParaRPr lang="en-SG"/>
           </a:p>
@@ -2693,7 +2693,7 @@
           <a:p>
             <a:fld id="{9FCA313A-65B0-404C-ABF6-BBAAB537D5DB}" type="datetimeFigureOut">
               <a:rPr lang="en-SG" smtClean="0"/>
-              <a:t>20/5/2024</a:t>
+              <a:t>24/5/2024</a:t>
             </a:fld>
             <a:endParaRPr lang="en-SG"/>
           </a:p>
@@ -2936,7 +2936,7 @@
           <a:p>
             <a:fld id="{9FCA313A-65B0-404C-ABF6-BBAAB537D5DB}" type="datetimeFigureOut">
               <a:rPr lang="en-SG" smtClean="0"/>
-              <a:t>20/5/2024</a:t>
+              <a:t>24/5/2024</a:t>
             </a:fld>
             <a:endParaRPr lang="en-SG"/>
           </a:p>
@@ -3523,7 +3523,7 @@
         <p:spPr>
           <a:xfrm>
             <a:off x="838572" y="386437"/>
-            <a:ext cx="5499618" cy="4345051"/>
+            <a:ext cx="4199772" cy="3318089"/>
           </a:xfrm>
           <a:prstGeom prst="roundRect">
             <a:avLst>
@@ -3554,6 +3554,685 @@
           </a:sp3d>
         </p:spPr>
       </p:pic>
+      <p:sp>
+        <p:nvSpPr>
+          <p:cNvPr id="15" name="Rectangle 14">
+            <a:extLst>
+              <a:ext uri="{FF2B5EF4-FFF2-40B4-BE49-F238E27FC236}">
+                <a16:creationId xmlns:a16="http://schemas.microsoft.com/office/drawing/2014/main" id="{785824B8-5DA3-E5FA-F29D-F20CDFF4D8A0}"/>
+              </a:ext>
+            </a:extLst>
+          </p:cNvPr>
+          <p:cNvSpPr/>
+          <p:nvPr/>
+        </p:nvSpPr>
+        <p:spPr>
+          <a:xfrm>
+            <a:off x="5606570" y="3200400"/>
+            <a:ext cx="4470118" cy="2697821"/>
+          </a:xfrm>
+          <a:prstGeom prst="rect">
+            <a:avLst/>
+          </a:prstGeom>
+          <a:solidFill>
+            <a:schemeClr val="accent6">
+              <a:lumMod val="20000"/>
+              <a:lumOff val="80000"/>
+            </a:schemeClr>
+          </a:solidFill>
+        </p:spPr>
+        <p:style>
+          <a:lnRef idx="2">
+            <a:schemeClr val="accent1">
+              <a:shade val="15000"/>
+            </a:schemeClr>
+          </a:lnRef>
+          <a:fillRef idx="1">
+            <a:schemeClr val="accent1"/>
+          </a:fillRef>
+          <a:effectRef idx="0">
+            <a:schemeClr val="accent1"/>
+          </a:effectRef>
+          <a:fontRef idx="minor">
+            <a:schemeClr val="lt1"/>
+          </a:fontRef>
+        </p:style>
+        <p:txBody>
+          <a:bodyPr rtlCol="0" anchor="ctr"/>
+          <a:lstStyle/>
+          <a:p>
+            <a:pPr algn="ctr"/>
+            <a:endParaRPr lang="en-SG" dirty="0"/>
+          </a:p>
+        </p:txBody>
+      </p:sp>
+      <p:sp>
+        <p:nvSpPr>
+          <p:cNvPr id="16" name="TextBox 15">
+            <a:extLst>
+              <a:ext uri="{FF2B5EF4-FFF2-40B4-BE49-F238E27FC236}">
+                <a16:creationId xmlns:a16="http://schemas.microsoft.com/office/drawing/2014/main" id="{C0F3EEA6-5525-69FD-7819-6CCF7EDAC3E6}"/>
+              </a:ext>
+            </a:extLst>
+          </p:cNvPr>
+          <p:cNvSpPr txBox="1"/>
+          <p:nvPr/>
+        </p:nvSpPr>
+        <p:spPr>
+          <a:xfrm>
+            <a:off x="5703559" y="3200400"/>
+            <a:ext cx="3079728" cy="584775"/>
+          </a:xfrm>
+          <a:prstGeom prst="rect">
+            <a:avLst/>
+          </a:prstGeom>
+          <a:noFill/>
+        </p:spPr>
+        <p:txBody>
+          <a:bodyPr wrap="square" rtlCol="0">
+            <a:spAutoFit/>
+          </a:bodyPr>
+          <a:lstStyle/>
+          <a:p>
+            <a:r>
+              <a:rPr lang="en-SG" sz="1600" b="1" dirty="0">
+                <a:solidFill>
+                  <a:schemeClr val="tx1"/>
+                </a:solidFill>
+              </a:rPr>
+              <a:t>Command and Control (C2)</a:t>
+            </a:r>
+            <a:r>
+              <a:rPr lang="en-US" sz="1600" b="1" dirty="0">
+                <a:solidFill>
+                  <a:schemeClr val="tx1"/>
+                </a:solidFill>
+              </a:rPr>
+              <a:t> Orchestrator </a:t>
+            </a:r>
+            <a:r>
+              <a:rPr lang="en-SG" sz="1600" b="1" dirty="0"/>
+              <a:t> </a:t>
+            </a:r>
+          </a:p>
+        </p:txBody>
+      </p:sp>
+      <p:pic>
+        <p:nvPicPr>
+          <p:cNvPr id="17" name="Picture 16">
+            <a:extLst>
+              <a:ext uri="{FF2B5EF4-FFF2-40B4-BE49-F238E27FC236}">
+                <a16:creationId xmlns:a16="http://schemas.microsoft.com/office/drawing/2014/main" id="{3B14BD12-6047-B8B7-BED1-A2766141AFEA}"/>
+              </a:ext>
+            </a:extLst>
+          </p:cNvPr>
+          <p:cNvPicPr>
+            <a:picLocks noChangeAspect="1"/>
+          </p:cNvPicPr>
+          <p:nvPr/>
+        </p:nvPicPr>
+        <p:blipFill>
+          <a:blip r:embed="rId3"/>
+          <a:stretch>
+            <a:fillRect/>
+          </a:stretch>
+        </p:blipFill>
+        <p:spPr>
+          <a:xfrm>
+            <a:off x="7303848" y="3801507"/>
+            <a:ext cx="1527011" cy="1084178"/>
+          </a:xfrm>
+          <a:prstGeom prst="rect">
+            <a:avLst/>
+          </a:prstGeom>
+          <a:ln w="9525">
+            <a:solidFill>
+              <a:schemeClr val="tx1"/>
+            </a:solidFill>
+          </a:ln>
+        </p:spPr>
+      </p:pic>
+      <p:sp>
+        <p:nvSpPr>
+          <p:cNvPr id="18" name="Rectangle 17">
+            <a:extLst>
+              <a:ext uri="{FF2B5EF4-FFF2-40B4-BE49-F238E27FC236}">
+                <a16:creationId xmlns:a16="http://schemas.microsoft.com/office/drawing/2014/main" id="{C9FE4010-40BA-7EBB-A154-71AAF943FC56}"/>
+              </a:ext>
+            </a:extLst>
+          </p:cNvPr>
+          <p:cNvSpPr/>
+          <p:nvPr/>
+        </p:nvSpPr>
+        <p:spPr>
+          <a:xfrm>
+            <a:off x="7316717" y="4453930"/>
+            <a:ext cx="1627045" cy="446330"/>
+          </a:xfrm>
+          <a:prstGeom prst="rect">
+            <a:avLst/>
+          </a:prstGeom>
+          <a:noFill/>
+          <a:ln>
+            <a:noFill/>
+            <a:prstDash val="sysDash"/>
+          </a:ln>
+        </p:spPr>
+        <p:style>
+          <a:lnRef idx="2">
+            <a:schemeClr val="accent1">
+              <a:shade val="15000"/>
+            </a:schemeClr>
+          </a:lnRef>
+          <a:fillRef idx="1">
+            <a:schemeClr val="accent1"/>
+          </a:fillRef>
+          <a:effectRef idx="0">
+            <a:schemeClr val="accent1"/>
+          </a:effectRef>
+          <a:fontRef idx="minor">
+            <a:schemeClr val="lt1"/>
+          </a:fontRef>
+        </p:style>
+        <p:txBody>
+          <a:bodyPr rtlCol="0" anchor="ctr"/>
+          <a:lstStyle/>
+          <a:p>
+            <a:r>
+              <a:rPr lang="en-SG" sz="1200" b="1" dirty="0">
+                <a:solidFill>
+                  <a:schemeClr val="bg1"/>
+                </a:solidFill>
+              </a:rPr>
+              <a:t>Attack tasks assign  bulletin board</a:t>
+            </a:r>
+          </a:p>
+        </p:txBody>
+      </p:sp>
+      <p:pic>
+        <p:nvPicPr>
+          <p:cNvPr id="19" name="Picture 18">
+            <a:extLst>
+              <a:ext uri="{FF2B5EF4-FFF2-40B4-BE49-F238E27FC236}">
+                <a16:creationId xmlns:a16="http://schemas.microsoft.com/office/drawing/2014/main" id="{AB537351-E085-9A5C-95B0-587BE6AD745C}"/>
+              </a:ext>
+            </a:extLst>
+          </p:cNvPr>
+          <p:cNvPicPr>
+            <a:picLocks noChangeAspect="1"/>
+          </p:cNvPicPr>
+          <p:nvPr/>
+        </p:nvPicPr>
+        <p:blipFill>
+          <a:blip r:embed="rId4"/>
+          <a:stretch>
+            <a:fillRect/>
+          </a:stretch>
+        </p:blipFill>
+        <p:spPr>
+          <a:xfrm>
+            <a:off x="5694386" y="3808526"/>
+            <a:ext cx="1440709" cy="1082957"/>
+          </a:xfrm>
+          <a:prstGeom prst="rect">
+            <a:avLst/>
+          </a:prstGeom>
+          <a:ln w="6350">
+            <a:solidFill>
+              <a:schemeClr val="tx1"/>
+            </a:solidFill>
+          </a:ln>
+        </p:spPr>
+      </p:pic>
+      <p:sp>
+        <p:nvSpPr>
+          <p:cNvPr id="20" name="Rectangle 19">
+            <a:extLst>
+              <a:ext uri="{FF2B5EF4-FFF2-40B4-BE49-F238E27FC236}">
+                <a16:creationId xmlns:a16="http://schemas.microsoft.com/office/drawing/2014/main" id="{F0B7F992-1982-C01F-7F97-BE6A29266260}"/>
+              </a:ext>
+            </a:extLst>
+          </p:cNvPr>
+          <p:cNvSpPr/>
+          <p:nvPr/>
+        </p:nvSpPr>
+        <p:spPr>
+          <a:xfrm>
+            <a:off x="5676316" y="4468504"/>
+            <a:ext cx="1627045" cy="446330"/>
+          </a:xfrm>
+          <a:prstGeom prst="rect">
+            <a:avLst/>
+          </a:prstGeom>
+          <a:noFill/>
+          <a:ln>
+            <a:noFill/>
+            <a:prstDash val="sysDash"/>
+          </a:ln>
+        </p:spPr>
+        <p:style>
+          <a:lnRef idx="2">
+            <a:schemeClr val="accent1">
+              <a:shade val="15000"/>
+            </a:schemeClr>
+          </a:lnRef>
+          <a:fillRef idx="1">
+            <a:schemeClr val="accent1"/>
+          </a:fillRef>
+          <a:effectRef idx="0">
+            <a:schemeClr val="accent1"/>
+          </a:effectRef>
+          <a:fontRef idx="minor">
+            <a:schemeClr val="lt1"/>
+          </a:fontRef>
+        </p:style>
+        <p:txBody>
+          <a:bodyPr rtlCol="0" anchor="ctr"/>
+          <a:lstStyle/>
+          <a:p>
+            <a:r>
+              <a:rPr lang="en-SG" sz="1200" b="1" dirty="0">
+                <a:solidFill>
+                  <a:schemeClr val="bg1"/>
+                </a:solidFill>
+              </a:rPr>
+              <a:t>Malwares management board</a:t>
+            </a:r>
+          </a:p>
+        </p:txBody>
+      </p:sp>
+      <p:sp>
+        <p:nvSpPr>
+          <p:cNvPr id="21" name="Rectangle 20">
+            <a:extLst>
+              <a:ext uri="{FF2B5EF4-FFF2-40B4-BE49-F238E27FC236}">
+                <a16:creationId xmlns:a16="http://schemas.microsoft.com/office/drawing/2014/main" id="{A1C30D7E-F05D-178C-E3CC-C0606915526E}"/>
+              </a:ext>
+            </a:extLst>
+          </p:cNvPr>
+          <p:cNvSpPr/>
+          <p:nvPr/>
+        </p:nvSpPr>
+        <p:spPr>
+          <a:xfrm>
+            <a:off x="5715147" y="5032571"/>
+            <a:ext cx="2962509" cy="281563"/>
+          </a:xfrm>
+          <a:prstGeom prst="rect">
+            <a:avLst/>
+          </a:prstGeom>
+          <a:solidFill>
+            <a:schemeClr val="accent6">
+              <a:lumMod val="60000"/>
+              <a:lumOff val="40000"/>
+            </a:schemeClr>
+          </a:solidFill>
+          <a:ln>
+            <a:prstDash val="sysDash"/>
+          </a:ln>
+        </p:spPr>
+        <p:style>
+          <a:lnRef idx="2">
+            <a:schemeClr val="accent1">
+              <a:shade val="15000"/>
+            </a:schemeClr>
+          </a:lnRef>
+          <a:fillRef idx="1">
+            <a:schemeClr val="accent1"/>
+          </a:fillRef>
+          <a:effectRef idx="0">
+            <a:schemeClr val="accent1"/>
+          </a:effectRef>
+          <a:fontRef idx="minor">
+            <a:schemeClr val="lt1"/>
+          </a:fontRef>
+        </p:style>
+        <p:txBody>
+          <a:bodyPr rtlCol="0" anchor="ctr"/>
+          <a:lstStyle/>
+          <a:p>
+            <a:r>
+              <a:rPr lang="en-SG" sz="1200" b="1" dirty="0">
+                <a:solidFill>
+                  <a:schemeClr val="tx1"/>
+                </a:solidFill>
+              </a:rPr>
+              <a:t>Malware tasks management module</a:t>
+            </a:r>
+          </a:p>
+        </p:txBody>
+      </p:sp>
+      <p:sp>
+        <p:nvSpPr>
+          <p:cNvPr id="22" name="Rectangle 21">
+            <a:extLst>
+              <a:ext uri="{FF2B5EF4-FFF2-40B4-BE49-F238E27FC236}">
+                <a16:creationId xmlns:a16="http://schemas.microsoft.com/office/drawing/2014/main" id="{91C3C4DD-016F-9F3E-6842-48DFC02EDC1C}"/>
+              </a:ext>
+            </a:extLst>
+          </p:cNvPr>
+          <p:cNvSpPr/>
+          <p:nvPr/>
+        </p:nvSpPr>
+        <p:spPr>
+          <a:xfrm>
+            <a:off x="5715147" y="5444988"/>
+            <a:ext cx="2962509" cy="281563"/>
+          </a:xfrm>
+          <a:prstGeom prst="rect">
+            <a:avLst/>
+          </a:prstGeom>
+          <a:solidFill>
+            <a:schemeClr val="accent6">
+              <a:lumMod val="60000"/>
+              <a:lumOff val="40000"/>
+            </a:schemeClr>
+          </a:solidFill>
+          <a:ln>
+            <a:prstDash val="sysDash"/>
+          </a:ln>
+        </p:spPr>
+        <p:style>
+          <a:lnRef idx="2">
+            <a:schemeClr val="accent1">
+              <a:shade val="15000"/>
+            </a:schemeClr>
+          </a:lnRef>
+          <a:fillRef idx="1">
+            <a:schemeClr val="accent1"/>
+          </a:fillRef>
+          <a:effectRef idx="0">
+            <a:schemeClr val="accent1"/>
+          </a:effectRef>
+          <a:fontRef idx="minor">
+            <a:schemeClr val="lt1"/>
+          </a:fontRef>
+        </p:style>
+        <p:txBody>
+          <a:bodyPr rtlCol="0" anchor="ctr"/>
+          <a:lstStyle/>
+          <a:p>
+            <a:r>
+              <a:rPr lang="en-SG" sz="1200" b="1" dirty="0">
+                <a:solidFill>
+                  <a:schemeClr val="tx1"/>
+                </a:solidFill>
+              </a:rPr>
+              <a:t>Attack result archive database</a:t>
+            </a:r>
+          </a:p>
+        </p:txBody>
+      </p:sp>
+      <p:pic>
+        <p:nvPicPr>
+          <p:cNvPr id="23" name="Picture 22">
+            <a:extLst>
+              <a:ext uri="{FF2B5EF4-FFF2-40B4-BE49-F238E27FC236}">
+                <a16:creationId xmlns:a16="http://schemas.microsoft.com/office/drawing/2014/main" id="{10701B00-2B59-7F31-9B62-DF90874BBCF3}"/>
+              </a:ext>
+            </a:extLst>
+          </p:cNvPr>
+          <p:cNvPicPr>
+            <a:picLocks noChangeAspect="1"/>
+          </p:cNvPicPr>
+          <p:nvPr/>
+        </p:nvPicPr>
+        <p:blipFill>
+          <a:blip r:embed="rId5"/>
+          <a:stretch>
+            <a:fillRect/>
+          </a:stretch>
+        </p:blipFill>
+        <p:spPr>
+          <a:xfrm>
+            <a:off x="8881535" y="5026991"/>
+            <a:ext cx="1499691" cy="690075"/>
+          </a:xfrm>
+          <a:prstGeom prst="rect">
+            <a:avLst/>
+          </a:prstGeom>
+          <a:ln w="19050">
+            <a:solidFill>
+              <a:srgbClr val="FF0000"/>
+            </a:solidFill>
+            <a:prstDash val="sysDash"/>
+          </a:ln>
+        </p:spPr>
+      </p:pic>
+      <p:pic>
+        <p:nvPicPr>
+          <p:cNvPr id="24" name="Picture 23">
+            <a:extLst>
+              <a:ext uri="{FF2B5EF4-FFF2-40B4-BE49-F238E27FC236}">
+                <a16:creationId xmlns:a16="http://schemas.microsoft.com/office/drawing/2014/main" id="{4FD86D50-02DA-6E03-2D6A-1FC298FD5DB4}"/>
+              </a:ext>
+            </a:extLst>
+          </p:cNvPr>
+          <p:cNvPicPr>
+            <a:picLocks noChangeAspect="1"/>
+          </p:cNvPicPr>
+          <p:nvPr/>
+        </p:nvPicPr>
+        <p:blipFill>
+          <a:blip r:embed="rId6"/>
+          <a:stretch>
+            <a:fillRect/>
+          </a:stretch>
+        </p:blipFill>
+        <p:spPr>
+          <a:xfrm>
+            <a:off x="9120273" y="3254251"/>
+            <a:ext cx="837543" cy="644907"/>
+          </a:xfrm>
+          <a:prstGeom prst="rect">
+            <a:avLst/>
+          </a:prstGeom>
+          <a:ln w="9525">
+            <a:solidFill>
+              <a:schemeClr val="bg1"/>
+            </a:solidFill>
+          </a:ln>
+        </p:spPr>
+      </p:pic>
+      <p:sp>
+        <p:nvSpPr>
+          <p:cNvPr id="25" name="Rectangle 24">
+            <a:extLst>
+              <a:ext uri="{FF2B5EF4-FFF2-40B4-BE49-F238E27FC236}">
+                <a16:creationId xmlns:a16="http://schemas.microsoft.com/office/drawing/2014/main" id="{7EA81E9A-028C-F0EC-E0B5-4D5E5BA3B0D0}"/>
+              </a:ext>
+            </a:extLst>
+          </p:cNvPr>
+          <p:cNvSpPr/>
+          <p:nvPr/>
+        </p:nvSpPr>
+        <p:spPr>
+          <a:xfrm>
+            <a:off x="8984623" y="4080313"/>
+            <a:ext cx="1396603" cy="199018"/>
+          </a:xfrm>
+          <a:prstGeom prst="rect">
+            <a:avLst/>
+          </a:prstGeom>
+          <a:solidFill>
+            <a:schemeClr val="accent6">
+              <a:lumMod val="60000"/>
+              <a:lumOff val="40000"/>
+            </a:schemeClr>
+          </a:solidFill>
+          <a:ln>
+            <a:prstDash val="sysDash"/>
+          </a:ln>
+        </p:spPr>
+        <p:style>
+          <a:lnRef idx="2">
+            <a:schemeClr val="accent1">
+              <a:shade val="15000"/>
+            </a:schemeClr>
+          </a:lnRef>
+          <a:fillRef idx="1">
+            <a:schemeClr val="accent1"/>
+          </a:fillRef>
+          <a:effectRef idx="0">
+            <a:schemeClr val="accent1"/>
+          </a:effectRef>
+          <a:fontRef idx="minor">
+            <a:schemeClr val="lt1"/>
+          </a:fontRef>
+        </p:style>
+        <p:txBody>
+          <a:bodyPr rtlCol="0" anchor="ctr"/>
+          <a:lstStyle/>
+          <a:p>
+            <a:r>
+              <a:rPr lang="en-SG" sz="1200" b="1" dirty="0">
+                <a:solidFill>
+                  <a:schemeClr val="tx1"/>
+                </a:solidFill>
+              </a:rPr>
+              <a:t>c2Client-API</a:t>
+            </a:r>
+          </a:p>
+        </p:txBody>
+      </p:sp>
+      <p:sp>
+        <p:nvSpPr>
+          <p:cNvPr id="26" name="Rectangle 25">
+            <a:extLst>
+              <a:ext uri="{FF2B5EF4-FFF2-40B4-BE49-F238E27FC236}">
+                <a16:creationId xmlns:a16="http://schemas.microsoft.com/office/drawing/2014/main" id="{4124DCC0-4CCA-73B7-2C0B-DCD0663EEFBB}"/>
+              </a:ext>
+            </a:extLst>
+          </p:cNvPr>
+          <p:cNvSpPr/>
+          <p:nvPr/>
+        </p:nvSpPr>
+        <p:spPr>
+          <a:xfrm>
+            <a:off x="8991495" y="4390777"/>
+            <a:ext cx="1389731" cy="199018"/>
+          </a:xfrm>
+          <a:prstGeom prst="rect">
+            <a:avLst/>
+          </a:prstGeom>
+          <a:solidFill>
+            <a:schemeClr val="accent6">
+              <a:lumMod val="60000"/>
+              <a:lumOff val="40000"/>
+            </a:schemeClr>
+          </a:solidFill>
+          <a:ln>
+            <a:prstDash val="sysDash"/>
+          </a:ln>
+        </p:spPr>
+        <p:style>
+          <a:lnRef idx="2">
+            <a:schemeClr val="accent1">
+              <a:shade val="15000"/>
+            </a:schemeClr>
+          </a:lnRef>
+          <a:fillRef idx="1">
+            <a:schemeClr val="accent1"/>
+          </a:fillRef>
+          <a:effectRef idx="0">
+            <a:schemeClr val="accent1"/>
+          </a:effectRef>
+          <a:fontRef idx="minor">
+            <a:schemeClr val="lt1"/>
+          </a:fontRef>
+        </p:style>
+        <p:txBody>
+          <a:bodyPr rtlCol="0" anchor="ctr"/>
+          <a:lstStyle/>
+          <a:p>
+            <a:r>
+              <a:rPr lang="en-SG" sz="1200" b="1" dirty="0" err="1">
+                <a:solidFill>
+                  <a:schemeClr val="tx1"/>
+                </a:solidFill>
+              </a:rPr>
+              <a:t>HttpRequest</a:t>
+            </a:r>
+            <a:r>
+              <a:rPr lang="en-SG" sz="1200" b="1" dirty="0">
+                <a:solidFill>
+                  <a:schemeClr val="tx1"/>
+                </a:solidFill>
+              </a:rPr>
+              <a:t>-API</a:t>
+            </a:r>
+          </a:p>
+        </p:txBody>
+      </p:sp>
+      <p:sp>
+        <p:nvSpPr>
+          <p:cNvPr id="27" name="Rectangle 26">
+            <a:extLst>
+              <a:ext uri="{FF2B5EF4-FFF2-40B4-BE49-F238E27FC236}">
+                <a16:creationId xmlns:a16="http://schemas.microsoft.com/office/drawing/2014/main" id="{58817D2C-63DC-9E2A-DE23-CC71DF126CF5}"/>
+              </a:ext>
+            </a:extLst>
+          </p:cNvPr>
+          <p:cNvSpPr/>
+          <p:nvPr/>
+        </p:nvSpPr>
+        <p:spPr>
+          <a:xfrm>
+            <a:off x="8999612" y="4724501"/>
+            <a:ext cx="1381614" cy="199018"/>
+          </a:xfrm>
+          <a:prstGeom prst="rect">
+            <a:avLst/>
+          </a:prstGeom>
+          <a:solidFill>
+            <a:schemeClr val="accent6">
+              <a:lumMod val="60000"/>
+              <a:lumOff val="40000"/>
+            </a:schemeClr>
+          </a:solidFill>
+          <a:ln>
+            <a:prstDash val="sysDash"/>
+          </a:ln>
+        </p:spPr>
+        <p:style>
+          <a:lnRef idx="2">
+            <a:schemeClr val="accent1">
+              <a:shade val="15000"/>
+            </a:schemeClr>
+          </a:lnRef>
+          <a:fillRef idx="1">
+            <a:schemeClr val="accent1"/>
+          </a:fillRef>
+          <a:effectRef idx="0">
+            <a:schemeClr val="accent1"/>
+          </a:effectRef>
+          <a:fontRef idx="minor">
+            <a:schemeClr val="lt1"/>
+          </a:fontRef>
+        </p:style>
+        <p:txBody>
+          <a:bodyPr rtlCol="0" anchor="ctr"/>
+          <a:lstStyle/>
+          <a:p>
+            <a:r>
+              <a:rPr lang="en-SG" sz="1200" b="1" dirty="0" err="1">
+                <a:solidFill>
+                  <a:schemeClr val="tx1"/>
+                </a:solidFill>
+              </a:rPr>
+              <a:t>WebPage</a:t>
+            </a:r>
+            <a:r>
+              <a:rPr lang="en-SG" sz="1200" b="1" dirty="0">
+                <a:solidFill>
+                  <a:schemeClr val="tx1"/>
+                </a:solidFill>
+              </a:rPr>
+              <a:t>-API</a:t>
+            </a:r>
+          </a:p>
+        </p:txBody>
+      </p:sp>
     </p:spTree>
     <p:extLst>
       <p:ext uri="{BB962C8B-B14F-4D97-AF65-F5344CB8AC3E}">

</xml_diff>

<commit_message>
Added the C2 hub read me file.
</commit_message>
<xml_diff>
--- a/doc/designDoc.pptx
+++ b/doc/designDoc.pptx
@@ -11006,7 +11006,7 @@
         </p:blipFill>
         <p:spPr>
           <a:xfrm>
-            <a:off x="113328" y="2115879"/>
+            <a:off x="113328" y="259647"/>
             <a:ext cx="5608280" cy="3200400"/>
           </a:xfrm>
           <a:prstGeom prst="rect">
@@ -11104,7 +11104,7 @@
         </p:blipFill>
         <p:spPr>
           <a:xfrm>
-            <a:off x="5819454" y="2115879"/>
+            <a:off x="5819454" y="259647"/>
             <a:ext cx="6259218" cy="3200400"/>
           </a:xfrm>
           <a:prstGeom prst="rect">
@@ -11174,6 +11174,1535 @@
           </a:p>
         </p:txBody>
       </p:sp>
+      <p:cxnSp>
+        <p:nvCxnSpPr>
+          <p:cNvPr id="2" name="Connector: Elbow 1">
+            <a:extLst>
+              <a:ext uri="{FF2B5EF4-FFF2-40B4-BE49-F238E27FC236}">
+                <a16:creationId xmlns:a16="http://schemas.microsoft.com/office/drawing/2014/main" id="{87F2E8F2-25CC-2EFB-C795-12A40B0EB0C6}"/>
+              </a:ext>
+            </a:extLst>
+          </p:cNvPr>
+          <p:cNvCxnSpPr>
+            <a:cxnSpLocks/>
+            <a:stCxn id="18" idx="0"/>
+            <a:endCxn id="23" idx="3"/>
+          </p:cNvCxnSpPr>
+          <p:nvPr/>
+        </p:nvCxnSpPr>
+        <p:spPr>
+          <a:xfrm flipV="1">
+            <a:off x="5699692" y="4754490"/>
+            <a:ext cx="1104048" cy="844623"/>
+          </a:xfrm>
+          <a:prstGeom prst="bentConnector3">
+            <a:avLst>
+              <a:gd name="adj1" fmla="val 50000"/>
+            </a:avLst>
+          </a:prstGeom>
+          <a:ln w="19050">
+            <a:solidFill>
+              <a:srgbClr val="FF0000"/>
+            </a:solidFill>
+            <a:prstDash val="sysDash"/>
+            <a:tailEnd type="triangle"/>
+          </a:ln>
+        </p:spPr>
+        <p:style>
+          <a:lnRef idx="1">
+            <a:schemeClr val="accent1"/>
+          </a:lnRef>
+          <a:fillRef idx="0">
+            <a:schemeClr val="accent1"/>
+          </a:fillRef>
+          <a:effectRef idx="0">
+            <a:schemeClr val="accent1"/>
+          </a:effectRef>
+          <a:fontRef idx="minor">
+            <a:schemeClr val="tx1"/>
+          </a:fontRef>
+        </p:style>
+      </p:cxnSp>
+      <p:pic>
+        <p:nvPicPr>
+          <p:cNvPr id="3" name="Picture 2">
+            <a:extLst>
+              <a:ext uri="{FF2B5EF4-FFF2-40B4-BE49-F238E27FC236}">
+                <a16:creationId xmlns:a16="http://schemas.microsoft.com/office/drawing/2014/main" id="{2516D276-F7B9-9654-EE4A-FC8E9FCDD949}"/>
+              </a:ext>
+            </a:extLst>
+          </p:cNvPr>
+          <p:cNvPicPr>
+            <a:picLocks noChangeAspect="1"/>
+          </p:cNvPicPr>
+          <p:nvPr/>
+        </p:nvPicPr>
+        <p:blipFill>
+          <a:blip r:embed="rId4"/>
+          <a:stretch>
+            <a:fillRect/>
+          </a:stretch>
+        </p:blipFill>
+        <p:spPr>
+          <a:xfrm>
+            <a:off x="4257577" y="4143660"/>
+            <a:ext cx="1529824" cy="703941"/>
+          </a:xfrm>
+          <a:prstGeom prst="rect">
+            <a:avLst/>
+          </a:prstGeom>
+          <a:ln w="28575">
+            <a:solidFill>
+              <a:srgbClr val="FF0000"/>
+            </a:solidFill>
+            <a:prstDash val="sysDash"/>
+          </a:ln>
+        </p:spPr>
+      </p:pic>
+      <p:pic>
+        <p:nvPicPr>
+          <p:cNvPr id="4" name="Picture 3">
+            <a:extLst>
+              <a:ext uri="{FF2B5EF4-FFF2-40B4-BE49-F238E27FC236}">
+                <a16:creationId xmlns:a16="http://schemas.microsoft.com/office/drawing/2014/main" id="{299BEB6D-8B07-DF4C-CD76-65F2D3C2D2C2}"/>
+              </a:ext>
+            </a:extLst>
+          </p:cNvPr>
+          <p:cNvPicPr>
+            <a:picLocks noChangeAspect="1"/>
+          </p:cNvPicPr>
+          <p:nvPr/>
+        </p:nvPicPr>
+        <p:blipFill>
+          <a:blip r:embed="rId5"/>
+          <a:stretch>
+            <a:fillRect/>
+          </a:stretch>
+        </p:blipFill>
+        <p:spPr>
+          <a:xfrm>
+            <a:off x="794009" y="4495891"/>
+            <a:ext cx="489507" cy="542715"/>
+          </a:xfrm>
+          <a:prstGeom prst="rect">
+            <a:avLst/>
+          </a:prstGeom>
+          <a:ln w="9525">
+            <a:solidFill>
+              <a:schemeClr val="tx1"/>
+            </a:solidFill>
+          </a:ln>
+        </p:spPr>
+      </p:pic>
+      <p:sp>
+        <p:nvSpPr>
+          <p:cNvPr id="5" name="Arrow: Left-Right 4">
+            <a:extLst>
+              <a:ext uri="{FF2B5EF4-FFF2-40B4-BE49-F238E27FC236}">
+                <a16:creationId xmlns:a16="http://schemas.microsoft.com/office/drawing/2014/main" id="{DAF68733-7964-D81C-C351-93DCAC5B8C1B}"/>
+              </a:ext>
+            </a:extLst>
+          </p:cNvPr>
+          <p:cNvSpPr/>
+          <p:nvPr/>
+        </p:nvSpPr>
+        <p:spPr>
+          <a:xfrm>
+            <a:off x="1393875" y="4679834"/>
+            <a:ext cx="303192" cy="111327"/>
+          </a:xfrm>
+          <a:prstGeom prst="leftRightArrow">
+            <a:avLst/>
+          </a:prstGeom>
+          <a:noFill/>
+          <a:ln>
+            <a:solidFill>
+              <a:srgbClr val="FF0000"/>
+            </a:solidFill>
+          </a:ln>
+        </p:spPr>
+        <p:style>
+          <a:lnRef idx="2">
+            <a:schemeClr val="accent1">
+              <a:shade val="15000"/>
+            </a:schemeClr>
+          </a:lnRef>
+          <a:fillRef idx="1">
+            <a:schemeClr val="accent1"/>
+          </a:fillRef>
+          <a:effectRef idx="0">
+            <a:schemeClr val="accent1"/>
+          </a:effectRef>
+          <a:fontRef idx="minor">
+            <a:schemeClr val="lt1"/>
+          </a:fontRef>
+        </p:style>
+        <p:txBody>
+          <a:bodyPr rtlCol="0" anchor="ctr"/>
+          <a:lstStyle/>
+          <a:p>
+            <a:pPr algn="ctr"/>
+            <a:endParaRPr lang="en-SG"/>
+          </a:p>
+        </p:txBody>
+      </p:sp>
+      <p:pic>
+        <p:nvPicPr>
+          <p:cNvPr id="6" name="Picture 5">
+            <a:extLst>
+              <a:ext uri="{FF2B5EF4-FFF2-40B4-BE49-F238E27FC236}">
+                <a16:creationId xmlns:a16="http://schemas.microsoft.com/office/drawing/2014/main" id="{5B2D581A-F6E5-FC6E-3777-C8A7010FAB77}"/>
+              </a:ext>
+            </a:extLst>
+          </p:cNvPr>
+          <p:cNvPicPr>
+            <a:picLocks noChangeAspect="1"/>
+          </p:cNvPicPr>
+          <p:nvPr/>
+        </p:nvPicPr>
+        <p:blipFill>
+          <a:blip r:embed="rId6"/>
+          <a:stretch>
+            <a:fillRect/>
+          </a:stretch>
+        </p:blipFill>
+        <p:spPr>
+          <a:xfrm>
+            <a:off x="1807426" y="4421854"/>
+            <a:ext cx="1356669" cy="728079"/>
+          </a:xfrm>
+          <a:prstGeom prst="rect">
+            <a:avLst/>
+          </a:prstGeom>
+          <a:ln w="6350">
+            <a:solidFill>
+              <a:schemeClr val="tx1"/>
+            </a:solidFill>
+          </a:ln>
+        </p:spPr>
+      </p:pic>
+      <p:pic>
+        <p:nvPicPr>
+          <p:cNvPr id="8" name="Picture 7">
+            <a:extLst>
+              <a:ext uri="{FF2B5EF4-FFF2-40B4-BE49-F238E27FC236}">
+                <a16:creationId xmlns:a16="http://schemas.microsoft.com/office/drawing/2014/main" id="{21648364-2090-7D8D-6F77-2838BDBC905D}"/>
+              </a:ext>
+            </a:extLst>
+          </p:cNvPr>
+          <p:cNvPicPr>
+            <a:picLocks noChangeAspect="1"/>
+          </p:cNvPicPr>
+          <p:nvPr/>
+        </p:nvPicPr>
+        <p:blipFill>
+          <a:blip r:embed="rId5"/>
+          <a:stretch>
+            <a:fillRect/>
+          </a:stretch>
+        </p:blipFill>
+        <p:spPr>
+          <a:xfrm>
+            <a:off x="755977" y="5749488"/>
+            <a:ext cx="489507" cy="542715"/>
+          </a:xfrm>
+          <a:prstGeom prst="rect">
+            <a:avLst/>
+          </a:prstGeom>
+          <a:ln w="9525">
+            <a:solidFill>
+              <a:schemeClr val="tx1"/>
+            </a:solidFill>
+          </a:ln>
+        </p:spPr>
+      </p:pic>
+      <p:sp>
+        <p:nvSpPr>
+          <p:cNvPr id="9" name="Arrow: Left-Right 8">
+            <a:extLst>
+              <a:ext uri="{FF2B5EF4-FFF2-40B4-BE49-F238E27FC236}">
+                <a16:creationId xmlns:a16="http://schemas.microsoft.com/office/drawing/2014/main" id="{53D5A2FD-6B26-E96D-332D-B57699337D80}"/>
+              </a:ext>
+            </a:extLst>
+          </p:cNvPr>
+          <p:cNvSpPr/>
+          <p:nvPr/>
+        </p:nvSpPr>
+        <p:spPr>
+          <a:xfrm>
+            <a:off x="1353784" y="5951219"/>
+            <a:ext cx="303192" cy="111327"/>
+          </a:xfrm>
+          <a:prstGeom prst="leftRightArrow">
+            <a:avLst/>
+          </a:prstGeom>
+          <a:noFill/>
+          <a:ln>
+            <a:solidFill>
+              <a:srgbClr val="FF0000"/>
+            </a:solidFill>
+          </a:ln>
+        </p:spPr>
+        <p:style>
+          <a:lnRef idx="2">
+            <a:schemeClr val="accent1">
+              <a:shade val="15000"/>
+            </a:schemeClr>
+          </a:lnRef>
+          <a:fillRef idx="1">
+            <a:schemeClr val="accent1"/>
+          </a:fillRef>
+          <a:effectRef idx="0">
+            <a:schemeClr val="accent1"/>
+          </a:effectRef>
+          <a:fontRef idx="minor">
+            <a:schemeClr val="lt1"/>
+          </a:fontRef>
+        </p:style>
+        <p:txBody>
+          <a:bodyPr rtlCol="0" anchor="ctr"/>
+          <a:lstStyle/>
+          <a:p>
+            <a:pPr algn="ctr"/>
+            <a:endParaRPr lang="en-SG"/>
+          </a:p>
+        </p:txBody>
+      </p:sp>
+      <p:pic>
+        <p:nvPicPr>
+          <p:cNvPr id="11" name="Picture 10">
+            <a:extLst>
+              <a:ext uri="{FF2B5EF4-FFF2-40B4-BE49-F238E27FC236}">
+                <a16:creationId xmlns:a16="http://schemas.microsoft.com/office/drawing/2014/main" id="{37B4F229-1C15-24DF-F737-846788B7C317}"/>
+              </a:ext>
+            </a:extLst>
+          </p:cNvPr>
+          <p:cNvPicPr>
+            <a:picLocks noChangeAspect="1"/>
+          </p:cNvPicPr>
+          <p:nvPr/>
+        </p:nvPicPr>
+        <p:blipFill>
+          <a:blip r:embed="rId6"/>
+          <a:stretch>
+            <a:fillRect/>
+          </a:stretch>
+        </p:blipFill>
+        <p:spPr>
+          <a:xfrm>
+            <a:off x="1769393" y="5642845"/>
+            <a:ext cx="1356669" cy="728079"/>
+          </a:xfrm>
+          <a:prstGeom prst="rect">
+            <a:avLst/>
+          </a:prstGeom>
+          <a:ln w="6350">
+            <a:solidFill>
+              <a:schemeClr val="tx1"/>
+            </a:solidFill>
+          </a:ln>
+        </p:spPr>
+      </p:pic>
+      <p:sp>
+        <p:nvSpPr>
+          <p:cNvPr id="14" name="TextBox 13">
+            <a:extLst>
+              <a:ext uri="{FF2B5EF4-FFF2-40B4-BE49-F238E27FC236}">
+                <a16:creationId xmlns:a16="http://schemas.microsoft.com/office/drawing/2014/main" id="{B89D1164-7855-A10B-A8BF-584E7B31B0FD}"/>
+              </a:ext>
+            </a:extLst>
+          </p:cNvPr>
+          <p:cNvSpPr txBox="1"/>
+          <p:nvPr/>
+        </p:nvSpPr>
+        <p:spPr>
+          <a:xfrm>
+            <a:off x="665844" y="4089028"/>
+            <a:ext cx="1209039" cy="461665"/>
+          </a:xfrm>
+          <a:prstGeom prst="rect">
+            <a:avLst/>
+          </a:prstGeom>
+          <a:noFill/>
+        </p:spPr>
+        <p:txBody>
+          <a:bodyPr wrap="square" rtlCol="0">
+            <a:spAutoFit/>
+          </a:bodyPr>
+          <a:lstStyle/>
+          <a:p>
+            <a:r>
+              <a:rPr lang="en-US" sz="1200" b="1" dirty="0"/>
+              <a:t>Red team member </a:t>
+            </a:r>
+            <a:endParaRPr lang="en-SG" sz="1200" b="1" dirty="0"/>
+          </a:p>
+        </p:txBody>
+      </p:sp>
+      <p:sp>
+        <p:nvSpPr>
+          <p:cNvPr id="15" name="TextBox 14">
+            <a:extLst>
+              <a:ext uri="{FF2B5EF4-FFF2-40B4-BE49-F238E27FC236}">
+                <a16:creationId xmlns:a16="http://schemas.microsoft.com/office/drawing/2014/main" id="{E9255FCB-884D-A816-130B-FA244C0459AF}"/>
+              </a:ext>
+            </a:extLst>
+          </p:cNvPr>
+          <p:cNvSpPr txBox="1"/>
+          <p:nvPr/>
+        </p:nvSpPr>
+        <p:spPr>
+          <a:xfrm>
+            <a:off x="645376" y="5329762"/>
+            <a:ext cx="1209039" cy="461665"/>
+          </a:xfrm>
+          <a:prstGeom prst="rect">
+            <a:avLst/>
+          </a:prstGeom>
+          <a:noFill/>
+        </p:spPr>
+        <p:txBody>
+          <a:bodyPr wrap="square" rtlCol="0">
+            <a:spAutoFit/>
+          </a:bodyPr>
+          <a:lstStyle/>
+          <a:p>
+            <a:r>
+              <a:rPr lang="en-US" sz="1200" b="1" dirty="0"/>
+              <a:t>Red team member </a:t>
+            </a:r>
+            <a:endParaRPr lang="en-SG" sz="1200" b="1" dirty="0"/>
+          </a:p>
+        </p:txBody>
+      </p:sp>
+      <p:sp>
+        <p:nvSpPr>
+          <p:cNvPr id="16" name="TextBox 15">
+            <a:extLst>
+              <a:ext uri="{FF2B5EF4-FFF2-40B4-BE49-F238E27FC236}">
+                <a16:creationId xmlns:a16="http://schemas.microsoft.com/office/drawing/2014/main" id="{417273D8-B4DB-C734-0A87-516A8B862FC0}"/>
+              </a:ext>
+            </a:extLst>
+          </p:cNvPr>
+          <p:cNvSpPr txBox="1"/>
+          <p:nvPr/>
+        </p:nvSpPr>
+        <p:spPr>
+          <a:xfrm>
+            <a:off x="1764631" y="4144855"/>
+            <a:ext cx="1356669" cy="276999"/>
+          </a:xfrm>
+          <a:prstGeom prst="rect">
+            <a:avLst/>
+          </a:prstGeom>
+          <a:noFill/>
+        </p:spPr>
+        <p:txBody>
+          <a:bodyPr wrap="square" rtlCol="0">
+            <a:spAutoFit/>
+          </a:bodyPr>
+          <a:lstStyle/>
+          <a:p>
+            <a:r>
+              <a:rPr lang="en-US" sz="1200" b="1" dirty="0"/>
+              <a:t>RTC2 Web-UI</a:t>
+            </a:r>
+            <a:endParaRPr lang="en-SG" sz="1200" b="1" dirty="0"/>
+          </a:p>
+        </p:txBody>
+      </p:sp>
+      <p:sp>
+        <p:nvSpPr>
+          <p:cNvPr id="17" name="TextBox 16">
+            <a:extLst>
+              <a:ext uri="{FF2B5EF4-FFF2-40B4-BE49-F238E27FC236}">
+                <a16:creationId xmlns:a16="http://schemas.microsoft.com/office/drawing/2014/main" id="{B9565925-C402-298B-86DC-BC03583BC6F7}"/>
+              </a:ext>
+            </a:extLst>
+          </p:cNvPr>
+          <p:cNvSpPr txBox="1"/>
+          <p:nvPr/>
+        </p:nvSpPr>
+        <p:spPr>
+          <a:xfrm>
+            <a:off x="1707405" y="5396242"/>
+            <a:ext cx="1249927" cy="276999"/>
+          </a:xfrm>
+          <a:prstGeom prst="rect">
+            <a:avLst/>
+          </a:prstGeom>
+          <a:noFill/>
+        </p:spPr>
+        <p:txBody>
+          <a:bodyPr wrap="square" rtlCol="0">
+            <a:spAutoFit/>
+          </a:bodyPr>
+          <a:lstStyle/>
+          <a:p>
+            <a:r>
+              <a:rPr lang="en-US" sz="1200" b="1" dirty="0"/>
+              <a:t>RTC2 Web-UI</a:t>
+            </a:r>
+            <a:endParaRPr lang="en-SG" sz="1200" b="1" dirty="0"/>
+          </a:p>
+        </p:txBody>
+      </p:sp>
+      <p:sp>
+        <p:nvSpPr>
+          <p:cNvPr id="18" name="Cloud 17">
+            <a:extLst>
+              <a:ext uri="{FF2B5EF4-FFF2-40B4-BE49-F238E27FC236}">
+                <a16:creationId xmlns:a16="http://schemas.microsoft.com/office/drawing/2014/main" id="{33820101-555C-C8D7-9D82-40C1EE81CE1B}"/>
+              </a:ext>
+            </a:extLst>
+          </p:cNvPr>
+          <p:cNvSpPr/>
+          <p:nvPr/>
+        </p:nvSpPr>
+        <p:spPr>
+          <a:xfrm>
+            <a:off x="4344155" y="5247142"/>
+            <a:ext cx="1356668" cy="703941"/>
+          </a:xfrm>
+          <a:prstGeom prst="cloud">
+            <a:avLst/>
+          </a:prstGeom>
+          <a:noFill/>
+        </p:spPr>
+        <p:style>
+          <a:lnRef idx="2">
+            <a:schemeClr val="accent1">
+              <a:shade val="15000"/>
+            </a:schemeClr>
+          </a:lnRef>
+          <a:fillRef idx="1">
+            <a:schemeClr val="accent1"/>
+          </a:fillRef>
+          <a:effectRef idx="0">
+            <a:schemeClr val="accent1"/>
+          </a:effectRef>
+          <a:fontRef idx="minor">
+            <a:schemeClr val="lt1"/>
+          </a:fontRef>
+        </p:style>
+        <p:txBody>
+          <a:bodyPr rtlCol="0" anchor="ctr"/>
+          <a:lstStyle/>
+          <a:p>
+            <a:pPr algn="ctr"/>
+            <a:r>
+              <a:rPr lang="en-SG" sz="1400" b="1" dirty="0">
+                <a:solidFill>
+                  <a:schemeClr val="tx1"/>
+                </a:solidFill>
+              </a:rPr>
+              <a:t>Internet</a:t>
+            </a:r>
+            <a:r>
+              <a:rPr lang="en-SG" dirty="0">
+                <a:solidFill>
+                  <a:schemeClr val="tx1"/>
+                </a:solidFill>
+              </a:rPr>
+              <a:t> </a:t>
+            </a:r>
+          </a:p>
+        </p:txBody>
+      </p:sp>
+      <p:cxnSp>
+        <p:nvCxnSpPr>
+          <p:cNvPr id="19" name="Connector: Elbow 18">
+            <a:extLst>
+              <a:ext uri="{FF2B5EF4-FFF2-40B4-BE49-F238E27FC236}">
+                <a16:creationId xmlns:a16="http://schemas.microsoft.com/office/drawing/2014/main" id="{2DAAB1B5-F1E9-D0EA-ECCF-CC9CF0E160B8}"/>
+              </a:ext>
+            </a:extLst>
+          </p:cNvPr>
+          <p:cNvCxnSpPr>
+            <a:cxnSpLocks/>
+            <a:stCxn id="6" idx="3"/>
+            <a:endCxn id="3" idx="1"/>
+          </p:cNvCxnSpPr>
+          <p:nvPr/>
+        </p:nvCxnSpPr>
+        <p:spPr>
+          <a:xfrm flipV="1">
+            <a:off x="3164095" y="4495631"/>
+            <a:ext cx="1093482" cy="290263"/>
+          </a:xfrm>
+          <a:prstGeom prst="bentConnector3">
+            <a:avLst>
+              <a:gd name="adj1" fmla="val 50000"/>
+            </a:avLst>
+          </a:prstGeom>
+          <a:ln w="19050">
+            <a:solidFill>
+              <a:srgbClr val="FF0000"/>
+            </a:solidFill>
+            <a:headEnd type="triangle"/>
+            <a:tailEnd type="triangle"/>
+          </a:ln>
+        </p:spPr>
+        <p:style>
+          <a:lnRef idx="1">
+            <a:schemeClr val="accent1"/>
+          </a:lnRef>
+          <a:fillRef idx="0">
+            <a:schemeClr val="accent1"/>
+          </a:fillRef>
+          <a:effectRef idx="0">
+            <a:schemeClr val="accent1"/>
+          </a:effectRef>
+          <a:fontRef idx="minor">
+            <a:schemeClr val="tx1"/>
+          </a:fontRef>
+        </p:style>
+      </p:cxnSp>
+      <p:cxnSp>
+        <p:nvCxnSpPr>
+          <p:cNvPr id="20" name="Connector: Elbow 19">
+            <a:extLst>
+              <a:ext uri="{FF2B5EF4-FFF2-40B4-BE49-F238E27FC236}">
+                <a16:creationId xmlns:a16="http://schemas.microsoft.com/office/drawing/2014/main" id="{AA9E00E8-4E11-36E5-17F5-173889156994}"/>
+              </a:ext>
+            </a:extLst>
+          </p:cNvPr>
+          <p:cNvCxnSpPr>
+            <a:cxnSpLocks/>
+            <a:stCxn id="11" idx="3"/>
+            <a:endCxn id="18" idx="2"/>
+          </p:cNvCxnSpPr>
+          <p:nvPr/>
+        </p:nvCxnSpPr>
+        <p:spPr>
+          <a:xfrm flipV="1">
+            <a:off x="3126062" y="5599113"/>
+            <a:ext cx="1222301" cy="407772"/>
+          </a:xfrm>
+          <a:prstGeom prst="bentConnector3">
+            <a:avLst>
+              <a:gd name="adj1" fmla="val 50000"/>
+            </a:avLst>
+          </a:prstGeom>
+          <a:ln w="19050">
+            <a:solidFill>
+              <a:srgbClr val="FF0000"/>
+            </a:solidFill>
+            <a:headEnd type="triangle"/>
+            <a:tailEnd type="triangle"/>
+          </a:ln>
+        </p:spPr>
+        <p:style>
+          <a:lnRef idx="1">
+            <a:schemeClr val="accent1"/>
+          </a:lnRef>
+          <a:fillRef idx="0">
+            <a:schemeClr val="accent1"/>
+          </a:fillRef>
+          <a:effectRef idx="0">
+            <a:schemeClr val="accent1"/>
+          </a:effectRef>
+          <a:fontRef idx="minor">
+            <a:schemeClr val="tx1"/>
+          </a:fontRef>
+        </p:style>
+      </p:cxnSp>
+      <p:cxnSp>
+        <p:nvCxnSpPr>
+          <p:cNvPr id="21" name="Straight Arrow Connector 20">
+            <a:extLst>
+              <a:ext uri="{FF2B5EF4-FFF2-40B4-BE49-F238E27FC236}">
+                <a16:creationId xmlns:a16="http://schemas.microsoft.com/office/drawing/2014/main" id="{2F1A28B8-E20E-BA2E-D184-ED395959AA09}"/>
+              </a:ext>
+            </a:extLst>
+          </p:cNvPr>
+          <p:cNvCxnSpPr>
+            <a:cxnSpLocks/>
+          </p:cNvCxnSpPr>
+          <p:nvPr/>
+        </p:nvCxnSpPr>
+        <p:spPr>
+          <a:xfrm flipV="1">
+            <a:off x="4829391" y="4847601"/>
+            <a:ext cx="0" cy="439789"/>
+          </a:xfrm>
+          <a:prstGeom prst="straightConnector1">
+            <a:avLst/>
+          </a:prstGeom>
+          <a:ln w="19050">
+            <a:solidFill>
+              <a:srgbClr val="FF0000"/>
+            </a:solidFill>
+            <a:headEnd type="triangle"/>
+            <a:tailEnd type="triangle"/>
+          </a:ln>
+        </p:spPr>
+        <p:style>
+          <a:lnRef idx="1">
+            <a:schemeClr val="accent1"/>
+          </a:lnRef>
+          <a:fillRef idx="0">
+            <a:schemeClr val="accent1"/>
+          </a:fillRef>
+          <a:effectRef idx="0">
+            <a:schemeClr val="accent1"/>
+          </a:effectRef>
+          <a:fontRef idx="minor">
+            <a:schemeClr val="tx1"/>
+          </a:fontRef>
+        </p:style>
+      </p:cxnSp>
+      <p:pic>
+        <p:nvPicPr>
+          <p:cNvPr id="22" name="Picture 21">
+            <a:extLst>
+              <a:ext uri="{FF2B5EF4-FFF2-40B4-BE49-F238E27FC236}">
+                <a16:creationId xmlns:a16="http://schemas.microsoft.com/office/drawing/2014/main" id="{D8E5B916-8073-A03B-CDB2-7BD51E880044}"/>
+              </a:ext>
+            </a:extLst>
+          </p:cNvPr>
+          <p:cNvPicPr>
+            <a:picLocks noChangeAspect="1"/>
+          </p:cNvPicPr>
+          <p:nvPr/>
+        </p:nvPicPr>
+        <p:blipFill>
+          <a:blip r:embed="rId7"/>
+          <a:stretch>
+            <a:fillRect/>
+          </a:stretch>
+        </p:blipFill>
+        <p:spPr>
+          <a:xfrm>
+            <a:off x="6868433" y="4356423"/>
+            <a:ext cx="891414" cy="503386"/>
+          </a:xfrm>
+          <a:prstGeom prst="rect">
+            <a:avLst/>
+          </a:prstGeom>
+        </p:spPr>
+      </p:pic>
+      <p:pic>
+        <p:nvPicPr>
+          <p:cNvPr id="23" name="Picture 22" descr="A red horse on wheels&#10;&#10;Description automatically generated">
+            <a:extLst>
+              <a:ext uri="{FF2B5EF4-FFF2-40B4-BE49-F238E27FC236}">
+                <a16:creationId xmlns:a16="http://schemas.microsoft.com/office/drawing/2014/main" id="{5FBC2D3E-ED4A-7D83-3C93-3F6D36604AC9}"/>
+              </a:ext>
+            </a:extLst>
+          </p:cNvPr>
+          <p:cNvPicPr>
+            <a:picLocks noChangeAspect="1"/>
+          </p:cNvPicPr>
+          <p:nvPr/>
+        </p:nvPicPr>
+        <p:blipFill>
+          <a:blip r:embed="rId8">
+            <a:extLst>
+              <a:ext uri="{28A0092B-C50C-407E-A947-70E740481C1C}">
+                <a14:useLocalDpi xmlns:a14="http://schemas.microsoft.com/office/drawing/2010/main" val="0"/>
+              </a:ext>
+            </a:extLst>
+          </a:blip>
+          <a:stretch>
+            <a:fillRect/>
+          </a:stretch>
+        </p:blipFill>
+        <p:spPr>
+          <a:xfrm flipH="1">
+            <a:off x="6803740" y="4556831"/>
+            <a:ext cx="395317" cy="395317"/>
+          </a:xfrm>
+          <a:prstGeom prst="rect">
+            <a:avLst/>
+          </a:prstGeom>
+          <a:ln w="19050">
+            <a:solidFill>
+              <a:srgbClr val="FF0000"/>
+            </a:solidFill>
+          </a:ln>
+        </p:spPr>
+      </p:pic>
+      <p:pic>
+        <p:nvPicPr>
+          <p:cNvPr id="24" name="Picture 23">
+            <a:extLst>
+              <a:ext uri="{FF2B5EF4-FFF2-40B4-BE49-F238E27FC236}">
+                <a16:creationId xmlns:a16="http://schemas.microsoft.com/office/drawing/2014/main" id="{CE5661F3-F6EB-915B-107C-9C6DE4B51EC5}"/>
+              </a:ext>
+            </a:extLst>
+          </p:cNvPr>
+          <p:cNvPicPr>
+            <a:picLocks noChangeAspect="1"/>
+          </p:cNvPicPr>
+          <p:nvPr/>
+        </p:nvPicPr>
+        <p:blipFill>
+          <a:blip r:embed="rId7"/>
+          <a:stretch>
+            <a:fillRect/>
+          </a:stretch>
+        </p:blipFill>
+        <p:spPr>
+          <a:xfrm>
+            <a:off x="8272149" y="4728352"/>
+            <a:ext cx="891414" cy="503386"/>
+          </a:xfrm>
+          <a:prstGeom prst="rect">
+            <a:avLst/>
+          </a:prstGeom>
+        </p:spPr>
+      </p:pic>
+      <p:pic>
+        <p:nvPicPr>
+          <p:cNvPr id="25" name="Picture 24">
+            <a:extLst>
+              <a:ext uri="{FF2B5EF4-FFF2-40B4-BE49-F238E27FC236}">
+                <a16:creationId xmlns:a16="http://schemas.microsoft.com/office/drawing/2014/main" id="{4C6FDDD9-D47A-1D90-938E-5A91876086B0}"/>
+              </a:ext>
+            </a:extLst>
+          </p:cNvPr>
+          <p:cNvPicPr>
+            <a:picLocks noChangeAspect="1"/>
+          </p:cNvPicPr>
+          <p:nvPr/>
+        </p:nvPicPr>
+        <p:blipFill>
+          <a:blip r:embed="rId9"/>
+          <a:stretch>
+            <a:fillRect/>
+          </a:stretch>
+        </p:blipFill>
+        <p:spPr>
+          <a:xfrm>
+            <a:off x="8213813" y="4890972"/>
+            <a:ext cx="414371" cy="340765"/>
+          </a:xfrm>
+          <a:prstGeom prst="rect">
+            <a:avLst/>
+          </a:prstGeom>
+          <a:ln w="19050">
+            <a:solidFill>
+              <a:srgbClr val="FF0000"/>
+            </a:solidFill>
+          </a:ln>
+        </p:spPr>
+      </p:pic>
+      <p:pic>
+        <p:nvPicPr>
+          <p:cNvPr id="26" name="Picture 25">
+            <a:extLst>
+              <a:ext uri="{FF2B5EF4-FFF2-40B4-BE49-F238E27FC236}">
+                <a16:creationId xmlns:a16="http://schemas.microsoft.com/office/drawing/2014/main" id="{39A9AEC0-C933-3680-B3F0-E463CCFD0018}"/>
+              </a:ext>
+            </a:extLst>
+          </p:cNvPr>
+          <p:cNvPicPr>
+            <a:picLocks noChangeAspect="1"/>
+          </p:cNvPicPr>
+          <p:nvPr/>
+        </p:nvPicPr>
+        <p:blipFill>
+          <a:blip r:embed="rId7"/>
+          <a:stretch>
+            <a:fillRect/>
+          </a:stretch>
+        </p:blipFill>
+        <p:spPr>
+          <a:xfrm>
+            <a:off x="6920412" y="5292745"/>
+            <a:ext cx="891414" cy="503386"/>
+          </a:xfrm>
+          <a:prstGeom prst="rect">
+            <a:avLst/>
+          </a:prstGeom>
+        </p:spPr>
+      </p:pic>
+      <p:pic>
+        <p:nvPicPr>
+          <p:cNvPr id="27" name="Picture 26">
+            <a:extLst>
+              <a:ext uri="{FF2B5EF4-FFF2-40B4-BE49-F238E27FC236}">
+                <a16:creationId xmlns:a16="http://schemas.microsoft.com/office/drawing/2014/main" id="{45D5D804-3CAA-2310-11C3-01C3BB879D4A}"/>
+              </a:ext>
+            </a:extLst>
+          </p:cNvPr>
+          <p:cNvPicPr>
+            <a:picLocks noChangeAspect="1"/>
+          </p:cNvPicPr>
+          <p:nvPr/>
+        </p:nvPicPr>
+        <p:blipFill>
+          <a:blip r:embed="rId10"/>
+          <a:stretch>
+            <a:fillRect/>
+          </a:stretch>
+        </p:blipFill>
+        <p:spPr>
+          <a:xfrm>
+            <a:off x="6803740" y="5420997"/>
+            <a:ext cx="414371" cy="368124"/>
+          </a:xfrm>
+          <a:prstGeom prst="rect">
+            <a:avLst/>
+          </a:prstGeom>
+          <a:ln w="19050">
+            <a:solidFill>
+              <a:srgbClr val="FF0000"/>
+            </a:solidFill>
+          </a:ln>
+        </p:spPr>
+      </p:pic>
+      <p:pic>
+        <p:nvPicPr>
+          <p:cNvPr id="28" name="Picture 27">
+            <a:extLst>
+              <a:ext uri="{FF2B5EF4-FFF2-40B4-BE49-F238E27FC236}">
+                <a16:creationId xmlns:a16="http://schemas.microsoft.com/office/drawing/2014/main" id="{8BE6A433-EF1F-5F98-EDA6-A13210EEA482}"/>
+              </a:ext>
+            </a:extLst>
+          </p:cNvPr>
+          <p:cNvPicPr>
+            <a:picLocks noChangeAspect="1"/>
+          </p:cNvPicPr>
+          <p:nvPr/>
+        </p:nvPicPr>
+        <p:blipFill>
+          <a:blip r:embed="rId7"/>
+          <a:stretch>
+            <a:fillRect/>
+          </a:stretch>
+        </p:blipFill>
+        <p:spPr>
+          <a:xfrm>
+            <a:off x="8244201" y="5501431"/>
+            <a:ext cx="891414" cy="503386"/>
+          </a:xfrm>
+          <a:prstGeom prst="rect">
+            <a:avLst/>
+          </a:prstGeom>
+        </p:spPr>
+      </p:pic>
+      <p:pic>
+        <p:nvPicPr>
+          <p:cNvPr id="29" name="Picture 28">
+            <a:extLst>
+              <a:ext uri="{FF2B5EF4-FFF2-40B4-BE49-F238E27FC236}">
+                <a16:creationId xmlns:a16="http://schemas.microsoft.com/office/drawing/2014/main" id="{559BDBBB-5D65-37D5-61A1-2FACAEA4D20A}"/>
+              </a:ext>
+            </a:extLst>
+          </p:cNvPr>
+          <p:cNvPicPr>
+            <a:picLocks noChangeAspect="1"/>
+          </p:cNvPicPr>
+          <p:nvPr/>
+        </p:nvPicPr>
+        <p:blipFill>
+          <a:blip r:embed="rId11"/>
+          <a:stretch>
+            <a:fillRect/>
+          </a:stretch>
+        </p:blipFill>
+        <p:spPr>
+          <a:xfrm>
+            <a:off x="8172811" y="5673241"/>
+            <a:ext cx="413817" cy="460539"/>
+          </a:xfrm>
+          <a:prstGeom prst="rect">
+            <a:avLst/>
+          </a:prstGeom>
+          <a:ln w="19050">
+            <a:solidFill>
+              <a:srgbClr val="FF0000"/>
+            </a:solidFill>
+          </a:ln>
+        </p:spPr>
+      </p:pic>
+      <p:cxnSp>
+        <p:nvCxnSpPr>
+          <p:cNvPr id="30" name="Connector: Elbow 29">
+            <a:extLst>
+              <a:ext uri="{FF2B5EF4-FFF2-40B4-BE49-F238E27FC236}">
+                <a16:creationId xmlns:a16="http://schemas.microsoft.com/office/drawing/2014/main" id="{6090E6E5-78CF-46D3-A048-EBA763B6A4B0}"/>
+              </a:ext>
+            </a:extLst>
+          </p:cNvPr>
+          <p:cNvCxnSpPr>
+            <a:cxnSpLocks/>
+            <a:stCxn id="18" idx="0"/>
+            <a:endCxn id="25" idx="1"/>
+          </p:cNvCxnSpPr>
+          <p:nvPr/>
+        </p:nvCxnSpPr>
+        <p:spPr>
+          <a:xfrm flipV="1">
+            <a:off x="5699692" y="5061355"/>
+            <a:ext cx="2514121" cy="537758"/>
+          </a:xfrm>
+          <a:prstGeom prst="bentConnector3">
+            <a:avLst>
+              <a:gd name="adj1" fmla="val 33835"/>
+            </a:avLst>
+          </a:prstGeom>
+          <a:ln w="19050">
+            <a:solidFill>
+              <a:srgbClr val="FF0000"/>
+            </a:solidFill>
+            <a:prstDash val="sysDash"/>
+            <a:tailEnd type="triangle"/>
+          </a:ln>
+        </p:spPr>
+        <p:style>
+          <a:lnRef idx="1">
+            <a:schemeClr val="accent1"/>
+          </a:lnRef>
+          <a:fillRef idx="0">
+            <a:schemeClr val="accent1"/>
+          </a:fillRef>
+          <a:effectRef idx="0">
+            <a:schemeClr val="accent1"/>
+          </a:effectRef>
+          <a:fontRef idx="minor">
+            <a:schemeClr val="tx1"/>
+          </a:fontRef>
+        </p:style>
+      </p:cxnSp>
+      <p:cxnSp>
+        <p:nvCxnSpPr>
+          <p:cNvPr id="31" name="Connector: Elbow 30">
+            <a:extLst>
+              <a:ext uri="{FF2B5EF4-FFF2-40B4-BE49-F238E27FC236}">
+                <a16:creationId xmlns:a16="http://schemas.microsoft.com/office/drawing/2014/main" id="{FCF8F3EA-8B0A-3D84-4E0C-355E8687AEFB}"/>
+              </a:ext>
+            </a:extLst>
+          </p:cNvPr>
+          <p:cNvCxnSpPr>
+            <a:cxnSpLocks/>
+            <a:stCxn id="18" idx="0"/>
+            <a:endCxn id="27" idx="2"/>
+          </p:cNvCxnSpPr>
+          <p:nvPr/>
+        </p:nvCxnSpPr>
+        <p:spPr>
+          <a:xfrm>
+            <a:off x="5699692" y="5599113"/>
+            <a:ext cx="1311234" cy="190008"/>
+          </a:xfrm>
+          <a:prstGeom prst="bentConnector4">
+            <a:avLst>
+              <a:gd name="adj1" fmla="val 42056"/>
+              <a:gd name="adj2" fmla="val 220311"/>
+            </a:avLst>
+          </a:prstGeom>
+          <a:ln w="19050">
+            <a:solidFill>
+              <a:srgbClr val="FF0000"/>
+            </a:solidFill>
+            <a:prstDash val="sysDash"/>
+            <a:tailEnd type="triangle"/>
+          </a:ln>
+        </p:spPr>
+        <p:style>
+          <a:lnRef idx="1">
+            <a:schemeClr val="accent1"/>
+          </a:lnRef>
+          <a:fillRef idx="0">
+            <a:schemeClr val="accent1"/>
+          </a:fillRef>
+          <a:effectRef idx="0">
+            <a:schemeClr val="accent1"/>
+          </a:effectRef>
+          <a:fontRef idx="minor">
+            <a:schemeClr val="tx1"/>
+          </a:fontRef>
+        </p:style>
+      </p:cxnSp>
+      <p:cxnSp>
+        <p:nvCxnSpPr>
+          <p:cNvPr id="32" name="Connector: Elbow 31">
+            <a:extLst>
+              <a:ext uri="{FF2B5EF4-FFF2-40B4-BE49-F238E27FC236}">
+                <a16:creationId xmlns:a16="http://schemas.microsoft.com/office/drawing/2014/main" id="{8924E96F-EAEF-572C-7AF5-7E3D5D41D04B}"/>
+              </a:ext>
+            </a:extLst>
+          </p:cNvPr>
+          <p:cNvCxnSpPr>
+            <a:cxnSpLocks/>
+            <a:endCxn id="29" idx="2"/>
+          </p:cNvCxnSpPr>
+          <p:nvPr/>
+        </p:nvCxnSpPr>
+        <p:spPr>
+          <a:xfrm>
+            <a:off x="5049036" y="5952092"/>
+            <a:ext cx="3330684" cy="181688"/>
+          </a:xfrm>
+          <a:prstGeom prst="bentConnector4">
+            <a:avLst>
+              <a:gd name="adj1" fmla="val -998"/>
+              <a:gd name="adj2" fmla="val 158716"/>
+            </a:avLst>
+          </a:prstGeom>
+          <a:ln w="19050">
+            <a:solidFill>
+              <a:srgbClr val="FF0000"/>
+            </a:solidFill>
+            <a:prstDash val="sysDash"/>
+            <a:tailEnd type="triangle"/>
+          </a:ln>
+        </p:spPr>
+        <p:style>
+          <a:lnRef idx="1">
+            <a:schemeClr val="accent1"/>
+          </a:lnRef>
+          <a:fillRef idx="0">
+            <a:schemeClr val="accent1"/>
+          </a:fillRef>
+          <a:effectRef idx="0">
+            <a:schemeClr val="accent1"/>
+          </a:effectRef>
+          <a:fontRef idx="minor">
+            <a:schemeClr val="tx1"/>
+          </a:fontRef>
+        </p:style>
+      </p:cxnSp>
+      <p:sp>
+        <p:nvSpPr>
+          <p:cNvPr id="33" name="TextBox 32">
+            <a:extLst>
+              <a:ext uri="{FF2B5EF4-FFF2-40B4-BE49-F238E27FC236}">
+                <a16:creationId xmlns:a16="http://schemas.microsoft.com/office/drawing/2014/main" id="{6F13562D-F7DF-5C76-7363-E4314B7E1F74}"/>
+              </a:ext>
+            </a:extLst>
+          </p:cNvPr>
+          <p:cNvSpPr txBox="1"/>
+          <p:nvPr/>
+        </p:nvSpPr>
+        <p:spPr>
+          <a:xfrm>
+            <a:off x="6197684" y="4122920"/>
+            <a:ext cx="1562164" cy="430887"/>
+          </a:xfrm>
+          <a:prstGeom prst="rect">
+            <a:avLst/>
+          </a:prstGeom>
+          <a:noFill/>
+        </p:spPr>
+        <p:txBody>
+          <a:bodyPr wrap="square" rtlCol="0">
+            <a:spAutoFit/>
+          </a:bodyPr>
+          <a:lstStyle/>
+          <a:p>
+            <a:r>
+              <a:rPr lang="en-US" sz="1100" b="1" dirty="0">
+                <a:solidFill>
+                  <a:srgbClr val="FF0000"/>
+                </a:solidFill>
+              </a:rPr>
+              <a:t>Backdoor trojan emulator </a:t>
+            </a:r>
+            <a:endParaRPr lang="en-SG" sz="1100" b="1" dirty="0">
+              <a:solidFill>
+                <a:srgbClr val="FF0000"/>
+              </a:solidFill>
+            </a:endParaRPr>
+          </a:p>
+        </p:txBody>
+      </p:sp>
+      <p:sp>
+        <p:nvSpPr>
+          <p:cNvPr id="34" name="TextBox 33">
+            <a:extLst>
+              <a:ext uri="{FF2B5EF4-FFF2-40B4-BE49-F238E27FC236}">
+                <a16:creationId xmlns:a16="http://schemas.microsoft.com/office/drawing/2014/main" id="{146221D4-B63C-398F-514C-5FC49A802674}"/>
+              </a:ext>
+            </a:extLst>
+          </p:cNvPr>
+          <p:cNvSpPr txBox="1"/>
+          <p:nvPr/>
+        </p:nvSpPr>
+        <p:spPr>
+          <a:xfrm>
+            <a:off x="8079149" y="5245005"/>
+            <a:ext cx="1695787" cy="261610"/>
+          </a:xfrm>
+          <a:prstGeom prst="rect">
+            <a:avLst/>
+          </a:prstGeom>
+          <a:noFill/>
+        </p:spPr>
+        <p:txBody>
+          <a:bodyPr wrap="square" rtlCol="0">
+            <a:spAutoFit/>
+          </a:bodyPr>
+          <a:lstStyle/>
+          <a:p>
+            <a:r>
+              <a:rPr lang="en-US" sz="1100" b="1" dirty="0">
+                <a:solidFill>
+                  <a:srgbClr val="FF0000"/>
+                </a:solidFill>
+              </a:rPr>
+              <a:t>DDoS attack emulator </a:t>
+            </a:r>
+            <a:endParaRPr lang="en-SG" sz="1100" b="1" dirty="0">
+              <a:solidFill>
+                <a:srgbClr val="FF0000"/>
+              </a:solidFill>
+            </a:endParaRPr>
+          </a:p>
+        </p:txBody>
+      </p:sp>
+      <p:sp>
+        <p:nvSpPr>
+          <p:cNvPr id="35" name="TextBox 34">
+            <a:extLst>
+              <a:ext uri="{FF2B5EF4-FFF2-40B4-BE49-F238E27FC236}">
+                <a16:creationId xmlns:a16="http://schemas.microsoft.com/office/drawing/2014/main" id="{F9A2840C-8B2A-3C5E-EE9C-36E428D076ED}"/>
+              </a:ext>
+            </a:extLst>
+          </p:cNvPr>
+          <p:cNvSpPr txBox="1"/>
+          <p:nvPr/>
+        </p:nvSpPr>
+        <p:spPr>
+          <a:xfrm>
+            <a:off x="8617016" y="5958566"/>
+            <a:ext cx="1014615" cy="600164"/>
+          </a:xfrm>
+          <a:prstGeom prst="rect">
+            <a:avLst/>
+          </a:prstGeom>
+          <a:noFill/>
+        </p:spPr>
+        <p:txBody>
+          <a:bodyPr wrap="square" rtlCol="0">
+            <a:spAutoFit/>
+          </a:bodyPr>
+          <a:lstStyle/>
+          <a:p>
+            <a:r>
+              <a:rPr lang="en-US" sz="1100" b="1" dirty="0">
+                <a:solidFill>
+                  <a:srgbClr val="FF0000"/>
+                </a:solidFill>
+              </a:rPr>
+              <a:t>False data injection emulator </a:t>
+            </a:r>
+            <a:endParaRPr lang="en-SG" sz="1100" b="1" dirty="0">
+              <a:solidFill>
+                <a:srgbClr val="FF0000"/>
+              </a:solidFill>
+            </a:endParaRPr>
+          </a:p>
+        </p:txBody>
+      </p:sp>
+      <p:sp>
+        <p:nvSpPr>
+          <p:cNvPr id="36" name="TextBox 35">
+            <a:extLst>
+              <a:ext uri="{FF2B5EF4-FFF2-40B4-BE49-F238E27FC236}">
+                <a16:creationId xmlns:a16="http://schemas.microsoft.com/office/drawing/2014/main" id="{F3460363-9F2D-1D4F-87B3-7E019129A5CF}"/>
+              </a:ext>
+            </a:extLst>
+          </p:cNvPr>
+          <p:cNvSpPr txBox="1"/>
+          <p:nvPr/>
+        </p:nvSpPr>
+        <p:spPr>
+          <a:xfrm>
+            <a:off x="6568885" y="5091199"/>
+            <a:ext cx="1810835" cy="261610"/>
+          </a:xfrm>
+          <a:prstGeom prst="rect">
+            <a:avLst/>
+          </a:prstGeom>
+          <a:noFill/>
+        </p:spPr>
+        <p:txBody>
+          <a:bodyPr wrap="square" rtlCol="0">
+            <a:spAutoFit/>
+          </a:bodyPr>
+          <a:lstStyle/>
+          <a:p>
+            <a:r>
+              <a:rPr lang="en-US" sz="1100" b="1" dirty="0">
+                <a:solidFill>
+                  <a:srgbClr val="FF0000"/>
+                </a:solidFill>
+              </a:rPr>
+              <a:t>Phishing email sender</a:t>
+            </a:r>
+            <a:endParaRPr lang="en-SG" sz="1100" b="1" dirty="0">
+              <a:solidFill>
+                <a:srgbClr val="FF0000"/>
+              </a:solidFill>
+            </a:endParaRPr>
+          </a:p>
+        </p:txBody>
+      </p:sp>
+      <p:cxnSp>
+        <p:nvCxnSpPr>
+          <p:cNvPr id="37" name="Straight Arrow Connector 36">
+            <a:extLst>
+              <a:ext uri="{FF2B5EF4-FFF2-40B4-BE49-F238E27FC236}">
+                <a16:creationId xmlns:a16="http://schemas.microsoft.com/office/drawing/2014/main" id="{2CE72BE4-B251-63B1-5486-ACC5A98198A9}"/>
+              </a:ext>
+            </a:extLst>
+          </p:cNvPr>
+          <p:cNvCxnSpPr>
+            <a:cxnSpLocks/>
+          </p:cNvCxnSpPr>
+          <p:nvPr/>
+        </p:nvCxnSpPr>
+        <p:spPr>
+          <a:xfrm>
+            <a:off x="5225870" y="4847601"/>
+            <a:ext cx="0" cy="399541"/>
+          </a:xfrm>
+          <a:prstGeom prst="straightConnector1">
+            <a:avLst/>
+          </a:prstGeom>
+          <a:ln w="19050">
+            <a:solidFill>
+              <a:srgbClr val="FF0000"/>
+            </a:solidFill>
+            <a:prstDash val="sysDash"/>
+            <a:headEnd type="triangle"/>
+            <a:tailEnd type="triangle"/>
+          </a:ln>
+        </p:spPr>
+        <p:style>
+          <a:lnRef idx="1">
+            <a:schemeClr val="accent1"/>
+          </a:lnRef>
+          <a:fillRef idx="0">
+            <a:schemeClr val="accent1"/>
+          </a:fillRef>
+          <a:effectRef idx="0">
+            <a:schemeClr val="accent1"/>
+          </a:effectRef>
+          <a:fontRef idx="minor">
+            <a:schemeClr val="tx1"/>
+          </a:fontRef>
+        </p:style>
+      </p:cxnSp>
+      <p:sp>
+        <p:nvSpPr>
+          <p:cNvPr id="38" name="TextBox 37">
+            <a:extLst>
+              <a:ext uri="{FF2B5EF4-FFF2-40B4-BE49-F238E27FC236}">
+                <a16:creationId xmlns:a16="http://schemas.microsoft.com/office/drawing/2014/main" id="{5F11AF5E-6334-B087-C483-2172DD7F106E}"/>
+              </a:ext>
+            </a:extLst>
+          </p:cNvPr>
+          <p:cNvSpPr txBox="1"/>
+          <p:nvPr/>
+        </p:nvSpPr>
+        <p:spPr>
+          <a:xfrm>
+            <a:off x="4149650" y="3841288"/>
+            <a:ext cx="1946349" cy="276999"/>
+          </a:xfrm>
+          <a:prstGeom prst="rect">
+            <a:avLst/>
+          </a:prstGeom>
+          <a:noFill/>
+        </p:spPr>
+        <p:txBody>
+          <a:bodyPr wrap="square" rtlCol="0">
+            <a:spAutoFit/>
+          </a:bodyPr>
+          <a:lstStyle/>
+          <a:p>
+            <a:r>
+              <a:rPr lang="en-US" sz="1200" b="1" dirty="0"/>
+              <a:t>Red Team C2 Hub Server </a:t>
+            </a:r>
+            <a:endParaRPr lang="en-SG" sz="1200" b="1" dirty="0"/>
+          </a:p>
+        </p:txBody>
+      </p:sp>
+      <p:sp>
+        <p:nvSpPr>
+          <p:cNvPr id="39" name="TextBox 38">
+            <a:extLst>
+              <a:ext uri="{FF2B5EF4-FFF2-40B4-BE49-F238E27FC236}">
+                <a16:creationId xmlns:a16="http://schemas.microsoft.com/office/drawing/2014/main" id="{73B51268-974E-5E1D-6035-0616DAD5CC03}"/>
+              </a:ext>
+            </a:extLst>
+          </p:cNvPr>
+          <p:cNvSpPr txBox="1"/>
+          <p:nvPr/>
+        </p:nvSpPr>
+        <p:spPr>
+          <a:xfrm>
+            <a:off x="3207363" y="4567435"/>
+            <a:ext cx="1266137" cy="707886"/>
+          </a:xfrm>
+          <a:prstGeom prst="rect">
+            <a:avLst/>
+          </a:prstGeom>
+          <a:noFill/>
+        </p:spPr>
+        <p:txBody>
+          <a:bodyPr wrap="square" rtlCol="0">
+            <a:spAutoFit/>
+          </a:bodyPr>
+          <a:lstStyle/>
+          <a:p>
+            <a:r>
+              <a:rPr lang="en-US" sz="1000" dirty="0"/>
+              <a:t>User control request and malware state info [subnet comm]</a:t>
+            </a:r>
+            <a:endParaRPr lang="en-SG" sz="1000" dirty="0"/>
+          </a:p>
+        </p:txBody>
+      </p:sp>
+      <p:sp>
+        <p:nvSpPr>
+          <p:cNvPr id="40" name="TextBox 39">
+            <a:extLst>
+              <a:ext uri="{FF2B5EF4-FFF2-40B4-BE49-F238E27FC236}">
+                <a16:creationId xmlns:a16="http://schemas.microsoft.com/office/drawing/2014/main" id="{665139AB-F280-D34D-E295-B463DF516CBA}"/>
+              </a:ext>
+            </a:extLst>
+          </p:cNvPr>
+          <p:cNvSpPr txBox="1"/>
+          <p:nvPr/>
+        </p:nvSpPr>
+        <p:spPr>
+          <a:xfrm>
+            <a:off x="3232120" y="5821478"/>
+            <a:ext cx="1412079" cy="553998"/>
+          </a:xfrm>
+          <a:prstGeom prst="rect">
+            <a:avLst/>
+          </a:prstGeom>
+          <a:noFill/>
+        </p:spPr>
+        <p:txBody>
+          <a:bodyPr wrap="square" rtlCol="0">
+            <a:spAutoFit/>
+          </a:bodyPr>
+          <a:lstStyle/>
+          <a:p>
+            <a:r>
+              <a:rPr lang="en-US" sz="1000" dirty="0"/>
+              <a:t>User control request and malware state info [internet comm]</a:t>
+            </a:r>
+            <a:endParaRPr lang="en-SG" sz="1000" dirty="0"/>
+          </a:p>
+        </p:txBody>
+      </p:sp>
+      <p:sp>
+        <p:nvSpPr>
+          <p:cNvPr id="41" name="TextBox 40">
+            <a:extLst>
+              <a:ext uri="{FF2B5EF4-FFF2-40B4-BE49-F238E27FC236}">
+                <a16:creationId xmlns:a16="http://schemas.microsoft.com/office/drawing/2014/main" id="{15685E58-15FB-07D7-AE99-9C2EE5E7147C}"/>
+              </a:ext>
+            </a:extLst>
+          </p:cNvPr>
+          <p:cNvSpPr txBox="1"/>
+          <p:nvPr/>
+        </p:nvSpPr>
+        <p:spPr>
+          <a:xfrm>
+            <a:off x="5192358" y="4864877"/>
+            <a:ext cx="1176232" cy="400110"/>
+          </a:xfrm>
+          <a:prstGeom prst="rect">
+            <a:avLst/>
+          </a:prstGeom>
+          <a:noFill/>
+        </p:spPr>
+        <p:txBody>
+          <a:bodyPr wrap="square" rtlCol="0">
+            <a:spAutoFit/>
+          </a:bodyPr>
+          <a:lstStyle/>
+          <a:p>
+            <a:r>
+              <a:rPr lang="en-US" sz="1000" dirty="0"/>
+              <a:t>Malware control request</a:t>
+            </a:r>
+            <a:endParaRPr lang="en-SG" sz="1000" dirty="0"/>
+          </a:p>
+        </p:txBody>
+      </p:sp>
+      <p:sp>
+        <p:nvSpPr>
+          <p:cNvPr id="42" name="TextBox 41">
+            <a:extLst>
+              <a:ext uri="{FF2B5EF4-FFF2-40B4-BE49-F238E27FC236}">
+                <a16:creationId xmlns:a16="http://schemas.microsoft.com/office/drawing/2014/main" id="{7FA14902-C47A-57FF-7370-F71DFA718604}"/>
+              </a:ext>
+            </a:extLst>
+          </p:cNvPr>
+          <p:cNvSpPr txBox="1"/>
+          <p:nvPr/>
+        </p:nvSpPr>
+        <p:spPr>
+          <a:xfrm>
+            <a:off x="5456413" y="5797277"/>
+            <a:ext cx="1176232" cy="400110"/>
+          </a:xfrm>
+          <a:prstGeom prst="rect">
+            <a:avLst/>
+          </a:prstGeom>
+          <a:noFill/>
+        </p:spPr>
+        <p:txBody>
+          <a:bodyPr wrap="square" rtlCol="0">
+            <a:spAutoFit/>
+          </a:bodyPr>
+          <a:lstStyle/>
+          <a:p>
+            <a:r>
+              <a:rPr lang="en-US" sz="1000" dirty="0"/>
+              <a:t>Malware control request</a:t>
+            </a:r>
+            <a:endParaRPr lang="en-SG" sz="1000" dirty="0"/>
+          </a:p>
+        </p:txBody>
+      </p:sp>
+      <p:pic>
+        <p:nvPicPr>
+          <p:cNvPr id="44" name="Picture 43">
+            <a:extLst>
+              <a:ext uri="{FF2B5EF4-FFF2-40B4-BE49-F238E27FC236}">
+                <a16:creationId xmlns:a16="http://schemas.microsoft.com/office/drawing/2014/main" id="{03CC81F8-FE3A-0CD0-FDF2-DF54479F552B}"/>
+              </a:ext>
+            </a:extLst>
+          </p:cNvPr>
+          <p:cNvPicPr>
+            <a:picLocks noChangeAspect="1"/>
+          </p:cNvPicPr>
+          <p:nvPr/>
+        </p:nvPicPr>
+        <p:blipFill>
+          <a:blip r:embed="rId12"/>
+          <a:stretch>
+            <a:fillRect/>
+          </a:stretch>
+        </p:blipFill>
+        <p:spPr>
+          <a:xfrm>
+            <a:off x="8136407" y="3877050"/>
+            <a:ext cx="961217" cy="740136"/>
+          </a:xfrm>
+          <a:prstGeom prst="rect">
+            <a:avLst/>
+          </a:prstGeom>
+          <a:ln w="9525">
+            <a:solidFill>
+              <a:schemeClr val="bg1"/>
+            </a:solidFill>
+          </a:ln>
+        </p:spPr>
+      </p:pic>
     </p:spTree>
     <p:extLst>
       <p:ext uri="{BB962C8B-B14F-4D97-AF65-F5344CB8AC3E}">

</xml_diff>

<commit_message>
update the design document and read me file.
</commit_message>
<xml_diff>
--- a/doc/designDoc.pptx
+++ b/doc/designDoc.pptx
@@ -268,7 +268,7 @@
           <a:p>
             <a:fld id="{9FCA313A-65B0-404C-ABF6-BBAAB537D5DB}" type="datetimeFigureOut">
               <a:rPr lang="en-SG" smtClean="0"/>
-              <a:t>25/5/2024</a:t>
+              <a:t>26/5/2024</a:t>
             </a:fld>
             <a:endParaRPr lang="en-SG"/>
           </a:p>
@@ -468,7 +468,7 @@
           <a:p>
             <a:fld id="{9FCA313A-65B0-404C-ABF6-BBAAB537D5DB}" type="datetimeFigureOut">
               <a:rPr lang="en-SG" smtClean="0"/>
-              <a:t>25/5/2024</a:t>
+              <a:t>26/5/2024</a:t>
             </a:fld>
             <a:endParaRPr lang="en-SG"/>
           </a:p>
@@ -678,7 +678,7 @@
           <a:p>
             <a:fld id="{9FCA313A-65B0-404C-ABF6-BBAAB537D5DB}" type="datetimeFigureOut">
               <a:rPr lang="en-SG" smtClean="0"/>
-              <a:t>25/5/2024</a:t>
+              <a:t>26/5/2024</a:t>
             </a:fld>
             <a:endParaRPr lang="en-SG"/>
           </a:p>
@@ -878,7 +878,7 @@
           <a:p>
             <a:fld id="{9FCA313A-65B0-404C-ABF6-BBAAB537D5DB}" type="datetimeFigureOut">
               <a:rPr lang="en-SG" smtClean="0"/>
-              <a:t>25/5/2024</a:t>
+              <a:t>26/5/2024</a:t>
             </a:fld>
             <a:endParaRPr lang="en-SG"/>
           </a:p>
@@ -1154,7 +1154,7 @@
           <a:p>
             <a:fld id="{9FCA313A-65B0-404C-ABF6-BBAAB537D5DB}" type="datetimeFigureOut">
               <a:rPr lang="en-SG" smtClean="0"/>
-              <a:t>25/5/2024</a:t>
+              <a:t>26/5/2024</a:t>
             </a:fld>
             <a:endParaRPr lang="en-SG"/>
           </a:p>
@@ -1422,7 +1422,7 @@
           <a:p>
             <a:fld id="{9FCA313A-65B0-404C-ABF6-BBAAB537D5DB}" type="datetimeFigureOut">
               <a:rPr lang="en-SG" smtClean="0"/>
-              <a:t>25/5/2024</a:t>
+              <a:t>26/5/2024</a:t>
             </a:fld>
             <a:endParaRPr lang="en-SG"/>
           </a:p>
@@ -1837,7 +1837,7 @@
           <a:p>
             <a:fld id="{9FCA313A-65B0-404C-ABF6-BBAAB537D5DB}" type="datetimeFigureOut">
               <a:rPr lang="en-SG" smtClean="0"/>
-              <a:t>25/5/2024</a:t>
+              <a:t>26/5/2024</a:t>
             </a:fld>
             <a:endParaRPr lang="en-SG"/>
           </a:p>
@@ -1979,7 +1979,7 @@
           <a:p>
             <a:fld id="{9FCA313A-65B0-404C-ABF6-BBAAB537D5DB}" type="datetimeFigureOut">
               <a:rPr lang="en-SG" smtClean="0"/>
-              <a:t>25/5/2024</a:t>
+              <a:t>26/5/2024</a:t>
             </a:fld>
             <a:endParaRPr lang="en-SG"/>
           </a:p>
@@ -2092,7 +2092,7 @@
           <a:p>
             <a:fld id="{9FCA313A-65B0-404C-ABF6-BBAAB537D5DB}" type="datetimeFigureOut">
               <a:rPr lang="en-SG" smtClean="0"/>
-              <a:t>25/5/2024</a:t>
+              <a:t>26/5/2024</a:t>
             </a:fld>
             <a:endParaRPr lang="en-SG"/>
           </a:p>
@@ -2405,7 +2405,7 @@
           <a:p>
             <a:fld id="{9FCA313A-65B0-404C-ABF6-BBAAB537D5DB}" type="datetimeFigureOut">
               <a:rPr lang="en-SG" smtClean="0"/>
-              <a:t>25/5/2024</a:t>
+              <a:t>26/5/2024</a:t>
             </a:fld>
             <a:endParaRPr lang="en-SG"/>
           </a:p>
@@ -2694,7 +2694,7 @@
           <a:p>
             <a:fld id="{9FCA313A-65B0-404C-ABF6-BBAAB537D5DB}" type="datetimeFigureOut">
               <a:rPr lang="en-SG" smtClean="0"/>
-              <a:t>25/5/2024</a:t>
+              <a:t>26/5/2024</a:t>
             </a:fld>
             <a:endParaRPr lang="en-SG"/>
           </a:p>
@@ -2937,7 +2937,7 @@
           <a:p>
             <a:fld id="{9FCA313A-65B0-404C-ABF6-BBAAB537D5DB}" type="datetimeFigureOut">
               <a:rPr lang="en-SG" smtClean="0"/>
-              <a:t>25/5/2024</a:t>
+              <a:t>26/5/2024</a:t>
             </a:fld>
             <a:endParaRPr lang="en-SG"/>
           </a:p>
@@ -13248,7 +13248,7 @@
         </p:nvCxnSpPr>
         <p:spPr>
           <a:xfrm>
-            <a:off x="8790303" y="1733971"/>
+            <a:off x="8790303" y="1395643"/>
             <a:ext cx="6331" cy="4692578"/>
           </a:xfrm>
           <a:prstGeom prst="line">
@@ -13290,7 +13290,7 @@
         </p:nvSpPr>
         <p:spPr>
           <a:xfrm>
-            <a:off x="4732323" y="2824226"/>
+            <a:off x="4732323" y="2485898"/>
             <a:ext cx="2921232" cy="2180540"/>
           </a:xfrm>
           <a:prstGeom prst="rect">
@@ -13342,7 +13342,7 @@
         </p:nvSpPr>
         <p:spPr>
           <a:xfrm>
-            <a:off x="686005" y="1197166"/>
+            <a:off x="686005" y="858838"/>
             <a:ext cx="2751121" cy="858673"/>
           </a:xfrm>
           <a:prstGeom prst="rect">
@@ -13399,7 +13399,7 @@
         </p:nvSpPr>
         <p:spPr>
           <a:xfrm>
-            <a:off x="552860" y="922931"/>
+            <a:off x="552860" y="584603"/>
             <a:ext cx="3049875" cy="5699937"/>
           </a:xfrm>
           <a:prstGeom prst="rect">
@@ -13459,7 +13459,7 @@
         </p:nvSpPr>
         <p:spPr>
           <a:xfrm>
-            <a:off x="593199" y="920167"/>
+            <a:off x="593199" y="581839"/>
             <a:ext cx="2494844" cy="276999"/>
           </a:xfrm>
           <a:prstGeom prst="rect">
@@ -13501,7 +13501,7 @@
         </p:blipFill>
         <p:spPr>
           <a:xfrm>
-            <a:off x="800707" y="1280710"/>
+            <a:off x="800707" y="942382"/>
             <a:ext cx="392204" cy="414586"/>
           </a:xfrm>
           <a:prstGeom prst="rect">
@@ -13536,7 +13536,7 @@
         </p:blipFill>
         <p:spPr>
           <a:xfrm>
-            <a:off x="1364928" y="1271445"/>
+            <a:off x="1364928" y="933117"/>
             <a:ext cx="464622" cy="414586"/>
           </a:xfrm>
           <a:prstGeom prst="rect">
@@ -13570,7 +13570,7 @@
         </p:blipFill>
         <p:spPr>
           <a:xfrm>
-            <a:off x="1987758" y="1253151"/>
+            <a:off x="1987758" y="914823"/>
             <a:ext cx="408619" cy="423733"/>
           </a:xfrm>
           <a:prstGeom prst="rect">
@@ -13605,7 +13605,7 @@
         </p:blipFill>
         <p:spPr>
           <a:xfrm>
-            <a:off x="2599723" y="1247936"/>
+            <a:off x="2599723" y="909608"/>
             <a:ext cx="411309" cy="438095"/>
           </a:xfrm>
           <a:prstGeom prst="rect">
@@ -13632,7 +13632,7 @@
         </p:nvSpPr>
         <p:spPr>
           <a:xfrm>
-            <a:off x="666956" y="1655729"/>
+            <a:off x="666956" y="1317401"/>
             <a:ext cx="716455" cy="400110"/>
           </a:xfrm>
           <a:prstGeom prst="rect">
@@ -13671,7 +13671,7 @@
         </p:nvSpPr>
         <p:spPr>
           <a:xfrm>
-            <a:off x="1290638" y="1655729"/>
+            <a:off x="1290638" y="1317401"/>
             <a:ext cx="611680" cy="400110"/>
           </a:xfrm>
           <a:prstGeom prst="rect">
@@ -13710,7 +13710,7 @@
         </p:nvSpPr>
         <p:spPr>
           <a:xfrm>
-            <a:off x="1829550" y="1655729"/>
+            <a:off x="1829550" y="1317401"/>
             <a:ext cx="759523" cy="400110"/>
           </a:xfrm>
           <a:prstGeom prst="rect">
@@ -13749,7 +13749,7 @@
         </p:nvSpPr>
         <p:spPr>
           <a:xfrm>
-            <a:off x="2536261" y="1668501"/>
+            <a:off x="2536261" y="1330173"/>
             <a:ext cx="759523" cy="400110"/>
           </a:xfrm>
           <a:prstGeom prst="rect">
@@ -13788,7 +13788,7 @@
         </p:nvSpPr>
         <p:spPr>
           <a:xfrm>
-            <a:off x="2984720" y="1316327"/>
+            <a:off x="2984720" y="977999"/>
             <a:ext cx="377190" cy="461665"/>
           </a:xfrm>
           <a:prstGeom prst="rect">
@@ -13832,7 +13832,7 @@
         </p:nvSpPr>
         <p:spPr>
           <a:xfrm>
-            <a:off x="654896" y="2052886"/>
+            <a:off x="654896" y="1714558"/>
             <a:ext cx="2494844" cy="276999"/>
           </a:xfrm>
           <a:prstGeom prst="rect">
@@ -13867,7 +13867,7 @@
         </p:nvSpPr>
         <p:spPr>
           <a:xfrm>
-            <a:off x="696755" y="2339674"/>
+            <a:off x="696755" y="2001346"/>
             <a:ext cx="2751122" cy="795780"/>
           </a:xfrm>
           <a:prstGeom prst="rect">
@@ -13932,7 +13932,7 @@
         </p:blipFill>
         <p:spPr>
           <a:xfrm>
-            <a:off x="810472" y="2417929"/>
+            <a:off x="810472" y="2079601"/>
             <a:ext cx="328485" cy="351080"/>
           </a:xfrm>
           <a:prstGeom prst="rect">
@@ -13959,7 +13959,7 @@
         </p:nvSpPr>
         <p:spPr>
           <a:xfrm>
-            <a:off x="699089" y="2735343"/>
+            <a:off x="699089" y="2397015"/>
             <a:ext cx="694087" cy="400110"/>
           </a:xfrm>
           <a:prstGeom prst="rect">
@@ -14006,7 +14006,7 @@
         </p:blipFill>
         <p:spPr>
           <a:xfrm>
-            <a:off x="1393176" y="2397543"/>
+            <a:off x="1393176" y="2059215"/>
             <a:ext cx="386944" cy="371466"/>
           </a:xfrm>
           <a:prstGeom prst="rect">
@@ -14033,7 +14033,7 @@
         </p:nvSpPr>
         <p:spPr>
           <a:xfrm>
-            <a:off x="1272868" y="2740925"/>
+            <a:off x="1272868" y="2402597"/>
             <a:ext cx="759523" cy="400110"/>
           </a:xfrm>
           <a:prstGeom prst="rect">
@@ -14080,7 +14080,7 @@
         </p:blipFill>
         <p:spPr>
           <a:xfrm>
-            <a:off x="2550023" y="2388287"/>
+            <a:off x="2550023" y="2049959"/>
             <a:ext cx="444150" cy="399735"/>
           </a:xfrm>
           <a:prstGeom prst="rect">
@@ -14107,7 +14107,7 @@
         </p:nvSpPr>
         <p:spPr>
           <a:xfrm>
-            <a:off x="2428202" y="2759391"/>
+            <a:off x="2428202" y="2421063"/>
             <a:ext cx="1073730" cy="400110"/>
           </a:xfrm>
           <a:prstGeom prst="rect">
@@ -14146,7 +14146,7 @@
         </p:nvSpPr>
         <p:spPr>
           <a:xfrm>
-            <a:off x="1906848" y="2760550"/>
+            <a:off x="1906848" y="2422222"/>
             <a:ext cx="759523" cy="246221"/>
           </a:xfrm>
           <a:prstGeom prst="rect">
@@ -14185,7 +14185,7 @@
         </p:nvSpPr>
         <p:spPr>
           <a:xfrm>
-            <a:off x="2992225" y="2384917"/>
+            <a:off x="2992225" y="2046589"/>
             <a:ext cx="377190" cy="461665"/>
           </a:xfrm>
           <a:prstGeom prst="rect">
@@ -14221,7 +14221,7 @@
         </p:nvSpPr>
         <p:spPr>
           <a:xfrm>
-            <a:off x="653006" y="3171698"/>
+            <a:off x="653006" y="2833370"/>
             <a:ext cx="2494844" cy="276999"/>
           </a:xfrm>
           <a:prstGeom prst="rect">
@@ -14256,7 +14256,7 @@
         </p:nvSpPr>
         <p:spPr>
           <a:xfrm>
-            <a:off x="695770" y="3473253"/>
+            <a:off x="695770" y="3134925"/>
             <a:ext cx="2752107" cy="795780"/>
           </a:xfrm>
           <a:prstGeom prst="rect">
@@ -14329,7 +14329,7 @@
         </p:blipFill>
         <p:spPr>
           <a:xfrm>
-            <a:off x="780555" y="3555868"/>
+            <a:off x="780555" y="3217540"/>
             <a:ext cx="388318" cy="387556"/>
           </a:xfrm>
           <a:prstGeom prst="rect">
@@ -14356,7 +14356,7 @@
         </p:nvSpPr>
         <p:spPr>
           <a:xfrm>
-            <a:off x="650495" y="3918025"/>
+            <a:off x="650495" y="3579697"/>
             <a:ext cx="693847" cy="400110"/>
           </a:xfrm>
           <a:prstGeom prst="rect">
@@ -14403,7 +14403,7 @@
         </p:blipFill>
         <p:spPr>
           <a:xfrm>
-            <a:off x="1338370" y="3547720"/>
+            <a:off x="1338370" y="3209392"/>
             <a:ext cx="388318" cy="403851"/>
           </a:xfrm>
           <a:prstGeom prst="rect">
@@ -14430,7 +14430,7 @@
         </p:nvSpPr>
         <p:spPr>
           <a:xfrm>
-            <a:off x="1217063" y="3913027"/>
+            <a:off x="1217063" y="3574699"/>
             <a:ext cx="693847" cy="400110"/>
           </a:xfrm>
           <a:prstGeom prst="rect">
@@ -14477,7 +14477,7 @@
         </p:blipFill>
         <p:spPr>
           <a:xfrm>
-            <a:off x="2405838" y="3539825"/>
+            <a:off x="2405838" y="3201497"/>
             <a:ext cx="406716" cy="396536"/>
           </a:xfrm>
           <a:prstGeom prst="rect">
@@ -14504,7 +14504,7 @@
         </p:nvSpPr>
         <p:spPr>
           <a:xfrm>
-            <a:off x="2309216" y="3904307"/>
+            <a:off x="2309216" y="3565979"/>
             <a:ext cx="693847" cy="400110"/>
           </a:xfrm>
           <a:prstGeom prst="rect">
@@ -14551,7 +14551,7 @@
         </p:blipFill>
         <p:spPr>
           <a:xfrm>
-            <a:off x="1825357" y="3536708"/>
+            <a:off x="1825357" y="3198380"/>
             <a:ext cx="406716" cy="406716"/>
           </a:xfrm>
           <a:prstGeom prst="rect">
@@ -14573,7 +14573,7 @@
         </p:nvSpPr>
         <p:spPr>
           <a:xfrm>
-            <a:off x="1732811" y="3904307"/>
+            <a:off x="1732811" y="3565979"/>
             <a:ext cx="759523" cy="400110"/>
           </a:xfrm>
           <a:prstGeom prst="rect">
@@ -14619,7 +14619,7 @@
         </p:blipFill>
         <p:spPr>
           <a:xfrm>
-            <a:off x="2923289" y="3552404"/>
+            <a:off x="2923289" y="3214076"/>
             <a:ext cx="413852" cy="383957"/>
           </a:xfrm>
           <a:prstGeom prst="rect">
@@ -14646,7 +14646,7 @@
         </p:nvSpPr>
         <p:spPr>
           <a:xfrm>
-            <a:off x="2790341" y="3904307"/>
+            <a:off x="2790341" y="3565979"/>
             <a:ext cx="759523" cy="400110"/>
           </a:xfrm>
           <a:prstGeom prst="rect">
@@ -14685,7 +14685,7 @@
         </p:nvSpPr>
         <p:spPr>
           <a:xfrm>
-            <a:off x="703020" y="4595878"/>
+            <a:off x="703020" y="4257550"/>
             <a:ext cx="2752107" cy="795780"/>
           </a:xfrm>
           <a:prstGeom prst="rect">
@@ -14742,7 +14742,7 @@
         </p:nvSpPr>
         <p:spPr>
           <a:xfrm>
-            <a:off x="603441" y="4312200"/>
+            <a:off x="603441" y="3973872"/>
             <a:ext cx="2494844" cy="276999"/>
           </a:xfrm>
           <a:prstGeom prst="rect">
@@ -14784,7 +14784,7 @@
         </p:blipFill>
         <p:spPr>
           <a:xfrm>
-            <a:off x="780555" y="4692304"/>
+            <a:off x="780555" y="4353976"/>
             <a:ext cx="388318" cy="375209"/>
           </a:xfrm>
           <a:prstGeom prst="rect">
@@ -14806,7 +14806,7 @@
         </p:nvSpPr>
         <p:spPr>
           <a:xfrm>
-            <a:off x="678259" y="5004797"/>
+            <a:off x="678259" y="4666469"/>
             <a:ext cx="693847" cy="400110"/>
           </a:xfrm>
           <a:prstGeom prst="rect">
@@ -14853,7 +14853,7 @@
         </p:blipFill>
         <p:spPr>
           <a:xfrm>
-            <a:off x="1328107" y="4685162"/>
+            <a:off x="1328107" y="4346834"/>
             <a:ext cx="388318" cy="375209"/>
           </a:xfrm>
           <a:prstGeom prst="rect">
@@ -14880,7 +14880,7 @@
         </p:nvSpPr>
         <p:spPr>
           <a:xfrm>
-            <a:off x="1272868" y="5047541"/>
+            <a:off x="1272868" y="4709213"/>
             <a:ext cx="693847" cy="246221"/>
           </a:xfrm>
           <a:prstGeom prst="rect">
@@ -14926,7 +14926,7 @@
         </p:blipFill>
         <p:spPr>
           <a:xfrm>
-            <a:off x="1854938" y="4677293"/>
+            <a:off x="1854938" y="4338965"/>
             <a:ext cx="366571" cy="399605"/>
           </a:xfrm>
           <a:prstGeom prst="rect">
@@ -14953,7 +14953,7 @@
         </p:nvSpPr>
         <p:spPr>
           <a:xfrm>
-            <a:off x="1765649" y="5050760"/>
+            <a:off x="1765649" y="4712432"/>
             <a:ext cx="543568" cy="246221"/>
           </a:xfrm>
           <a:prstGeom prst="rect">
@@ -14999,7 +14999,7 @@
         </p:blipFill>
         <p:spPr>
           <a:xfrm>
-            <a:off x="1974372" y="2408097"/>
+            <a:off x="1974372" y="2069769"/>
             <a:ext cx="369719" cy="371466"/>
           </a:xfrm>
           <a:prstGeom prst="rect">
@@ -15036,7 +15036,7 @@
         </p:blipFill>
         <p:spPr>
           <a:xfrm>
-            <a:off x="2384626" y="4692304"/>
+            <a:off x="2384626" y="4353976"/>
             <a:ext cx="375209" cy="375209"/>
           </a:xfrm>
           <a:prstGeom prst="rect">
@@ -15063,7 +15063,7 @@
         </p:nvSpPr>
         <p:spPr>
           <a:xfrm>
-            <a:off x="2428202" y="4735471"/>
+            <a:off x="2428202" y="4397143"/>
             <a:ext cx="265471" cy="284996"/>
           </a:xfrm>
           <a:prstGeom prst="mathMultiply">
@@ -15115,7 +15115,7 @@
         </p:nvSpPr>
         <p:spPr>
           <a:xfrm>
-            <a:off x="2232073" y="5037386"/>
+            <a:off x="2232073" y="4699058"/>
             <a:ext cx="814533" cy="400110"/>
           </a:xfrm>
           <a:prstGeom prst="rect">
@@ -15154,7 +15154,7 @@
         </p:nvSpPr>
         <p:spPr>
           <a:xfrm>
-            <a:off x="685880" y="5722623"/>
+            <a:off x="685880" y="5384295"/>
             <a:ext cx="2752107" cy="795780"/>
           </a:xfrm>
           <a:prstGeom prst="rect">
@@ -15219,7 +15219,7 @@
         </p:blipFill>
         <p:spPr>
           <a:xfrm>
-            <a:off x="2924560" y="4670512"/>
+            <a:off x="2924560" y="4332184"/>
             <a:ext cx="421453" cy="384440"/>
           </a:xfrm>
           <a:prstGeom prst="rect">
@@ -15241,7 +15241,7 @@
         </p:nvSpPr>
         <p:spPr>
           <a:xfrm>
-            <a:off x="2888517" y="5027074"/>
+            <a:off x="2888517" y="4688746"/>
             <a:ext cx="814533" cy="400110"/>
           </a:xfrm>
           <a:prstGeom prst="rect">
@@ -15280,7 +15280,7 @@
         </p:nvSpPr>
         <p:spPr>
           <a:xfrm>
-            <a:off x="624034" y="5450701"/>
+            <a:off x="624034" y="5112373"/>
             <a:ext cx="1912227" cy="276999"/>
           </a:xfrm>
           <a:prstGeom prst="rect">
@@ -15323,7 +15323,7 @@
         </p:blipFill>
         <p:spPr>
           <a:xfrm>
-            <a:off x="796282" y="5796594"/>
+            <a:off x="796282" y="5458266"/>
             <a:ext cx="356863" cy="372962"/>
           </a:xfrm>
           <a:prstGeom prst="rect">
@@ -15350,7 +15350,7 @@
         </p:nvSpPr>
         <p:spPr>
           <a:xfrm>
-            <a:off x="624035" y="6169556"/>
+            <a:off x="624035" y="5831228"/>
             <a:ext cx="704072" cy="400110"/>
           </a:xfrm>
           <a:prstGeom prst="rect">
@@ -15397,7 +15397,7 @@
         </p:blipFill>
         <p:spPr>
           <a:xfrm>
-            <a:off x="1310975" y="5795477"/>
+            <a:off x="1310975" y="5457149"/>
             <a:ext cx="377056" cy="364626"/>
           </a:xfrm>
           <a:prstGeom prst="rect">
@@ -15424,7 +15424,7 @@
         </p:nvSpPr>
         <p:spPr>
           <a:xfrm>
-            <a:off x="1190538" y="6149550"/>
+            <a:off x="1190538" y="5811222"/>
             <a:ext cx="726900" cy="400110"/>
           </a:xfrm>
           <a:prstGeom prst="rect">
@@ -15481,7 +15481,7 @@
         </p:blipFill>
         <p:spPr>
           <a:xfrm>
-            <a:off x="1835553" y="5794127"/>
+            <a:off x="1835553" y="5455799"/>
             <a:ext cx="421600" cy="384038"/>
           </a:xfrm>
           <a:prstGeom prst="rect">
@@ -15508,7 +15508,7 @@
         </p:nvSpPr>
         <p:spPr>
           <a:xfrm>
-            <a:off x="1845861" y="6158235"/>
+            <a:off x="1845861" y="5819907"/>
             <a:ext cx="538765" cy="400110"/>
           </a:xfrm>
           <a:prstGeom prst="rect">
@@ -15555,7 +15555,7 @@
         </p:blipFill>
         <p:spPr>
           <a:xfrm>
-            <a:off x="2353542" y="5776126"/>
+            <a:off x="2353542" y="5437798"/>
             <a:ext cx="391831" cy="400110"/>
           </a:xfrm>
           <a:prstGeom prst="rect">
@@ -15582,7 +15582,7 @@
         </p:nvSpPr>
         <p:spPr>
           <a:xfrm>
-            <a:off x="2163265" y="6161132"/>
+            <a:off x="2163265" y="5822804"/>
             <a:ext cx="779617" cy="400110"/>
           </a:xfrm>
           <a:prstGeom prst="rect">
@@ -15629,7 +15629,7 @@
         </p:blipFill>
         <p:spPr>
           <a:xfrm>
-            <a:off x="2902264" y="5781283"/>
+            <a:off x="2902264" y="5442955"/>
             <a:ext cx="392041" cy="376360"/>
           </a:xfrm>
           <a:prstGeom prst="rect">
@@ -15664,7 +15664,7 @@
         </p:blipFill>
         <p:spPr>
           <a:xfrm>
-            <a:off x="2943176" y="5805619"/>
+            <a:off x="2943176" y="5467291"/>
             <a:ext cx="222855" cy="155998"/>
           </a:xfrm>
           <a:prstGeom prst="rect">
@@ -15691,7 +15691,7 @@
         </p:nvSpPr>
         <p:spPr>
           <a:xfrm>
-            <a:off x="2752596" y="6157176"/>
+            <a:off x="2752596" y="5818848"/>
             <a:ext cx="779617" cy="400110"/>
           </a:xfrm>
           <a:prstGeom prst="rect">
@@ -15740,7 +15740,7 @@
         </p:nvSpPr>
         <p:spPr>
           <a:xfrm>
-            <a:off x="457532" y="541818"/>
+            <a:off x="457532" y="203490"/>
             <a:ext cx="3403398" cy="307777"/>
           </a:xfrm>
           <a:prstGeom prst="rect">
@@ -15775,7 +15775,7 @@
         </p:nvSpPr>
         <p:spPr>
           <a:xfrm>
-            <a:off x="4871040" y="4589082"/>
+            <a:off x="4871040" y="4250754"/>
             <a:ext cx="2597707" cy="307778"/>
           </a:xfrm>
           <a:prstGeom prst="rect">
@@ -15824,7 +15824,7 @@
         </p:nvSpPr>
         <p:spPr>
           <a:xfrm>
-            <a:off x="4831711" y="4572586"/>
+            <a:off x="4831711" y="4234258"/>
             <a:ext cx="2676363" cy="307777"/>
           </a:xfrm>
           <a:prstGeom prst="rect">
@@ -15867,7 +15867,7 @@
         </p:blipFill>
         <p:spPr>
           <a:xfrm>
-            <a:off x="6869671" y="2080343"/>
+            <a:off x="6869671" y="1742015"/>
             <a:ext cx="376689" cy="417634"/>
           </a:xfrm>
           <a:prstGeom prst="rect">
@@ -15896,7 +15896,7 @@
         </p:nvCxnSpPr>
         <p:spPr>
           <a:xfrm>
-            <a:off x="7037274" y="2498947"/>
+            <a:off x="7037274" y="2160619"/>
             <a:ext cx="0" cy="1353337"/>
           </a:xfrm>
           <a:prstGeom prst="straightConnector1">
@@ -15947,7 +15947,7 @@
         </p:blipFill>
         <p:spPr>
           <a:xfrm>
-            <a:off x="6004594" y="1595224"/>
+            <a:off x="6004594" y="1256896"/>
             <a:ext cx="376689" cy="417634"/>
           </a:xfrm>
           <a:prstGeom prst="rect">
@@ -15978,7 +15978,7 @@
         </p:nvCxnSpPr>
         <p:spPr>
           <a:xfrm>
-            <a:off x="3742140" y="1559108"/>
+            <a:off x="3742140" y="1220780"/>
             <a:ext cx="1209687" cy="2448269"/>
           </a:xfrm>
           <a:prstGeom prst="straightConnector1">
@@ -16021,7 +16021,7 @@
         </p:nvCxnSpPr>
         <p:spPr>
           <a:xfrm>
-            <a:off x="3707618" y="2682150"/>
+            <a:off x="3707618" y="2343822"/>
             <a:ext cx="1244209" cy="1325227"/>
           </a:xfrm>
           <a:prstGeom prst="straightConnector1">
@@ -16060,7 +16060,7 @@
         </p:nvSpPr>
         <p:spPr>
           <a:xfrm>
-            <a:off x="4951827" y="3776544"/>
+            <a:off x="4951827" y="3438216"/>
             <a:ext cx="1792351" cy="461665"/>
           </a:xfrm>
           <a:prstGeom prst="rect">
@@ -16114,7 +16114,7 @@
         </p:nvCxnSpPr>
         <p:spPr>
           <a:xfrm>
-            <a:off x="3759529" y="3885330"/>
+            <a:off x="3759529" y="3547002"/>
             <a:ext cx="1192298" cy="122047"/>
           </a:xfrm>
           <a:prstGeom prst="straightConnector1">
@@ -16157,7 +16157,7 @@
         </p:nvCxnSpPr>
         <p:spPr>
           <a:xfrm flipV="1">
-            <a:off x="3765703" y="4007377"/>
+            <a:off x="3765703" y="3669049"/>
             <a:ext cx="1186124" cy="921922"/>
           </a:xfrm>
           <a:prstGeom prst="straightConnector1">
@@ -16200,7 +16200,7 @@
         </p:nvCxnSpPr>
         <p:spPr>
           <a:xfrm flipV="1">
-            <a:off x="3769856" y="4007377"/>
+            <a:off x="3769856" y="3669049"/>
             <a:ext cx="1181971" cy="2052020"/>
           </a:xfrm>
           <a:prstGeom prst="straightConnector1">
@@ -16246,7 +16246,7 @@
         </p:blipFill>
         <p:spPr>
           <a:xfrm>
-            <a:off x="5018633" y="3827699"/>
+            <a:off x="5018633" y="3489371"/>
             <a:ext cx="357468" cy="345400"/>
           </a:xfrm>
           <a:prstGeom prst="rect">
@@ -16276,7 +16276,7 @@
         </p:blipFill>
         <p:spPr>
           <a:xfrm>
-            <a:off x="5477333" y="3835697"/>
+            <a:off x="5477333" y="3497369"/>
             <a:ext cx="357468" cy="325620"/>
           </a:xfrm>
           <a:prstGeom prst="rect">
@@ -16310,7 +16310,7 @@
         </p:blipFill>
         <p:spPr>
           <a:xfrm>
-            <a:off x="5928753" y="3852284"/>
+            <a:off x="5928753" y="3513956"/>
             <a:ext cx="322839" cy="334780"/>
           </a:xfrm>
           <a:prstGeom prst="rect">
@@ -16337,7 +16337,7 @@
         </p:nvSpPr>
         <p:spPr>
           <a:xfrm>
-            <a:off x="6304463" y="3798334"/>
+            <a:off x="6304463" y="3460006"/>
             <a:ext cx="377190" cy="461665"/>
           </a:xfrm>
           <a:prstGeom prst="rect">
@@ -16389,7 +16389,7 @@
         </p:blipFill>
         <p:spPr>
           <a:xfrm>
-            <a:off x="3459231" y="4803645"/>
+            <a:off x="3459231" y="4465317"/>
             <a:ext cx="306472" cy="251307"/>
           </a:xfrm>
           <a:prstGeom prst="rect">
@@ -16424,7 +16424,7 @@
         </p:blipFill>
         <p:spPr>
           <a:xfrm>
-            <a:off x="3463384" y="5933743"/>
+            <a:off x="3463384" y="5595415"/>
             <a:ext cx="306472" cy="251307"/>
           </a:xfrm>
           <a:prstGeom prst="rect">
@@ -16459,7 +16459,7 @@
         </p:blipFill>
         <p:spPr>
           <a:xfrm>
-            <a:off x="3453057" y="3759676"/>
+            <a:off x="3453057" y="3421348"/>
             <a:ext cx="306472" cy="251307"/>
           </a:xfrm>
           <a:prstGeom prst="rect">
@@ -16494,7 +16494,7 @@
         </p:blipFill>
         <p:spPr>
           <a:xfrm>
-            <a:off x="3401146" y="2556496"/>
+            <a:off x="3401146" y="2218168"/>
             <a:ext cx="306472" cy="251307"/>
           </a:xfrm>
           <a:prstGeom prst="rect">
@@ -16529,7 +16529,7 @@
         </p:blipFill>
         <p:spPr>
           <a:xfrm>
-            <a:off x="3435668" y="1433454"/>
+            <a:off x="3435668" y="1095126"/>
             <a:ext cx="306472" cy="251307"/>
           </a:xfrm>
           <a:prstGeom prst="rect">
@@ -16564,7 +16564,7 @@
         </p:blipFill>
         <p:spPr>
           <a:xfrm>
-            <a:off x="6963682" y="3903512"/>
+            <a:off x="6963682" y="3565184"/>
             <a:ext cx="306472" cy="251307"/>
           </a:xfrm>
           <a:prstGeom prst="rect">
@@ -16591,7 +16591,7 @@
         </p:nvSpPr>
         <p:spPr>
           <a:xfrm>
-            <a:off x="6868997" y="3783133"/>
+            <a:off x="6868997" y="3444805"/>
             <a:ext cx="648796" cy="461665"/>
           </a:xfrm>
           <a:prstGeom prst="rect">
@@ -16641,7 +16641,7 @@
         </p:nvSpPr>
         <p:spPr>
           <a:xfrm>
-            <a:off x="3625805" y="3224814"/>
+            <a:off x="3625805" y="2886486"/>
             <a:ext cx="1205906" cy="461665"/>
           </a:xfrm>
           <a:prstGeom prst="rect">
@@ -16683,7 +16683,7 @@
         </p:nvSpPr>
         <p:spPr>
           <a:xfrm>
-            <a:off x="7226310" y="2102003"/>
+            <a:off x="7226310" y="1763675"/>
             <a:ext cx="1149594" cy="553998"/>
           </a:xfrm>
           <a:prstGeom prst="rect">
@@ -16718,7 +16718,7 @@
         </p:nvSpPr>
         <p:spPr>
           <a:xfrm>
-            <a:off x="6107428" y="2002445"/>
+            <a:off x="6107428" y="1664117"/>
             <a:ext cx="1004148" cy="707886"/>
           </a:xfrm>
           <a:prstGeom prst="rect">
@@ -16757,7 +16757,7 @@
         </p:nvCxnSpPr>
         <p:spPr>
           <a:xfrm flipV="1">
-            <a:off x="7031026" y="2788022"/>
+            <a:off x="7031026" y="2449694"/>
             <a:ext cx="1989931" cy="3178564"/>
           </a:xfrm>
           <a:prstGeom prst="bentConnector3">
@@ -16809,7 +16809,7 @@
         </p:blipFill>
         <p:spPr>
           <a:xfrm>
-            <a:off x="9020957" y="2600417"/>
+            <a:off x="9020957" y="2262089"/>
             <a:ext cx="388318" cy="375209"/>
           </a:xfrm>
           <a:prstGeom prst="rect">
@@ -16831,7 +16831,7 @@
         </p:nvSpPr>
         <p:spPr>
           <a:xfrm>
-            <a:off x="8950430" y="2180820"/>
+            <a:off x="8950430" y="1842492"/>
             <a:ext cx="1284548" cy="461665"/>
           </a:xfrm>
           <a:prstGeom prst="rect">
@@ -16884,7 +16884,7 @@
         </p:blipFill>
         <p:spPr>
           <a:xfrm flipH="1">
-            <a:off x="9055774" y="3779978"/>
+            <a:off x="9055774" y="3441650"/>
             <a:ext cx="376652" cy="297632"/>
           </a:xfrm>
           <a:prstGeom prst="rect">
@@ -16911,7 +16911,7 @@
         </p:nvSpPr>
         <p:spPr>
           <a:xfrm>
-            <a:off x="8949373" y="3327651"/>
+            <a:off x="8949373" y="2989323"/>
             <a:ext cx="1208331" cy="461665"/>
           </a:xfrm>
           <a:prstGeom prst="rect">
@@ -16959,7 +16959,7 @@
         </p:nvCxnSpPr>
         <p:spPr>
           <a:xfrm flipV="1">
-            <a:off x="7031026" y="3928794"/>
+            <a:off x="7031026" y="3590466"/>
             <a:ext cx="2024748" cy="2037792"/>
           </a:xfrm>
           <a:prstGeom prst="bentConnector3">
@@ -17011,7 +17011,7 @@
         </p:blipFill>
         <p:spPr>
           <a:xfrm>
-            <a:off x="9078081" y="4920142"/>
+            <a:off x="9078081" y="4581814"/>
             <a:ext cx="414399" cy="323527"/>
           </a:xfrm>
           <a:prstGeom prst="rect">
@@ -17038,7 +17038,7 @@
         </p:nvSpPr>
         <p:spPr>
           <a:xfrm>
-            <a:off x="8993330" y="4467387"/>
+            <a:off x="8993330" y="4129059"/>
             <a:ext cx="1402252" cy="461665"/>
           </a:xfrm>
           <a:prstGeom prst="rect">
@@ -17089,7 +17089,7 @@
         </p:blipFill>
         <p:spPr>
           <a:xfrm>
-            <a:off x="9049870" y="6053313"/>
+            <a:off x="9049870" y="5714985"/>
             <a:ext cx="413852" cy="315858"/>
           </a:xfrm>
           <a:prstGeom prst="rect">
@@ -17116,7 +17116,7 @@
         </p:nvSpPr>
         <p:spPr>
           <a:xfrm>
-            <a:off x="8949373" y="5635456"/>
+            <a:off x="8949373" y="5297128"/>
             <a:ext cx="1082854" cy="461665"/>
           </a:xfrm>
           <a:prstGeom prst="rect">
@@ -17159,7 +17159,7 @@
         </p:nvCxnSpPr>
         <p:spPr>
           <a:xfrm flipV="1">
-            <a:off x="7031026" y="5081906"/>
+            <a:off x="7031026" y="4743578"/>
             <a:ext cx="2047055" cy="884680"/>
           </a:xfrm>
           <a:prstGeom prst="bentConnector3">
@@ -17208,7 +17208,7 @@
         </p:nvCxnSpPr>
         <p:spPr>
           <a:xfrm>
-            <a:off x="7031026" y="5966586"/>
+            <a:off x="7031026" y="5628258"/>
             <a:ext cx="2018844" cy="244656"/>
           </a:xfrm>
           <a:prstGeom prst="bentConnector3">
@@ -17253,7 +17253,7 @@
         </p:nvSpPr>
         <p:spPr>
           <a:xfrm>
-            <a:off x="7066843" y="6032325"/>
+            <a:off x="7066843" y="5693997"/>
             <a:ext cx="797920" cy="276999"/>
           </a:xfrm>
           <a:prstGeom prst="rect">
@@ -17311,7 +17311,7 @@
         </p:blipFill>
         <p:spPr>
           <a:xfrm>
-            <a:off x="5765261" y="5437496"/>
+            <a:off x="5765261" y="5099168"/>
             <a:ext cx="1265765" cy="1058180"/>
           </a:xfrm>
           <a:prstGeom prst="rect">
@@ -17333,7 +17333,7 @@
         </p:nvSpPr>
         <p:spPr>
           <a:xfrm>
-            <a:off x="6287173" y="5065170"/>
+            <a:off x="6287173" y="4726842"/>
             <a:ext cx="1440375" cy="400110"/>
           </a:xfrm>
           <a:prstGeom prst="rect">
@@ -17370,7 +17370,7 @@
         </p:nvCxnSpPr>
         <p:spPr>
           <a:xfrm>
-            <a:off x="9409275" y="2783681"/>
+            <a:off x="9409275" y="2445353"/>
             <a:ext cx="685359" cy="0"/>
           </a:xfrm>
           <a:prstGeom prst="straightConnector1">
@@ -17413,7 +17413,7 @@
         </p:nvCxnSpPr>
         <p:spPr>
           <a:xfrm>
-            <a:off x="4732323" y="4350115"/>
+            <a:off x="4732323" y="4011787"/>
             <a:ext cx="2921232" cy="0"/>
           </a:xfrm>
           <a:prstGeom prst="line">
@@ -17449,7 +17449,7 @@
         </p:nvSpPr>
         <p:spPr>
           <a:xfrm>
-            <a:off x="4741332" y="4320403"/>
+            <a:off x="4741332" y="3982075"/>
             <a:ext cx="2038310" cy="246221"/>
           </a:xfrm>
           <a:prstGeom prst="rect">
@@ -17484,7 +17484,7 @@
         </p:nvCxnSpPr>
         <p:spPr>
           <a:xfrm>
-            <a:off x="4741332" y="3486745"/>
+            <a:off x="4741332" y="3148417"/>
             <a:ext cx="2921232" cy="0"/>
           </a:xfrm>
           <a:prstGeom prst="line">
@@ -17520,7 +17520,7 @@
         </p:nvSpPr>
         <p:spPr>
           <a:xfrm>
-            <a:off x="4740647" y="3482593"/>
+            <a:off x="4740647" y="3144265"/>
             <a:ext cx="2246302" cy="246221"/>
           </a:xfrm>
           <a:prstGeom prst="rect">
@@ -17555,7 +17555,7 @@
         </p:nvSpPr>
         <p:spPr>
           <a:xfrm>
-            <a:off x="4714540" y="2814226"/>
+            <a:off x="4714540" y="2475898"/>
             <a:ext cx="2751263" cy="246221"/>
           </a:xfrm>
           <a:prstGeom prst="rect">
@@ -17600,7 +17600,7 @@
         </p:blipFill>
         <p:spPr>
           <a:xfrm>
-            <a:off x="6041870" y="3133745"/>
+            <a:off x="6041870" y="2795417"/>
             <a:ext cx="262593" cy="269549"/>
           </a:xfrm>
           <a:prstGeom prst="rect">
@@ -17631,7 +17631,7 @@
         </p:nvCxnSpPr>
         <p:spPr>
           <a:xfrm flipH="1">
-            <a:off x="6173167" y="2012858"/>
+            <a:off x="6173167" y="1674530"/>
             <a:ext cx="0" cy="1120887"/>
           </a:xfrm>
           <a:prstGeom prst="straightConnector1">
@@ -17684,7 +17684,7 @@
         </p:blipFill>
         <p:spPr>
           <a:xfrm>
-            <a:off x="5317422" y="3141035"/>
+            <a:off x="5317422" y="2802707"/>
             <a:ext cx="262593" cy="269549"/>
           </a:xfrm>
           <a:prstGeom prst="rect">
@@ -17719,7 +17719,7 @@
         </p:blipFill>
         <p:spPr>
           <a:xfrm>
-            <a:off x="5296837" y="1015820"/>
+            <a:off x="5296837" y="677492"/>
             <a:ext cx="376689" cy="417634"/>
           </a:xfrm>
           <a:prstGeom prst="rect">
@@ -17750,7 +17750,7 @@
         </p:nvCxnSpPr>
         <p:spPr>
           <a:xfrm flipH="1">
-            <a:off x="5448719" y="1433454"/>
+            <a:off x="5448719" y="1095126"/>
             <a:ext cx="0" cy="1707581"/>
           </a:xfrm>
           <a:prstGeom prst="straightConnector1">
@@ -17793,7 +17793,7 @@
         </p:nvSpPr>
         <p:spPr>
           <a:xfrm>
-            <a:off x="5374818" y="1429652"/>
+            <a:off x="5374818" y="1091324"/>
             <a:ext cx="924259" cy="553998"/>
           </a:xfrm>
           <a:prstGeom prst="rect">
@@ -17828,7 +17828,7 @@
         </p:nvSpPr>
         <p:spPr>
           <a:xfrm>
-            <a:off x="6159170" y="5090531"/>
+            <a:off x="6159170" y="4752203"/>
             <a:ext cx="102768" cy="293820"/>
           </a:xfrm>
           <a:prstGeom prst="downArrow">
@@ -17874,7 +17874,7 @@
         </p:nvSpPr>
         <p:spPr>
           <a:xfrm>
-            <a:off x="9460084" y="2820228"/>
+            <a:off x="9460084" y="2481900"/>
             <a:ext cx="797920" cy="276999"/>
           </a:xfrm>
           <a:prstGeom prst="rect">
@@ -17935,7 +17935,7 @@
         </p:blipFill>
         <p:spPr>
           <a:xfrm>
-            <a:off x="10166905" y="4813185"/>
+            <a:off x="10166905" y="4474857"/>
             <a:ext cx="550981" cy="550981"/>
           </a:xfrm>
           <a:prstGeom prst="rect">
@@ -17974,7 +17974,7 @@
         </p:blipFill>
         <p:spPr>
           <a:xfrm>
-            <a:off x="10102230" y="2559796"/>
+            <a:off x="10102230" y="2221468"/>
             <a:ext cx="618548" cy="618548"/>
           </a:xfrm>
           <a:prstGeom prst="rect">
@@ -17996,7 +17996,7 @@
         </p:nvSpPr>
         <p:spPr>
           <a:xfrm>
-            <a:off x="10011841" y="3072897"/>
+            <a:off x="10011841" y="2734569"/>
             <a:ext cx="1276492" cy="400110"/>
           </a:xfrm>
           <a:prstGeom prst="rect">
@@ -18033,7 +18033,7 @@
         </p:nvCxnSpPr>
         <p:spPr>
           <a:xfrm>
-            <a:off x="9460084" y="3920507"/>
+            <a:off x="9460084" y="3582179"/>
             <a:ext cx="634550" cy="0"/>
           </a:xfrm>
           <a:prstGeom prst="straightConnector1">
@@ -18076,7 +18076,7 @@
         </p:nvSpPr>
         <p:spPr>
           <a:xfrm>
-            <a:off x="9959927" y="4155518"/>
+            <a:off x="9959927" y="3817190"/>
             <a:ext cx="1328406" cy="400110"/>
           </a:xfrm>
           <a:prstGeom prst="rect">
@@ -18128,7 +18128,7 @@
         </p:blipFill>
         <p:spPr>
           <a:xfrm>
-            <a:off x="10137259" y="3589227"/>
+            <a:off x="10137259" y="3250899"/>
             <a:ext cx="558577" cy="558577"/>
           </a:xfrm>
           <a:prstGeom prst="rect">
@@ -18152,7 +18152,7 @@
         </p:nvCxnSpPr>
         <p:spPr>
           <a:xfrm>
-            <a:off x="9497538" y="5088675"/>
+            <a:off x="9497538" y="4750347"/>
             <a:ext cx="634550" cy="0"/>
           </a:xfrm>
           <a:prstGeom prst="straightConnector1">
@@ -18195,7 +18195,7 @@
         </p:nvSpPr>
         <p:spPr>
           <a:xfrm>
-            <a:off x="9443610" y="3939419"/>
+            <a:off x="9443610" y="3601091"/>
             <a:ext cx="797920" cy="276999"/>
           </a:xfrm>
           <a:prstGeom prst="rect">
@@ -18239,7 +18239,7 @@
         </p:nvSpPr>
         <p:spPr>
           <a:xfrm>
-            <a:off x="9492480" y="5092337"/>
+            <a:off x="9492480" y="4754009"/>
             <a:ext cx="797920" cy="276999"/>
           </a:xfrm>
           <a:prstGeom prst="rect">
@@ -18283,7 +18283,7 @@
         </p:nvSpPr>
         <p:spPr>
           <a:xfrm>
-            <a:off x="9459742" y="6149550"/>
+            <a:off x="9459742" y="5811222"/>
             <a:ext cx="797920" cy="276999"/>
           </a:xfrm>
           <a:prstGeom prst="rect">
@@ -18329,7 +18329,7 @@
         </p:nvCxnSpPr>
         <p:spPr>
           <a:xfrm>
-            <a:off x="9497538" y="6123801"/>
+            <a:off x="9497538" y="5785473"/>
             <a:ext cx="634550" cy="0"/>
           </a:xfrm>
           <a:prstGeom prst="straightConnector1">
@@ -18380,7 +18380,7 @@
         </p:blipFill>
         <p:spPr>
           <a:xfrm>
-            <a:off x="10173834" y="5955650"/>
+            <a:off x="10173834" y="5617322"/>
             <a:ext cx="536529" cy="302980"/>
           </a:xfrm>
           <a:prstGeom prst="rect">
@@ -18405,7 +18405,7 @@
         </p:nvSpPr>
         <p:spPr>
           <a:xfrm>
-            <a:off x="9981314" y="5329271"/>
+            <a:off x="9981314" y="4990943"/>
             <a:ext cx="1314892" cy="400110"/>
           </a:xfrm>
           <a:prstGeom prst="rect">
@@ -18440,7 +18440,7 @@
         </p:nvSpPr>
         <p:spPr>
           <a:xfrm>
-            <a:off x="10082703" y="6258630"/>
+            <a:off x="10082703" y="5920302"/>
             <a:ext cx="1112113" cy="400110"/>
           </a:xfrm>
           <a:prstGeom prst="rect">
@@ -18483,7 +18483,7 @@
         </p:blipFill>
         <p:spPr>
           <a:xfrm>
-            <a:off x="8088063" y="1126320"/>
+            <a:off x="8088063" y="787992"/>
             <a:ext cx="1269629" cy="584213"/>
           </a:xfrm>
           <a:prstGeom prst="rect">
@@ -18513,7 +18513,7 @@
         </p:nvCxnSpPr>
         <p:spPr>
           <a:xfrm>
-            <a:off x="5709726" y="1280710"/>
+            <a:off x="5709726" y="942382"/>
             <a:ext cx="2344827" cy="0"/>
           </a:xfrm>
           <a:prstGeom prst="straightConnector1">
@@ -18558,7 +18558,7 @@
         </p:nvCxnSpPr>
         <p:spPr>
           <a:xfrm rot="5400000">
-            <a:off x="8904673" y="2861255"/>
+            <a:off x="8904673" y="2522927"/>
             <a:ext cx="196072" cy="424814"/>
           </a:xfrm>
           <a:prstGeom prst="bentConnector2">
@@ -18597,7 +18597,7 @@
         </p:nvCxnSpPr>
         <p:spPr>
           <a:xfrm rot="5400000">
-            <a:off x="8886028" y="3961440"/>
+            <a:off x="8886028" y="3623112"/>
             <a:ext cx="241902" cy="474243"/>
           </a:xfrm>
           <a:prstGeom prst="bentConnector2">
@@ -18636,7 +18636,7 @@
         </p:nvCxnSpPr>
         <p:spPr>
           <a:xfrm rot="5400000">
-            <a:off x="8932752" y="5129858"/>
+            <a:off x="8932752" y="4791530"/>
             <a:ext cx="238718" cy="466340"/>
           </a:xfrm>
           <a:prstGeom prst="bentConnector2">
@@ -18675,7 +18675,7 @@
         </p:nvCxnSpPr>
         <p:spPr>
           <a:xfrm rot="5400000">
-            <a:off x="8991737" y="6161488"/>
+            <a:off x="8991737" y="5823160"/>
             <a:ext cx="57376" cy="472742"/>
           </a:xfrm>
           <a:prstGeom prst="bentConnector2">
@@ -18711,7 +18711,7 @@
         </p:nvSpPr>
         <p:spPr>
           <a:xfrm>
-            <a:off x="6038038" y="1014820"/>
+            <a:off x="6038038" y="676492"/>
             <a:ext cx="1661917" cy="246221"/>
           </a:xfrm>
           <a:prstGeom prst="rect">

</xml_diff>

<commit_message>
Added the Malicious Activities Module Repository read me file.
</commit_message>
<xml_diff>
--- a/doc/designDoc.pptx
+++ b/doc/designDoc.pptx
@@ -268,7 +268,7 @@
           <a:p>
             <a:fld id="{9FCA313A-65B0-404C-ABF6-BBAAB537D5DB}" type="datetimeFigureOut">
               <a:rPr lang="en-SG" smtClean="0"/>
-              <a:t>26/5/2024</a:t>
+              <a:t>28/5/2024</a:t>
             </a:fld>
             <a:endParaRPr lang="en-SG"/>
           </a:p>
@@ -468,7 +468,7 @@
           <a:p>
             <a:fld id="{9FCA313A-65B0-404C-ABF6-BBAAB537D5DB}" type="datetimeFigureOut">
               <a:rPr lang="en-SG" smtClean="0"/>
-              <a:t>26/5/2024</a:t>
+              <a:t>28/5/2024</a:t>
             </a:fld>
             <a:endParaRPr lang="en-SG"/>
           </a:p>
@@ -678,7 +678,7 @@
           <a:p>
             <a:fld id="{9FCA313A-65B0-404C-ABF6-BBAAB537D5DB}" type="datetimeFigureOut">
               <a:rPr lang="en-SG" smtClean="0"/>
-              <a:t>26/5/2024</a:t>
+              <a:t>28/5/2024</a:t>
             </a:fld>
             <a:endParaRPr lang="en-SG"/>
           </a:p>
@@ -878,7 +878,7 @@
           <a:p>
             <a:fld id="{9FCA313A-65B0-404C-ABF6-BBAAB537D5DB}" type="datetimeFigureOut">
               <a:rPr lang="en-SG" smtClean="0"/>
-              <a:t>26/5/2024</a:t>
+              <a:t>28/5/2024</a:t>
             </a:fld>
             <a:endParaRPr lang="en-SG"/>
           </a:p>
@@ -1154,7 +1154,7 @@
           <a:p>
             <a:fld id="{9FCA313A-65B0-404C-ABF6-BBAAB537D5DB}" type="datetimeFigureOut">
               <a:rPr lang="en-SG" smtClean="0"/>
-              <a:t>26/5/2024</a:t>
+              <a:t>28/5/2024</a:t>
             </a:fld>
             <a:endParaRPr lang="en-SG"/>
           </a:p>
@@ -1422,7 +1422,7 @@
           <a:p>
             <a:fld id="{9FCA313A-65B0-404C-ABF6-BBAAB537D5DB}" type="datetimeFigureOut">
               <a:rPr lang="en-SG" smtClean="0"/>
-              <a:t>26/5/2024</a:t>
+              <a:t>28/5/2024</a:t>
             </a:fld>
             <a:endParaRPr lang="en-SG"/>
           </a:p>
@@ -1837,7 +1837,7 @@
           <a:p>
             <a:fld id="{9FCA313A-65B0-404C-ABF6-BBAAB537D5DB}" type="datetimeFigureOut">
               <a:rPr lang="en-SG" smtClean="0"/>
-              <a:t>26/5/2024</a:t>
+              <a:t>28/5/2024</a:t>
             </a:fld>
             <a:endParaRPr lang="en-SG"/>
           </a:p>
@@ -1979,7 +1979,7 @@
           <a:p>
             <a:fld id="{9FCA313A-65B0-404C-ABF6-BBAAB537D5DB}" type="datetimeFigureOut">
               <a:rPr lang="en-SG" smtClean="0"/>
-              <a:t>26/5/2024</a:t>
+              <a:t>28/5/2024</a:t>
             </a:fld>
             <a:endParaRPr lang="en-SG"/>
           </a:p>
@@ -2092,7 +2092,7 @@
           <a:p>
             <a:fld id="{9FCA313A-65B0-404C-ABF6-BBAAB537D5DB}" type="datetimeFigureOut">
               <a:rPr lang="en-SG" smtClean="0"/>
-              <a:t>26/5/2024</a:t>
+              <a:t>28/5/2024</a:t>
             </a:fld>
             <a:endParaRPr lang="en-SG"/>
           </a:p>
@@ -2405,7 +2405,7 @@
           <a:p>
             <a:fld id="{9FCA313A-65B0-404C-ABF6-BBAAB537D5DB}" type="datetimeFigureOut">
               <a:rPr lang="en-SG" smtClean="0"/>
-              <a:t>26/5/2024</a:t>
+              <a:t>28/5/2024</a:t>
             </a:fld>
             <a:endParaRPr lang="en-SG"/>
           </a:p>
@@ -2694,7 +2694,7 @@
           <a:p>
             <a:fld id="{9FCA313A-65B0-404C-ABF6-BBAAB537D5DB}" type="datetimeFigureOut">
               <a:rPr lang="en-SG" smtClean="0"/>
-              <a:t>26/5/2024</a:t>
+              <a:t>28/5/2024</a:t>
             </a:fld>
             <a:endParaRPr lang="en-SG"/>
           </a:p>
@@ -2937,7 +2937,7 @@
           <a:p>
             <a:fld id="{9FCA313A-65B0-404C-ABF6-BBAAB537D5DB}" type="datetimeFigureOut">
               <a:rPr lang="en-SG" smtClean="0"/>
-              <a:t>26/5/2024</a:t>
+              <a:t>28/5/2024</a:t>
             </a:fld>
             <a:endParaRPr lang="en-SG"/>
           </a:p>
@@ -8168,14 +8168,15 @@
           </p:cNvPr>
           <p:cNvCxnSpPr>
             <a:cxnSpLocks/>
+            <a:stCxn id="29" idx="3"/>
             <a:endCxn id="19" idx="3"/>
           </p:cNvCxnSpPr>
           <p:nvPr/>
         </p:nvCxnSpPr>
         <p:spPr>
           <a:xfrm>
-            <a:off x="8932749" y="4158080"/>
-            <a:ext cx="578078" cy="46335"/>
+            <a:off x="8928151" y="4203779"/>
+            <a:ext cx="582676" cy="636"/>
           </a:xfrm>
           <a:prstGeom prst="straightConnector1">
             <a:avLst/>
@@ -8261,14 +8262,15 @@
           </p:cNvPr>
           <p:cNvCxnSpPr>
             <a:cxnSpLocks/>
+            <a:stCxn id="29" idx="3"/>
             <a:endCxn id="25" idx="1"/>
           </p:cNvCxnSpPr>
           <p:nvPr/>
         </p:nvCxnSpPr>
         <p:spPr>
           <a:xfrm>
-            <a:off x="8976326" y="4217230"/>
-            <a:ext cx="504008" cy="1397296"/>
+            <a:off x="8928151" y="4203779"/>
+            <a:ext cx="552183" cy="1410747"/>
           </a:xfrm>
           <a:prstGeom prst="straightConnector1">
             <a:avLst/>
@@ -9103,41 +9105,6 @@
           </a:fontRef>
         </p:style>
       </p:cxnSp>
-      <p:pic>
-        <p:nvPicPr>
-          <p:cNvPr id="138" name="Picture 137">
-            <a:extLst>
-              <a:ext uri="{FF2B5EF4-FFF2-40B4-BE49-F238E27FC236}">
-                <a16:creationId xmlns:a16="http://schemas.microsoft.com/office/drawing/2014/main" id="{DDA86CCE-68E1-E8A2-206D-64F51B0CCE11}"/>
-              </a:ext>
-            </a:extLst>
-          </p:cNvPr>
-          <p:cNvPicPr>
-            <a:picLocks noChangeAspect="1"/>
-          </p:cNvPicPr>
-          <p:nvPr/>
-        </p:nvPicPr>
-        <p:blipFill>
-          <a:blip r:embed="rId4"/>
-          <a:stretch>
-            <a:fillRect/>
-          </a:stretch>
-        </p:blipFill>
-        <p:spPr>
-          <a:xfrm>
-            <a:off x="10492729" y="1090215"/>
-            <a:ext cx="741414" cy="418680"/>
-          </a:xfrm>
-          <a:prstGeom prst="rect">
-            <a:avLst/>
-          </a:prstGeom>
-          <a:ln>
-            <a:solidFill>
-              <a:srgbClr val="FF0000"/>
-            </a:solidFill>
-          </a:ln>
-        </p:spPr>
-      </p:pic>
       <p:sp>
         <p:nvSpPr>
           <p:cNvPr id="139" name="TextBox 138">
@@ -9152,7 +9119,7 @@
         </p:nvSpPr>
         <p:spPr>
           <a:xfrm>
-            <a:off x="10255488" y="812633"/>
+            <a:off x="10164291" y="380783"/>
             <a:ext cx="1320542" cy="276999"/>
           </a:xfrm>
           <a:prstGeom prst="rect">
@@ -9174,41 +9141,6 @@
           </a:p>
         </p:txBody>
       </p:sp>
-      <p:pic>
-        <p:nvPicPr>
-          <p:cNvPr id="142" name="Picture 141">
-            <a:extLst>
-              <a:ext uri="{FF2B5EF4-FFF2-40B4-BE49-F238E27FC236}">
-                <a16:creationId xmlns:a16="http://schemas.microsoft.com/office/drawing/2014/main" id="{40483DC2-6BE5-C2C3-8446-0F721A7A4685}"/>
-              </a:ext>
-            </a:extLst>
-          </p:cNvPr>
-          <p:cNvPicPr>
-            <a:picLocks noChangeAspect="1"/>
-          </p:cNvPicPr>
-          <p:nvPr/>
-        </p:nvPicPr>
-        <p:blipFill>
-          <a:blip r:embed="rId4"/>
-          <a:stretch>
-            <a:fillRect/>
-          </a:stretch>
-        </p:blipFill>
-        <p:spPr>
-          <a:xfrm>
-            <a:off x="10472222" y="1624641"/>
-            <a:ext cx="741414" cy="418680"/>
-          </a:xfrm>
-          <a:prstGeom prst="rect">
-            <a:avLst/>
-          </a:prstGeom>
-          <a:ln>
-            <a:solidFill>
-              <a:srgbClr val="FF0000"/>
-            </a:solidFill>
-          </a:ln>
-        </p:spPr>
-      </p:pic>
       <p:cxnSp>
         <p:nvCxnSpPr>
           <p:cNvPr id="143" name="Straight Arrow Connector 142">
@@ -9358,15 +9290,13 @@
           </p:cNvPr>
           <p:cNvCxnSpPr>
             <a:cxnSpLocks/>
-            <a:stCxn id="128" idx="3"/>
-            <a:endCxn id="142" idx="1"/>
           </p:cNvCxnSpPr>
           <p:nvPr/>
         </p:nvCxnSpPr>
         <p:spPr>
           <a:xfrm flipV="1">
-            <a:off x="9191153" y="1833981"/>
-            <a:ext cx="1281069" cy="44462"/>
+            <a:off x="9206945" y="1938992"/>
+            <a:ext cx="1281069" cy="0"/>
           </a:xfrm>
           <a:prstGeom prst="straightConnector1">
             <a:avLst/>
@@ -9394,41 +9324,6 @@
           </a:fontRef>
         </p:style>
       </p:cxnSp>
-      <p:pic>
-        <p:nvPicPr>
-          <p:cNvPr id="158" name="Picture 157">
-            <a:extLst>
-              <a:ext uri="{FF2B5EF4-FFF2-40B4-BE49-F238E27FC236}">
-                <a16:creationId xmlns:a16="http://schemas.microsoft.com/office/drawing/2014/main" id="{D2DAD496-07C2-D3C2-8880-53090B9433A7}"/>
-              </a:ext>
-            </a:extLst>
-          </p:cNvPr>
-          <p:cNvPicPr>
-            <a:picLocks noChangeAspect="1"/>
-          </p:cNvPicPr>
-          <p:nvPr/>
-        </p:nvPicPr>
-        <p:blipFill>
-          <a:blip r:embed="rId4"/>
-          <a:stretch>
-            <a:fillRect/>
-          </a:stretch>
-        </p:blipFill>
-        <p:spPr>
-          <a:xfrm>
-            <a:off x="10465863" y="2203713"/>
-            <a:ext cx="741414" cy="418680"/>
-          </a:xfrm>
-          <a:prstGeom prst="rect">
-            <a:avLst/>
-          </a:prstGeom>
-          <a:ln>
-            <a:solidFill>
-              <a:srgbClr val="FF0000"/>
-            </a:solidFill>
-          </a:ln>
-        </p:spPr>
-      </p:pic>
       <p:cxnSp>
         <p:nvCxnSpPr>
           <p:cNvPr id="159" name="Straight Arrow Connector 158">
@@ -9440,14 +9335,13 @@
           </p:cNvPr>
           <p:cNvCxnSpPr>
             <a:cxnSpLocks/>
-            <a:endCxn id="158" idx="1"/>
           </p:cNvCxnSpPr>
           <p:nvPr/>
         </p:nvCxnSpPr>
         <p:spPr>
           <a:xfrm flipV="1">
             <a:off x="9206945" y="2413053"/>
-            <a:ext cx="1258918" cy="21335"/>
+            <a:ext cx="1258918" cy="0"/>
           </a:xfrm>
           <a:prstGeom prst="straightConnector1">
             <a:avLst/>
@@ -11448,6 +11342,201 @@
           </a:p>
         </p:txBody>
       </p:sp>
+      <p:pic>
+        <p:nvPicPr>
+          <p:cNvPr id="2" name="Graphic 1" descr="Server with solid fill">
+            <a:extLst>
+              <a:ext uri="{FF2B5EF4-FFF2-40B4-BE49-F238E27FC236}">
+                <a16:creationId xmlns:a16="http://schemas.microsoft.com/office/drawing/2014/main" id="{E0EB6335-88E2-841C-C967-153FC2BF3EF6}"/>
+              </a:ext>
+            </a:extLst>
+          </p:cNvPr>
+          <p:cNvPicPr>
+            <a:picLocks noChangeAspect="1"/>
+          </p:cNvPicPr>
+          <p:nvPr/>
+        </p:nvPicPr>
+        <p:blipFill>
+          <a:blip r:embed="rId18">
+            <a:extLst>
+              <a:ext uri="{28A0092B-C50C-407E-A947-70E740481C1C}">
+                <a14:useLocalDpi xmlns:a14="http://schemas.microsoft.com/office/drawing/2010/main" val="0"/>
+              </a:ext>
+              <a:ext uri="{96DAC541-7B7A-43D3-8B79-37D633B846F1}">
+                <asvg:svgBlip xmlns:asvg="http://schemas.microsoft.com/office/drawing/2016/SVG/main" r:embed="rId19"/>
+              </a:ext>
+            </a:extLst>
+          </a:blip>
+          <a:stretch>
+            <a:fillRect/>
+          </a:stretch>
+        </p:blipFill>
+        <p:spPr>
+          <a:xfrm>
+            <a:off x="10506726" y="1726368"/>
+            <a:ext cx="414399" cy="414399"/>
+          </a:xfrm>
+          <a:prstGeom prst="rect">
+            <a:avLst/>
+          </a:prstGeom>
+        </p:spPr>
+      </p:pic>
+      <p:pic>
+        <p:nvPicPr>
+          <p:cNvPr id="3" name="Graphic 2" descr="Wireless router with solid fill">
+            <a:extLst>
+              <a:ext uri="{FF2B5EF4-FFF2-40B4-BE49-F238E27FC236}">
+                <a16:creationId xmlns:a16="http://schemas.microsoft.com/office/drawing/2014/main" id="{7365D132-6DA1-20B6-38ED-7AB93D8654E8}"/>
+              </a:ext>
+            </a:extLst>
+          </p:cNvPr>
+          <p:cNvPicPr>
+            <a:picLocks noChangeAspect="1"/>
+          </p:cNvPicPr>
+          <p:nvPr/>
+        </p:nvPicPr>
+        <p:blipFill>
+          <a:blip r:embed="rId20">
+            <a:extLst>
+              <a:ext uri="{28A0092B-C50C-407E-A947-70E740481C1C}">
+                <a14:useLocalDpi xmlns:a14="http://schemas.microsoft.com/office/drawing/2010/main" val="0"/>
+              </a:ext>
+              <a:ext uri="{96DAC541-7B7A-43D3-8B79-37D633B846F1}">
+                <asvg:svgBlip xmlns:asvg="http://schemas.microsoft.com/office/drawing/2016/SVG/main" r:embed="rId21"/>
+              </a:ext>
+            </a:extLst>
+          </a:blip>
+          <a:stretch>
+            <a:fillRect/>
+          </a:stretch>
+        </p:blipFill>
+        <p:spPr>
+          <a:xfrm>
+            <a:off x="10447679" y="561670"/>
+            <a:ext cx="539811" cy="539811"/>
+          </a:xfrm>
+          <a:prstGeom prst="rect">
+            <a:avLst/>
+          </a:prstGeom>
+        </p:spPr>
+      </p:pic>
+      <p:pic>
+        <p:nvPicPr>
+          <p:cNvPr id="12" name="Graphic 11" descr="Database with solid fill">
+            <a:extLst>
+              <a:ext uri="{FF2B5EF4-FFF2-40B4-BE49-F238E27FC236}">
+                <a16:creationId xmlns:a16="http://schemas.microsoft.com/office/drawing/2014/main" id="{A87AE4AE-5BCE-1FCA-08ED-EFD8600F12C3}"/>
+              </a:ext>
+            </a:extLst>
+          </p:cNvPr>
+          <p:cNvPicPr>
+            <a:picLocks noChangeAspect="1"/>
+          </p:cNvPicPr>
+          <p:nvPr/>
+        </p:nvPicPr>
+        <p:blipFill>
+          <a:blip r:embed="rId22">
+            <a:extLst>
+              <a:ext uri="{28A0092B-C50C-407E-A947-70E740481C1C}">
+                <a14:useLocalDpi xmlns:a14="http://schemas.microsoft.com/office/drawing/2010/main" val="0"/>
+              </a:ext>
+              <a:ext uri="{96DAC541-7B7A-43D3-8B79-37D633B846F1}">
+                <asvg:svgBlip xmlns:asvg="http://schemas.microsoft.com/office/drawing/2016/SVG/main" r:embed="rId23"/>
+              </a:ext>
+            </a:extLst>
+          </a:blip>
+          <a:stretch>
+            <a:fillRect/>
+          </a:stretch>
+        </p:blipFill>
+        <p:spPr>
+          <a:xfrm>
+            <a:off x="10448424" y="1099356"/>
+            <a:ext cx="507416" cy="507416"/>
+          </a:xfrm>
+          <a:prstGeom prst="rect">
+            <a:avLst/>
+          </a:prstGeom>
+        </p:spPr>
+      </p:pic>
+      <p:pic>
+        <p:nvPicPr>
+          <p:cNvPr id="16" name="Picture 15">
+            <a:extLst>
+              <a:ext uri="{FF2B5EF4-FFF2-40B4-BE49-F238E27FC236}">
+                <a16:creationId xmlns:a16="http://schemas.microsoft.com/office/drawing/2014/main" id="{935872B2-BB73-4A37-5DAD-5B3520556F9F}"/>
+              </a:ext>
+            </a:extLst>
+          </p:cNvPr>
+          <p:cNvPicPr>
+            <a:picLocks noChangeAspect="1"/>
+          </p:cNvPicPr>
+          <p:nvPr/>
+        </p:nvPicPr>
+        <p:blipFill>
+          <a:blip r:embed="rId4"/>
+          <a:stretch>
+            <a:fillRect/>
+          </a:stretch>
+        </p:blipFill>
+        <p:spPr>
+          <a:xfrm>
+            <a:off x="10497941" y="2286271"/>
+            <a:ext cx="507417" cy="286540"/>
+          </a:xfrm>
+          <a:prstGeom prst="rect">
+            <a:avLst/>
+          </a:prstGeom>
+          <a:ln>
+            <a:noFill/>
+          </a:ln>
+        </p:spPr>
+      </p:pic>
+      <p:cxnSp>
+        <p:nvCxnSpPr>
+          <p:cNvPr id="34" name="Straight Arrow Connector 33">
+            <a:extLst>
+              <a:ext uri="{FF2B5EF4-FFF2-40B4-BE49-F238E27FC236}">
+                <a16:creationId xmlns:a16="http://schemas.microsoft.com/office/drawing/2014/main" id="{8E9E6F05-9DF8-87F7-00DA-298DEFD4C5B8}"/>
+              </a:ext>
+            </a:extLst>
+          </p:cNvPr>
+          <p:cNvCxnSpPr>
+            <a:cxnSpLocks/>
+          </p:cNvCxnSpPr>
+          <p:nvPr/>
+        </p:nvCxnSpPr>
+        <p:spPr>
+          <a:xfrm flipV="1">
+            <a:off x="9158309" y="743781"/>
+            <a:ext cx="1258918" cy="0"/>
+          </a:xfrm>
+          <a:prstGeom prst="straightConnector1">
+            <a:avLst/>
+          </a:prstGeom>
+          <a:ln>
+            <a:solidFill>
+              <a:srgbClr val="C00000"/>
+            </a:solidFill>
+            <a:prstDash val="solid"/>
+            <a:tailEnd type="triangle"/>
+          </a:ln>
+        </p:spPr>
+        <p:style>
+          <a:lnRef idx="2">
+            <a:schemeClr val="accent1"/>
+          </a:lnRef>
+          <a:fillRef idx="0">
+            <a:schemeClr val="accent1"/>
+          </a:fillRef>
+          <a:effectRef idx="1">
+            <a:schemeClr val="accent1"/>
+          </a:effectRef>
+          <a:fontRef idx="minor">
+            <a:schemeClr val="tx1"/>
+          </a:fontRef>
+        </p:style>
+      </p:cxnSp>
     </p:spTree>
     <p:extLst>
       <p:ext uri="{BB962C8B-B14F-4D97-AF65-F5344CB8AC3E}">

</xml_diff>